<commit_message>
Small change to Week 7 lecture...
... plus added HW3 solution
</commit_message>
<xml_diff>
--- a/Week 7 -- spatiotemporal models/Lecture/Lecture 7 -- spatio-temporal models.pptx
+++ b/Week 7 -- spatiotemporal models/Lecture/Lecture 7 -- spatio-temporal models.pptx
@@ -5,28 +5,29 @@
     <p:sldMasterId id="2147483672" r:id="rId1"/>
   </p:sldMasterIdLst>
   <p:notesMasterIdLst>
-    <p:notesMasterId r:id="rId21"/>
+    <p:notesMasterId r:id="rId22"/>
   </p:notesMasterIdLst>
   <p:sldIdLst>
     <p:sldId id="266" r:id="rId2"/>
     <p:sldId id="268" r:id="rId3"/>
     <p:sldId id="270" r:id="rId4"/>
     <p:sldId id="272" r:id="rId5"/>
-    <p:sldId id="271" r:id="rId6"/>
-    <p:sldId id="269" r:id="rId7"/>
-    <p:sldId id="273" r:id="rId8"/>
-    <p:sldId id="277" r:id="rId9"/>
-    <p:sldId id="276" r:id="rId10"/>
-    <p:sldId id="287" r:id="rId11"/>
-    <p:sldId id="278" r:id="rId12"/>
-    <p:sldId id="284" r:id="rId13"/>
-    <p:sldId id="285" r:id="rId14"/>
-    <p:sldId id="289" r:id="rId15"/>
-    <p:sldId id="281" r:id="rId16"/>
-    <p:sldId id="290" r:id="rId17"/>
-    <p:sldId id="280" r:id="rId18"/>
-    <p:sldId id="291" r:id="rId19"/>
-    <p:sldId id="283" r:id="rId20"/>
+    <p:sldId id="292" r:id="rId6"/>
+    <p:sldId id="271" r:id="rId7"/>
+    <p:sldId id="269" r:id="rId8"/>
+    <p:sldId id="273" r:id="rId9"/>
+    <p:sldId id="277" r:id="rId10"/>
+    <p:sldId id="276" r:id="rId11"/>
+    <p:sldId id="287" r:id="rId12"/>
+    <p:sldId id="278" r:id="rId13"/>
+    <p:sldId id="284" r:id="rId14"/>
+    <p:sldId id="285" r:id="rId15"/>
+    <p:sldId id="289" r:id="rId16"/>
+    <p:sldId id="281" r:id="rId17"/>
+    <p:sldId id="290" r:id="rId18"/>
+    <p:sldId id="280" r:id="rId19"/>
+    <p:sldId id="291" r:id="rId20"/>
+    <p:sldId id="283" r:id="rId21"/>
   </p:sldIdLst>
   <p:sldSz cx="9144000" cy="6858000" type="screen4x3"/>
   <p:notesSz cx="6858000" cy="9144000"/>
@@ -3576,8 +3577,8 @@
           </a:p>
         </p:txBody>
       </p:sp>
-      <mc:AlternateContent xmlns:mc="http://schemas.openxmlformats.org/markup-compatibility/2006">
-        <mc:Choice xmlns:a14="http://schemas.microsoft.com/office/drawing/2010/main" Requires="a14">
+      <mc:AlternateContent xmlns:mc="http://schemas.openxmlformats.org/markup-compatibility/2006" xmlns:a14="http://schemas.microsoft.com/office/drawing/2010/main">
+        <mc:Choice Requires="a14">
           <p:sp>
             <p:nvSpPr>
               <p:cNvPr id="3" name="Content Placeholder 2"/>
@@ -3600,11 +3601,770 @@
                 </a:pPr>
                 <a:r>
                   <a:rPr lang="en-US" dirty="0" smtClean="0"/>
-                  <a:t>Counts:  Zero-adjusted </a:t>
+                  <a:t>Counts:  Zero-inflated models</a:t>
                 </a:r>
+              </a:p>
+              <a:p>
+                <a:pPr marL="457200" lvl="1" indent="0">
+                  <a:buNone/>
+                </a:pPr>
+                <a14:m>
+                  <m:oMathPara xmlns:m="http://schemas.openxmlformats.org/officeDocument/2006/math">
+                    <m:oMathParaPr>
+                      <m:jc m:val="centerGroup"/>
+                    </m:oMathParaPr>
+                    <m:oMath xmlns:m="http://schemas.openxmlformats.org/officeDocument/2006/math">
+                      <m:func>
+                        <m:funcPr>
+                          <m:ctrlPr>
+                            <a:rPr lang="en-US" b="0" i="1" smtClean="0">
+                              <a:latin typeface="Cambria Math" panose="02040503050406030204" pitchFamily="18" charset="0"/>
+                            </a:rPr>
+                          </m:ctrlPr>
+                        </m:funcPr>
+                        <m:fName>
+                          <m:r>
+                            <m:rPr>
+                              <m:sty m:val="p"/>
+                            </m:rPr>
+                            <a:rPr lang="en-US" b="0" i="0" smtClean="0">
+                              <a:latin typeface="Cambria Math" panose="02040503050406030204" pitchFamily="18" charset="0"/>
+                            </a:rPr>
+                            <m:t>Pr</m:t>
+                          </m:r>
+                        </m:fName>
+                        <m:e>
+                          <m:d>
+                            <m:dPr>
+                              <m:ctrlPr>
+                                <a:rPr lang="en-US" b="0" i="1" smtClean="0">
+                                  <a:latin typeface="Cambria Math" panose="02040503050406030204" pitchFamily="18" charset="0"/>
+                                </a:rPr>
+                              </m:ctrlPr>
+                            </m:dPr>
+                            <m:e>
+                              <m:r>
+                                <a:rPr lang="en-US" b="0" i="1" smtClean="0">
+                                  <a:latin typeface="Cambria Math" panose="02040503050406030204" pitchFamily="18" charset="0"/>
+                                </a:rPr>
+                                <m:t>𝐶</m:t>
+                              </m:r>
+                              <m:r>
+                                <a:rPr lang="en-US" b="0" i="1" smtClean="0">
+                                  <a:latin typeface="Cambria Math" panose="02040503050406030204" pitchFamily="18" charset="0"/>
+                                </a:rPr>
+                                <m:t>=</m:t>
+                              </m:r>
+                              <m:sSub>
+                                <m:sSubPr>
+                                  <m:ctrlPr>
+                                    <a:rPr lang="en-US" b="0" i="1" smtClean="0">
+                                      <a:latin typeface="Cambria Math" panose="02040503050406030204" pitchFamily="18" charset="0"/>
+                                    </a:rPr>
+                                  </m:ctrlPr>
+                                </m:sSubPr>
+                                <m:e>
+                                  <m:r>
+                                    <a:rPr lang="en-US" b="0" i="1" smtClean="0">
+                                      <a:latin typeface="Cambria Math" panose="02040503050406030204" pitchFamily="18" charset="0"/>
+                                    </a:rPr>
+                                    <m:t>𝑐</m:t>
+                                  </m:r>
+                                </m:e>
+                                <m:sub>
+                                  <m:r>
+                                    <a:rPr lang="en-US" b="0" i="1" smtClean="0">
+                                      <a:latin typeface="Cambria Math" panose="02040503050406030204" pitchFamily="18" charset="0"/>
+                                    </a:rPr>
+                                    <m:t>𝑖</m:t>
+                                  </m:r>
+                                </m:sub>
+                              </m:sSub>
+                            </m:e>
+                          </m:d>
+                        </m:e>
+                      </m:func>
+                      <m:r>
+                        <a:rPr lang="en-US" b="0" i="1" smtClean="0">
+                          <a:latin typeface="Cambria Math" panose="02040503050406030204" pitchFamily="18" charset="0"/>
+                        </a:rPr>
+                        <m:t>=</m:t>
+                      </m:r>
+                      <m:d>
+                        <m:dPr>
+                          <m:begChr m:val="{"/>
+                          <m:endChr m:val=""/>
+                          <m:ctrlPr>
+                            <a:rPr lang="en-US" b="0" i="1" smtClean="0">
+                              <a:latin typeface="Cambria Math" panose="02040503050406030204" pitchFamily="18" charset="0"/>
+                            </a:rPr>
+                          </m:ctrlPr>
+                        </m:dPr>
+                        <m:e>
+                          <m:m>
+                            <m:mPr>
+                              <m:mcs>
+                                <m:mc>
+                                  <m:mcPr>
+                                    <m:count m:val="2"/>
+                                    <m:mcJc m:val="center"/>
+                                  </m:mcPr>
+                                </m:mc>
+                              </m:mcs>
+                              <m:ctrlPr>
+                                <a:rPr lang="en-US" b="0" i="1" smtClean="0">
+                                  <a:latin typeface="Cambria Math" panose="02040503050406030204" pitchFamily="18" charset="0"/>
+                                </a:rPr>
+                              </m:ctrlPr>
+                            </m:mPr>
+                            <m:mr>
+                              <m:e>
+                                <m:sSub>
+                                  <m:sSubPr>
+                                    <m:ctrlPr>
+                                      <a:rPr lang="en-US" b="0" i="1" smtClean="0">
+                                        <a:latin typeface="Cambria Math" panose="02040503050406030204" pitchFamily="18" charset="0"/>
+                                      </a:rPr>
+                                    </m:ctrlPr>
+                                  </m:sSubPr>
+                                  <m:e>
+                                    <m:r>
+                                      <m:rPr>
+                                        <m:brk m:alnAt="7"/>
+                                      </m:rPr>
+                                      <a:rPr lang="en-US" b="0" i="1" smtClean="0">
+                                        <a:latin typeface="Cambria Math" panose="02040503050406030204" pitchFamily="18" charset="0"/>
+                                      </a:rPr>
+                                      <m:t>𝑝</m:t>
+                                    </m:r>
+                                  </m:e>
+                                  <m:sub>
+                                    <m:r>
+                                      <m:rPr>
+                                        <m:brk m:alnAt="7"/>
+                                      </m:rPr>
+                                      <a:rPr lang="en-US" b="0" i="1" smtClean="0">
+                                        <a:latin typeface="Cambria Math" panose="02040503050406030204" pitchFamily="18" charset="0"/>
+                                      </a:rPr>
+                                      <m:t>𝑖</m:t>
+                                    </m:r>
+                                  </m:sub>
+                                </m:sSub>
+                                <m:r>
+                                  <m:rPr>
+                                    <m:brk m:alnAt="7"/>
+                                  </m:rPr>
+                                  <a:rPr lang="en-US" b="0" i="0" smtClean="0">
+                                    <a:latin typeface="Cambria Math" panose="02040503050406030204" pitchFamily="18" charset="0"/>
+                                  </a:rPr>
+                                  <m:t>+</m:t>
+                                </m:r>
+                                <m:r>
+                                  <m:rPr>
+                                    <m:sty m:val="p"/>
+                                  </m:rPr>
+                                  <a:rPr lang="en-US" b="0" i="0" smtClean="0">
+                                    <a:latin typeface="Cambria Math" panose="02040503050406030204" pitchFamily="18" charset="0"/>
+                                  </a:rPr>
+                                  <m:t>Poisson</m:t>
+                                </m:r>
+                                <m:d>
+                                  <m:dPr>
+                                    <m:ctrlPr>
+                                      <a:rPr lang="en-US" b="0" i="1" smtClean="0">
+                                        <a:latin typeface="Cambria Math" panose="02040503050406030204" pitchFamily="18" charset="0"/>
+                                      </a:rPr>
+                                    </m:ctrlPr>
+                                  </m:dPr>
+                                  <m:e>
+                                    <m:r>
+                                      <a:rPr lang="en-US" b="0" i="1" smtClean="0">
+                                        <a:latin typeface="Cambria Math" panose="02040503050406030204" pitchFamily="18" charset="0"/>
+                                      </a:rPr>
+                                      <m:t>𝐶</m:t>
+                                    </m:r>
+                                    <m:r>
+                                      <a:rPr lang="en-US" b="0" i="1" smtClean="0">
+                                        <a:latin typeface="Cambria Math" panose="02040503050406030204" pitchFamily="18" charset="0"/>
+                                      </a:rPr>
+                                      <m:t>=</m:t>
+                                    </m:r>
+                                    <m:r>
+                                      <m:rPr>
+                                        <m:brk m:alnAt="7"/>
+                                      </m:rPr>
+                                      <a:rPr lang="en-US" b="0" i="1" smtClean="0">
+                                        <a:latin typeface="Cambria Math" panose="02040503050406030204" pitchFamily="18" charset="0"/>
+                                      </a:rPr>
+                                      <m:t>0</m:t>
+                                    </m:r>
+                                  </m:e>
+                                  <m:e>
+                                    <m:sSub>
+                                      <m:sSubPr>
+                                        <m:ctrlPr>
+                                          <a:rPr lang="en-US" b="0" i="1" smtClean="0">
+                                            <a:latin typeface="Cambria Math" panose="02040503050406030204" pitchFamily="18" charset="0"/>
+                                            <a:ea typeface="Cambria Math" panose="02040503050406030204" pitchFamily="18" charset="0"/>
+                                          </a:rPr>
+                                        </m:ctrlPr>
+                                      </m:sSubPr>
+                                      <m:e>
+                                        <m:r>
+                                          <m:rPr>
+                                            <m:brk m:alnAt="7"/>
+                                          </m:rPr>
+                                          <a:rPr lang="en-US" b="0" i="1" smtClean="0">
+                                            <a:latin typeface="Cambria Math" panose="02040503050406030204" pitchFamily="18" charset="0"/>
+                                            <a:ea typeface="Cambria Math" panose="02040503050406030204" pitchFamily="18" charset="0"/>
+                                          </a:rPr>
+                                          <m:t>𝜆</m:t>
+                                        </m:r>
+                                      </m:e>
+                                      <m:sub>
+                                        <m:r>
+                                          <m:rPr>
+                                            <m:brk m:alnAt="7"/>
+                                          </m:rPr>
+                                          <a:rPr lang="en-US" b="0" i="1" smtClean="0">
+                                            <a:latin typeface="Cambria Math" panose="02040503050406030204" pitchFamily="18" charset="0"/>
+                                            <a:ea typeface="Cambria Math" panose="02040503050406030204" pitchFamily="18" charset="0"/>
+                                          </a:rPr>
+                                          <m:t>𝑖</m:t>
+                                        </m:r>
+                                      </m:sub>
+                                    </m:sSub>
+                                  </m:e>
+                                </m:d>
+                              </m:e>
+                              <m:e>
+                                <m:r>
+                                  <m:rPr>
+                                    <m:sty m:val="p"/>
+                                  </m:rPr>
+                                  <a:rPr lang="en-US" b="0" i="0" smtClean="0">
+                                    <a:latin typeface="Cambria Math" panose="02040503050406030204" pitchFamily="18" charset="0"/>
+                                  </a:rPr>
+                                  <m:t>if</m:t>
+                                </m:r>
+                                <m:r>
+                                  <a:rPr lang="en-US" b="0" i="1" smtClean="0">
+                                    <a:latin typeface="Cambria Math" panose="02040503050406030204" pitchFamily="18" charset="0"/>
+                                  </a:rPr>
+                                  <m:t> </m:t>
+                                </m:r>
+                                <m:sSub>
+                                  <m:sSubPr>
+                                    <m:ctrlPr>
+                                      <a:rPr lang="en-US" b="0" i="1" smtClean="0">
+                                        <a:latin typeface="Cambria Math" panose="02040503050406030204" pitchFamily="18" charset="0"/>
+                                      </a:rPr>
+                                    </m:ctrlPr>
+                                  </m:sSubPr>
+                                  <m:e>
+                                    <m:r>
+                                      <a:rPr lang="en-US" b="0" i="1" smtClean="0">
+                                        <a:latin typeface="Cambria Math" panose="02040503050406030204" pitchFamily="18" charset="0"/>
+                                      </a:rPr>
+                                      <m:t>𝑐</m:t>
+                                    </m:r>
+                                  </m:e>
+                                  <m:sub>
+                                    <m:r>
+                                      <a:rPr lang="en-US" b="0" i="1" smtClean="0">
+                                        <a:latin typeface="Cambria Math" panose="02040503050406030204" pitchFamily="18" charset="0"/>
+                                      </a:rPr>
+                                      <m:t>𝑖</m:t>
+                                    </m:r>
+                                  </m:sub>
+                                </m:sSub>
+                                <m:r>
+                                  <a:rPr lang="en-US" b="0" i="0" smtClean="0">
+                                    <a:latin typeface="Cambria Math" panose="02040503050406030204" pitchFamily="18" charset="0"/>
+                                  </a:rPr>
+                                  <m:t>=0</m:t>
+                                </m:r>
+                              </m:e>
+                            </m:mr>
+                            <m:mr>
+                              <m:e>
+                                <m:r>
+                                  <a:rPr lang="en-US" b="0" i="1" smtClean="0">
+                                    <a:latin typeface="Cambria Math" panose="02040503050406030204" pitchFamily="18" charset="0"/>
+                                  </a:rPr>
+                                  <m:t>(1−</m:t>
+                                </m:r>
+                                <m:sSub>
+                                  <m:sSubPr>
+                                    <m:ctrlPr>
+                                      <a:rPr lang="en-US" b="0" i="1" smtClean="0">
+                                        <a:latin typeface="Cambria Math" panose="02040503050406030204" pitchFamily="18" charset="0"/>
+                                      </a:rPr>
+                                    </m:ctrlPr>
+                                  </m:sSubPr>
+                                  <m:e>
+                                    <m:r>
+                                      <a:rPr lang="en-US" b="0" i="1" smtClean="0">
+                                        <a:latin typeface="Cambria Math" panose="02040503050406030204" pitchFamily="18" charset="0"/>
+                                      </a:rPr>
+                                      <m:t>𝑝</m:t>
+                                    </m:r>
+                                  </m:e>
+                                  <m:sub>
+                                    <m:r>
+                                      <a:rPr lang="en-US" b="0" i="1" smtClean="0">
+                                        <a:latin typeface="Cambria Math" panose="02040503050406030204" pitchFamily="18" charset="0"/>
+                                      </a:rPr>
+                                      <m:t>𝑖</m:t>
+                                    </m:r>
+                                  </m:sub>
+                                </m:sSub>
+                                <m:r>
+                                  <a:rPr lang="en-US" b="0" i="1" smtClean="0">
+                                    <a:latin typeface="Cambria Math" panose="02040503050406030204" pitchFamily="18" charset="0"/>
+                                  </a:rPr>
+                                  <m:t>)×</m:t>
+                                </m:r>
+                                <m:r>
+                                  <m:rPr>
+                                    <m:sty m:val="p"/>
+                                    <m:brk m:alnAt="7"/>
+                                  </m:rPr>
+                                  <a:rPr lang="en-US">
+                                    <a:latin typeface="Cambria Math" panose="02040503050406030204" pitchFamily="18" charset="0"/>
+                                  </a:rPr>
+                                  <m:t>P</m:t>
+                                </m:r>
+                                <m:r>
+                                  <m:rPr>
+                                    <m:sty m:val="p"/>
+                                  </m:rPr>
+                                  <a:rPr lang="en-US">
+                                    <a:latin typeface="Cambria Math" panose="02040503050406030204" pitchFamily="18" charset="0"/>
+                                  </a:rPr>
+                                  <m:t>oisson</m:t>
+                                </m:r>
+                                <m:d>
+                                  <m:dPr>
+                                    <m:ctrlPr>
+                                      <a:rPr lang="en-US" i="1">
+                                        <a:latin typeface="Cambria Math" panose="02040503050406030204" pitchFamily="18" charset="0"/>
+                                      </a:rPr>
+                                    </m:ctrlPr>
+                                  </m:dPr>
+                                  <m:e>
+                                    <m:r>
+                                      <a:rPr lang="en-US" b="0" i="1" smtClean="0">
+                                        <a:latin typeface="Cambria Math" panose="02040503050406030204" pitchFamily="18" charset="0"/>
+                                      </a:rPr>
+                                      <m:t>𝐶</m:t>
+                                    </m:r>
+                                    <m:r>
+                                      <a:rPr lang="en-US" b="0" i="1" smtClean="0">
+                                        <a:latin typeface="Cambria Math" panose="02040503050406030204" pitchFamily="18" charset="0"/>
+                                      </a:rPr>
+                                      <m:t>=</m:t>
+                                    </m:r>
+                                    <m:sSub>
+                                      <m:sSubPr>
+                                        <m:ctrlPr>
+                                          <a:rPr lang="en-US" b="0" i="1" smtClean="0">
+                                            <a:latin typeface="Cambria Math" panose="02040503050406030204" pitchFamily="18" charset="0"/>
+                                          </a:rPr>
+                                        </m:ctrlPr>
+                                      </m:sSubPr>
+                                      <m:e>
+                                        <m:r>
+                                          <a:rPr lang="en-US" b="0" i="1" smtClean="0">
+                                            <a:latin typeface="Cambria Math" panose="02040503050406030204" pitchFamily="18" charset="0"/>
+                                          </a:rPr>
+                                          <m:t>𝑐</m:t>
+                                        </m:r>
+                                      </m:e>
+                                      <m:sub>
+                                        <m:r>
+                                          <a:rPr lang="en-US" b="0" i="1" smtClean="0">
+                                            <a:latin typeface="Cambria Math" panose="02040503050406030204" pitchFamily="18" charset="0"/>
+                                          </a:rPr>
+                                          <m:t>𝑖</m:t>
+                                        </m:r>
+                                      </m:sub>
+                                    </m:sSub>
+                                  </m:e>
+                                  <m:e>
+                                    <m:sSub>
+                                      <m:sSubPr>
+                                        <m:ctrlPr>
+                                          <a:rPr lang="en-US" i="1">
+                                            <a:latin typeface="Cambria Math" panose="02040503050406030204" pitchFamily="18" charset="0"/>
+                                            <a:ea typeface="Cambria Math" panose="02040503050406030204" pitchFamily="18" charset="0"/>
+                                          </a:rPr>
+                                        </m:ctrlPr>
+                                      </m:sSubPr>
+                                      <m:e>
+                                        <m:r>
+                                          <m:rPr>
+                                            <m:brk m:alnAt="7"/>
+                                          </m:rPr>
+                                          <a:rPr lang="en-US" i="1">
+                                            <a:latin typeface="Cambria Math" panose="02040503050406030204" pitchFamily="18" charset="0"/>
+                                            <a:ea typeface="Cambria Math" panose="02040503050406030204" pitchFamily="18" charset="0"/>
+                                          </a:rPr>
+                                          <m:t>𝜆</m:t>
+                                        </m:r>
+                                      </m:e>
+                                      <m:sub>
+                                        <m:r>
+                                          <m:rPr>
+                                            <m:brk m:alnAt="7"/>
+                                          </m:rPr>
+                                          <a:rPr lang="en-US" i="1">
+                                            <a:latin typeface="Cambria Math" panose="02040503050406030204" pitchFamily="18" charset="0"/>
+                                            <a:ea typeface="Cambria Math" panose="02040503050406030204" pitchFamily="18" charset="0"/>
+                                          </a:rPr>
+                                          <m:t>𝑖</m:t>
+                                        </m:r>
+                                      </m:sub>
+                                    </m:sSub>
+                                  </m:e>
+                                </m:d>
+                              </m:e>
+                              <m:e>
+                                <m:r>
+                                  <m:rPr>
+                                    <m:sty m:val="p"/>
+                                  </m:rPr>
+                                  <a:rPr lang="en-US">
+                                    <a:latin typeface="Cambria Math" panose="02040503050406030204" pitchFamily="18" charset="0"/>
+                                  </a:rPr>
+                                  <m:t>if</m:t>
+                                </m:r>
+                                <m:r>
+                                  <a:rPr lang="en-US" i="1">
+                                    <a:latin typeface="Cambria Math" panose="02040503050406030204" pitchFamily="18" charset="0"/>
+                                  </a:rPr>
+                                  <m:t> </m:t>
+                                </m:r>
+                                <m:sSub>
+                                  <m:sSubPr>
+                                    <m:ctrlPr>
+                                      <a:rPr lang="en-US" b="0" i="1" smtClean="0">
+                                        <a:latin typeface="Cambria Math" panose="02040503050406030204" pitchFamily="18" charset="0"/>
+                                      </a:rPr>
+                                    </m:ctrlPr>
+                                  </m:sSubPr>
+                                  <m:e>
+                                    <m:r>
+                                      <a:rPr lang="en-US" b="0" i="1" smtClean="0">
+                                        <a:latin typeface="Cambria Math" panose="02040503050406030204" pitchFamily="18" charset="0"/>
+                                      </a:rPr>
+                                      <m:t>𝑐</m:t>
+                                    </m:r>
+                                  </m:e>
+                                  <m:sub>
+                                    <m:r>
+                                      <a:rPr lang="en-US" b="0" i="1" smtClean="0">
+                                        <a:latin typeface="Cambria Math" panose="02040503050406030204" pitchFamily="18" charset="0"/>
+                                      </a:rPr>
+                                      <m:t>𝑖</m:t>
+                                    </m:r>
+                                  </m:sub>
+                                </m:sSub>
+                                <m:r>
+                                  <a:rPr lang="en-US" b="0" i="0" smtClean="0">
+                                    <a:latin typeface="Cambria Math" panose="02040503050406030204" pitchFamily="18" charset="0"/>
+                                  </a:rPr>
+                                  <m:t>&gt;</m:t>
+                                </m:r>
+                                <m:r>
+                                  <a:rPr lang="en-US">
+                                    <a:latin typeface="Cambria Math" panose="02040503050406030204" pitchFamily="18" charset="0"/>
+                                  </a:rPr>
+                                  <m:t>0</m:t>
+                                </m:r>
+                              </m:e>
+                            </m:mr>
+                          </m:m>
+                        </m:e>
+                      </m:d>
+                    </m:oMath>
+                  </m:oMathPara>
+                </a14:m>
+                <a:endParaRPr lang="en-US" dirty="0" smtClean="0"/>
+              </a:p>
+              <a:p>
+                <a:pPr lvl="1"/>
                 <a:r>
                   <a:rPr lang="en-US" dirty="0" smtClean="0"/>
-                  <a:t>models</a:t>
+                  <a:t>Where </a:t>
+                </a:r>
+                <a14:m>
+                  <m:oMath xmlns:m="http://schemas.openxmlformats.org/officeDocument/2006/math">
+                    <m:sSub>
+                      <m:sSubPr>
+                        <m:ctrlPr>
+                          <a:rPr lang="en-US" b="0" i="1" smtClean="0">
+                            <a:latin typeface="Cambria Math" panose="02040503050406030204" pitchFamily="18" charset="0"/>
+                          </a:rPr>
+                        </m:ctrlPr>
+                      </m:sSubPr>
+                      <m:e>
+                        <m:r>
+                          <m:rPr>
+                            <m:brk m:alnAt="7"/>
+                          </m:rPr>
+                          <a:rPr lang="en-US" i="1">
+                            <a:latin typeface="Cambria Math" panose="02040503050406030204" pitchFamily="18" charset="0"/>
+                          </a:rPr>
+                          <m:t>𝑝</m:t>
+                        </m:r>
+                      </m:e>
+                      <m:sub>
+                        <m:r>
+                          <a:rPr lang="en-US" b="0" i="1" smtClean="0">
+                            <a:latin typeface="Cambria Math" panose="02040503050406030204" pitchFamily="18" charset="0"/>
+                          </a:rPr>
+                          <m:t>𝑖</m:t>
+                        </m:r>
+                      </m:sub>
+                    </m:sSub>
+                  </m:oMath>
+                </a14:m>
+                <a:r>
+                  <a:rPr lang="en-US" dirty="0" smtClean="0"/>
+                  <a:t> is the probability of sampling outside occupied habitat</a:t>
+                </a:r>
+              </a:p>
+              <a:p>
+                <a:pPr lvl="2"/>
+                <a:r>
+                  <a:rPr lang="en-US" dirty="0" smtClean="0"/>
+                  <a:t>“True zero”</a:t>
+                </a:r>
+              </a:p>
+              <a:p>
+                <a:pPr lvl="1"/>
+                <a14:m>
+                  <m:oMath xmlns:m="http://schemas.openxmlformats.org/officeDocument/2006/math">
+                    <m:r>
+                      <m:rPr>
+                        <m:sty m:val="p"/>
+                        <m:brk m:alnAt="7"/>
+                      </m:rPr>
+                      <a:rPr lang="en-US">
+                        <a:latin typeface="Cambria Math" panose="02040503050406030204" pitchFamily="18" charset="0"/>
+                      </a:rPr>
+                      <m:t>P</m:t>
+                    </m:r>
+                    <m:r>
+                      <m:rPr>
+                        <m:sty m:val="p"/>
+                      </m:rPr>
+                      <a:rPr lang="en-US">
+                        <a:latin typeface="Cambria Math" panose="02040503050406030204" pitchFamily="18" charset="0"/>
+                      </a:rPr>
+                      <m:t>oisson</m:t>
+                    </m:r>
+                    <m:d>
+                      <m:dPr>
+                        <m:ctrlPr>
+                          <a:rPr lang="en-US" i="1">
+                            <a:latin typeface="Cambria Math" panose="02040503050406030204" pitchFamily="18" charset="0"/>
+                          </a:rPr>
+                        </m:ctrlPr>
+                      </m:dPr>
+                      <m:e>
+                        <m:r>
+                          <a:rPr lang="en-US" b="0" i="1" smtClean="0">
+                            <a:latin typeface="Cambria Math" panose="02040503050406030204" pitchFamily="18" charset="0"/>
+                          </a:rPr>
+                          <m:t>𝐶</m:t>
+                        </m:r>
+                        <m:r>
+                          <a:rPr lang="en-US" b="0" i="1" smtClean="0">
+                            <a:latin typeface="Cambria Math" panose="02040503050406030204" pitchFamily="18" charset="0"/>
+                          </a:rPr>
+                          <m:t>=</m:t>
+                        </m:r>
+                        <m:r>
+                          <m:rPr>
+                            <m:brk m:alnAt="7"/>
+                          </m:rPr>
+                          <a:rPr lang="en-US" i="1">
+                            <a:latin typeface="Cambria Math" panose="02040503050406030204" pitchFamily="18" charset="0"/>
+                          </a:rPr>
+                          <m:t>0</m:t>
+                        </m:r>
+                      </m:e>
+                      <m:e>
+                        <m:sSub>
+                          <m:sSubPr>
+                            <m:ctrlPr>
+                              <a:rPr lang="en-US" b="0" i="1" smtClean="0">
+                                <a:latin typeface="Cambria Math" panose="02040503050406030204" pitchFamily="18" charset="0"/>
+                                <a:ea typeface="Cambria Math" panose="02040503050406030204" pitchFamily="18" charset="0"/>
+                              </a:rPr>
+                            </m:ctrlPr>
+                          </m:sSubPr>
+                          <m:e>
+                            <m:r>
+                              <m:rPr>
+                                <m:brk m:alnAt="7"/>
+                              </m:rPr>
+                              <a:rPr lang="en-US" i="1">
+                                <a:latin typeface="Cambria Math" panose="02040503050406030204" pitchFamily="18" charset="0"/>
+                                <a:ea typeface="Cambria Math" panose="02040503050406030204" pitchFamily="18" charset="0"/>
+                              </a:rPr>
+                              <m:t>𝜆</m:t>
+                            </m:r>
+                          </m:e>
+                          <m:sub>
+                            <m:r>
+                              <m:rPr>
+                                <m:brk m:alnAt="7"/>
+                              </m:rPr>
+                              <a:rPr lang="en-US" b="0" i="1" smtClean="0">
+                                <a:latin typeface="Cambria Math" panose="02040503050406030204" pitchFamily="18" charset="0"/>
+                                <a:ea typeface="Cambria Math" panose="02040503050406030204" pitchFamily="18" charset="0"/>
+                              </a:rPr>
+                              <m:t>𝑖</m:t>
+                            </m:r>
+                          </m:sub>
+                        </m:sSub>
+                      </m:e>
+                    </m:d>
+                  </m:oMath>
+                </a14:m>
+                <a:r>
+                  <a:rPr lang="en-US" dirty="0" smtClean="0"/>
+                  <a:t> is the probability of sampling in occupied habitat, but encountering zero individuals</a:t>
+                </a:r>
+              </a:p>
+              <a:p>
+                <a:pPr lvl="2"/>
+                <a:r>
+                  <a:rPr lang="en-US" dirty="0" smtClean="0"/>
+                  <a:t>“False zero”</a:t>
+                </a:r>
+              </a:p>
+            </p:txBody>
+          </p:sp>
+        </mc:Choice>
+        <mc:Fallback xmlns="">
+          <p:sp>
+            <p:nvSpPr>
+              <p:cNvPr id="3" name="Content Placeholder 2"/>
+              <p:cNvSpPr>
+                <a:spLocks noGrp="1" noRot="1" noChangeAspect="1" noMove="1" noResize="1" noEditPoints="1" noAdjustHandles="1" noChangeArrowheads="1" noChangeShapeType="1" noTextEdit="1"/>
+              </p:cNvSpPr>
+              <p:nvPr>
+                <p:ph idx="1"/>
+              </p:nvPr>
+            </p:nvSpPr>
+            <p:spPr>
+              <a:blipFill>
+                <a:blip r:embed="rId2"/>
+                <a:stretch>
+                  <a:fillRect l="-1424" t="-1026"/>
+                </a:stretch>
+              </a:blipFill>
+            </p:spPr>
+            <p:txBody>
+              <a:bodyPr/>
+              <a:lstStyle/>
+              <a:p>
+                <a:r>
+                  <a:rPr lang="en-GB">
+                    <a:noFill/>
+                  </a:rPr>
+                  <a:t> </a:t>
+                </a:r>
+              </a:p>
+            </p:txBody>
+          </p:sp>
+        </mc:Fallback>
+      </mc:AlternateContent>
+    </p:spTree>
+    <p:extLst>
+      <p:ext uri="{BB962C8B-B14F-4D97-AF65-F5344CB8AC3E}">
+        <p14:creationId xmlns:p14="http://schemas.microsoft.com/office/powerpoint/2010/main" val="3157020095"/>
+      </p:ext>
+    </p:extLst>
+  </p:cSld>
+  <p:clrMapOvr>
+    <a:masterClrMapping/>
+  </p:clrMapOvr>
+  <p:timing>
+    <p:tnLst>
+      <p:par>
+        <p:cTn id="1" dur="indefinite" restart="never" nodeType="tmRoot"/>
+      </p:par>
+    </p:tnLst>
+  </p:timing>
+</p:sld>
+</file>
+
+<file path=ppt/slides/slide11.xml><?xml version="1.0" encoding="utf-8"?>
+<p:sld xmlns:a="http://schemas.openxmlformats.org/drawingml/2006/main" xmlns:r="http://schemas.openxmlformats.org/officeDocument/2006/relationships" xmlns:p="http://schemas.openxmlformats.org/presentationml/2006/main">
+  <p:cSld>
+    <p:spTree>
+      <p:nvGrpSpPr>
+        <p:cNvPr id="1" name=""/>
+        <p:cNvGrpSpPr/>
+        <p:nvPr/>
+      </p:nvGrpSpPr>
+      <p:grpSpPr>
+        <a:xfrm>
+          <a:off x="0" y="0"/>
+          <a:ext cx="0" cy="0"/>
+          <a:chOff x="0" y="0"/>
+          <a:chExt cx="0" cy="0"/>
+        </a:xfrm>
+      </p:grpSpPr>
+      <p:sp>
+        <p:nvSpPr>
+          <p:cNvPr id="2" name="Title 1"/>
+          <p:cNvSpPr>
+            <a:spLocks noGrp="1"/>
+          </p:cNvSpPr>
+          <p:nvPr>
+            <p:ph type="title"/>
+          </p:nvPr>
+        </p:nvSpPr>
+        <p:spPr/>
+        <p:txBody>
+          <a:bodyPr/>
+          <a:lstStyle/>
+          <a:p>
+            <a:endParaRPr lang="en-GB"/>
+          </a:p>
+        </p:txBody>
+      </p:sp>
+      <mc:AlternateContent xmlns:mc="http://schemas.openxmlformats.org/markup-compatibility/2006" xmlns:a14="http://schemas.microsoft.com/office/drawing/2010/main">
+        <mc:Choice Requires="a14">
+          <p:sp>
+            <p:nvSpPr>
+              <p:cNvPr id="3" name="Content Placeholder 2"/>
+              <p:cNvSpPr>
+                <a:spLocks noGrp="1"/>
+              </p:cNvSpPr>
+              <p:nvPr>
+                <p:ph idx="1"/>
+              </p:nvPr>
+            </p:nvSpPr>
+            <p:spPr/>
+            <p:txBody>
+              <a:bodyPr>
+                <a:normAutofit/>
+              </a:bodyPr>
+              <a:lstStyle/>
+              <a:p>
+                <a:pPr marL="0" indent="0">
+                  <a:buNone/>
+                </a:pPr>
+                <a:r>
+                  <a:rPr lang="en-US" dirty="0" smtClean="0"/>
+                  <a:t>Counts:  Zero-adjusted models</a:t>
                 </a:r>
               </a:p>
               <a:p>
@@ -4146,11 +4906,7 @@
                 </a14:m>
                 <a:r>
                   <a:rPr lang="en-US" dirty="0" smtClean="0"/>
-                  <a:t> is the probability of </a:t>
-                </a:r>
-                <a:r>
-                  <a:rPr lang="en-US" dirty="0" smtClean="0"/>
-                  <a:t>a zero</a:t>
+                  <a:t> is the probability of a zero</a:t>
                 </a:r>
               </a:p>
               <a:p>
@@ -4590,7 +5346,7 @@
             </p:txBody>
           </p:sp>
         </mc:Choice>
-        <mc:Fallback>
+        <mc:Fallback xmlns="">
           <p:sp>
             <p:nvSpPr>
               <p:cNvPr id="3" name="Content Placeholder 2"/>
@@ -4644,7 +5400,7 @@
 </p:sld>
 </file>
 
-<file path=ppt/slides/slide11.xml><?xml version="1.0" encoding="utf-8"?>
+<file path=ppt/slides/slide12.xml><?xml version="1.0" encoding="utf-8"?>
 <p:sld xmlns:a="http://schemas.openxmlformats.org/drawingml/2006/main" xmlns:r="http://schemas.openxmlformats.org/officeDocument/2006/relationships" xmlns:p="http://schemas.openxmlformats.org/presentationml/2006/main">
   <p:cSld>
     <p:spTree>
@@ -4680,8 +5436,8 @@
           </a:p>
         </p:txBody>
       </p:sp>
-      <mc:AlternateContent xmlns:mc="http://schemas.openxmlformats.org/markup-compatibility/2006">
-        <mc:Choice xmlns:a14="http://schemas.microsoft.com/office/drawing/2010/main" Requires="a14">
+      <mc:AlternateContent xmlns:mc="http://schemas.openxmlformats.org/markup-compatibility/2006" xmlns:a14="http://schemas.microsoft.com/office/drawing/2010/main">
+        <mc:Choice Requires="a14">
           <p:sp>
             <p:nvSpPr>
               <p:cNvPr id="3" name="Content Placeholder 2"/>
@@ -4704,11 +5460,7 @@
                 </a:pPr>
                 <a:r>
                   <a:rPr lang="en-US" dirty="0" smtClean="0"/>
-                  <a:t>Biomass:  Tweedie </a:t>
-                </a:r>
-                <a:r>
-                  <a:rPr lang="en-US" dirty="0" smtClean="0"/>
-                  <a:t>distribution</a:t>
+                  <a:t>Biomass:  Tweedie distribution</a:t>
                 </a:r>
               </a:p>
               <a:p>
@@ -5282,13 +6034,7 @@
                                       <a:rPr lang="en-US" i="1">
                                         <a:latin typeface="Cambria Math" panose="02040503050406030204" pitchFamily="18" charset="0"/>
                                       </a:rPr>
-                                      <m:t>=</m:t>
-                                    </m:r>
-                                    <m:r>
-                                      <a:rPr lang="en-US" i="1">
-                                        <a:latin typeface="Cambria Math" panose="02040503050406030204" pitchFamily="18" charset="0"/>
-                                      </a:rPr>
-                                      <m:t>1</m:t>
+                                      <m:t>=1</m:t>
                                     </m:r>
                                   </m:sub>
                                   <m:sup>
@@ -5381,7 +6127,7 @@
             </p:txBody>
           </p:sp>
         </mc:Choice>
-        <mc:Fallback>
+        <mc:Fallback xmlns="">
           <p:sp>
             <p:nvSpPr>
               <p:cNvPr id="3" name="Content Placeholder 2"/>
@@ -5435,7 +6181,7 @@
 </p:sld>
 </file>
 
-<file path=ppt/slides/slide12.xml><?xml version="1.0" encoding="utf-8"?>
+<file path=ppt/slides/slide13.xml><?xml version="1.0" encoding="utf-8"?>
 <p:sld xmlns:a="http://schemas.openxmlformats.org/drawingml/2006/main" xmlns:r="http://schemas.openxmlformats.org/officeDocument/2006/relationships" xmlns:p="http://schemas.openxmlformats.org/presentationml/2006/main">
   <p:cSld>
     <p:spTree>
@@ -5471,8 +6217,8 @@
           </a:p>
         </p:txBody>
       </p:sp>
-      <mc:AlternateContent xmlns:mc="http://schemas.openxmlformats.org/markup-compatibility/2006">
-        <mc:Choice xmlns:a14="http://schemas.microsoft.com/office/drawing/2010/main" Requires="a14">
+      <mc:AlternateContent xmlns:mc="http://schemas.openxmlformats.org/markup-compatibility/2006" xmlns:a14="http://schemas.microsoft.com/office/drawing/2010/main">
+        <mc:Choice Requires="a14">
           <p:sp>
             <p:nvSpPr>
               <p:cNvPr id="3" name="Content Placeholder 2"/>
@@ -5504,7 +6250,6 @@
                   <a:rPr lang="en-US" dirty="0" smtClean="0"/>
                   <a:t>Probability of having zero catch is the same as a Poisson or Tweedie distribution:</a:t>
                 </a:r>
-                <a:endParaRPr lang="en-US" dirty="0" smtClean="0"/>
               </a:p>
               <a:p>
                 <a:pPr marL="457200" lvl="1" indent="0">
@@ -5683,11 +6428,7 @@
                 <a:pPr lvl="1"/>
                 <a:r>
                   <a:rPr lang="en-US" dirty="0" smtClean="0"/>
-                  <a:t>… </a:t>
-                </a:r>
-                <a:r>
-                  <a:rPr lang="en-US" dirty="0" smtClean="0"/>
-                  <a:t>and catches follow a delta-model:</a:t>
+                  <a:t>… and catches follow a delta-model:</a:t>
                 </a:r>
               </a:p>
               <a:p>
@@ -6043,13 +6784,7 @@
                                   <a:rPr lang="en-US">
                                     <a:latin typeface="Cambria Math" panose="02040503050406030204" pitchFamily="18" charset="0"/>
                                   </a:rPr>
-                                  <m:t>&gt;</m:t>
-                                </m:r>
-                                <m:r>
-                                  <a:rPr lang="en-US">
-                                    <a:latin typeface="Cambria Math" panose="02040503050406030204" pitchFamily="18" charset="0"/>
-                                  </a:rPr>
-                                  <m:t>0</m:t>
+                                  <m:t>&gt;0</m:t>
                                 </m:r>
                               </m:e>
                             </m:mr>
@@ -6299,7 +7034,7 @@
             </p:txBody>
           </p:sp>
         </mc:Choice>
-        <mc:Fallback>
+        <mc:Fallback xmlns="">
           <p:sp>
             <p:nvSpPr>
               <p:cNvPr id="3" name="Content Placeholder 2"/>
@@ -6353,7 +7088,7 @@
 </p:sld>
 </file>
 
-<file path=ppt/slides/slide13.xml><?xml version="1.0" encoding="utf-8"?>
+<file path=ppt/slides/slide14.xml><?xml version="1.0" encoding="utf-8"?>
 <p:sld xmlns:a="http://schemas.openxmlformats.org/drawingml/2006/main" xmlns:r="http://schemas.openxmlformats.org/officeDocument/2006/relationships" xmlns:p="http://schemas.openxmlformats.org/presentationml/2006/main">
   <p:cSld>
     <p:spTree>
@@ -6422,8 +7157,8 @@
           </a:p>
         </p:txBody>
       </p:sp>
-      <mc:AlternateContent xmlns:mc="http://schemas.openxmlformats.org/markup-compatibility/2006">
-        <mc:Choice xmlns:a14="http://schemas.microsoft.com/office/drawing/2010/main" Requires="a14">
+      <mc:AlternateContent xmlns:mc="http://schemas.openxmlformats.org/markup-compatibility/2006" xmlns:a14="http://schemas.microsoft.com/office/drawing/2010/main">
+        <mc:Choice Requires="a14">
           <p:graphicFrame>
             <p:nvGraphicFramePr>
               <p:cNvPr id="4" name="Table 3"/>
@@ -6588,6 +7323,7 @@
                           </a:r>
                         </a:p>
                         <a:p>
+                          <a:pPr/>
                           <a14:m>
                             <m:oMathPara xmlns:m="http://schemas.openxmlformats.org/officeDocument/2006/math">
                               <m:oMathParaPr>
@@ -6677,6 +7413,7 @@
                           </a:r>
                         </a:p>
                         <a:p>
+                          <a:pPr/>
                           <a14:m>
                             <m:oMathPara xmlns:m="http://schemas.openxmlformats.org/officeDocument/2006/math">
                               <m:oMathParaPr>
@@ -6811,6 +7548,7 @@
                           </a:r>
                         </a:p>
                         <a:p>
+                          <a:pPr/>
                           <a14:m>
                             <m:oMathPara xmlns:m="http://schemas.openxmlformats.org/officeDocument/2006/math">
                               <m:oMathParaPr>
@@ -6900,6 +7638,7 @@
                           </a:r>
                         </a:p>
                         <a:p>
+                          <a:pPr/>
                           <a14:m>
                             <m:oMathPara xmlns:m="http://schemas.openxmlformats.org/officeDocument/2006/math">
                               <m:oMathParaPr>
@@ -7378,7 +8117,7 @@
             </a:graphic>
           </p:graphicFrame>
         </mc:Choice>
-        <mc:Fallback>
+        <mc:Fallback xmlns="">
           <p:graphicFrame>
             <p:nvGraphicFramePr>
               <p:cNvPr id="4" name="Table 3"/>
@@ -7779,7 +8518,7 @@
 </p:sld>
 </file>
 
-<file path=ppt/slides/slide14.xml><?xml version="1.0" encoding="utf-8"?>
+<file path=ppt/slides/slide15.xml><?xml version="1.0" encoding="utf-8"?>
 <p:sld xmlns:a="http://schemas.openxmlformats.org/drawingml/2006/main" xmlns:r="http://schemas.openxmlformats.org/officeDocument/2006/relationships" xmlns:p="http://schemas.openxmlformats.org/presentationml/2006/main">
   <p:cSld>
     <p:spTree>
@@ -7815,8 +8554,8 @@
           </a:p>
         </p:txBody>
       </p:sp>
-      <mc:AlternateContent xmlns:mc="http://schemas.openxmlformats.org/markup-compatibility/2006">
-        <mc:Choice xmlns:a14="http://schemas.microsoft.com/office/drawing/2010/main" Requires="a14">
+      <mc:AlternateContent xmlns:mc="http://schemas.openxmlformats.org/markup-compatibility/2006" xmlns:a14="http://schemas.microsoft.com/office/drawing/2010/main">
+        <mc:Choice Requires="a14">
           <p:sp>
             <p:nvSpPr>
               <p:cNvPr id="3" name="Content Placeholder 2"/>
@@ -7847,7 +8586,6 @@
                   <a:rPr lang="en-US" dirty="0" smtClean="0"/>
                   <a:t>Example: delta-model</a:t>
                 </a:r>
-                <a:endParaRPr lang="en-US" dirty="0" smtClean="0"/>
               </a:p>
               <a:p>
                 <a:pPr marL="0" indent="0">
@@ -8427,14 +9165,7 @@
                           <a:latin typeface="Cambria Math" panose="02040503050406030204" pitchFamily="18" charset="0"/>
                           <a:ea typeface="Cambria Math" panose="02040503050406030204" pitchFamily="18" charset="0"/>
                         </a:rPr>
-                        <m:t>)</m:t>
-                      </m:r>
-                      <m:r>
-                        <a:rPr lang="en-US" sz="2200" b="0" i="1" smtClean="0">
-                          <a:latin typeface="Cambria Math" panose="02040503050406030204" pitchFamily="18" charset="0"/>
-                          <a:ea typeface="Cambria Math" panose="02040503050406030204" pitchFamily="18" charset="0"/>
-                        </a:rPr>
-                        <m:t>+</m:t>
+                        <m:t>)+</m:t>
                       </m:r>
                       <m:sSub>
                         <m:sSubPr>
@@ -9734,7 +10465,7 @@
             </p:txBody>
           </p:sp>
         </mc:Choice>
-        <mc:Fallback>
+        <mc:Fallback xmlns="">
           <p:sp>
             <p:nvSpPr>
               <p:cNvPr id="3" name="Content Placeholder 2"/>
@@ -9788,7 +10519,7 @@
 </p:sld>
 </file>
 
-<file path=ppt/slides/slide15.xml><?xml version="1.0" encoding="utf-8"?>
+<file path=ppt/slides/slide16.xml><?xml version="1.0" encoding="utf-8"?>
 <p:sld xmlns:a="http://schemas.openxmlformats.org/drawingml/2006/main" xmlns:r="http://schemas.openxmlformats.org/officeDocument/2006/relationships" xmlns:p="http://schemas.openxmlformats.org/presentationml/2006/main">
   <p:cSld>
     <p:spTree>
@@ -9824,8 +10555,8 @@
           </a:p>
         </p:txBody>
       </p:sp>
-      <mc:AlternateContent xmlns:mc="http://schemas.openxmlformats.org/markup-compatibility/2006">
-        <mc:Choice xmlns:a14="http://schemas.microsoft.com/office/drawing/2010/main" Requires="a14">
+      <mc:AlternateContent xmlns:mc="http://schemas.openxmlformats.org/markup-compatibility/2006" xmlns:a14="http://schemas.microsoft.com/office/drawing/2010/main">
+        <mc:Choice Requires="a14">
           <p:sp>
             <p:nvSpPr>
               <p:cNvPr id="3" name="Content Placeholder 2"/>
@@ -9850,7 +10581,6 @@
                   <a:rPr lang="en-US" dirty="0" smtClean="0"/>
                   <a:t>Predict density at all modeled locations and times</a:t>
                 </a:r>
-                <a:endParaRPr lang="en-US" dirty="0" smtClean="0"/>
               </a:p>
               <a:p>
                 <a:pPr lvl="1"/>
@@ -11037,7 +11767,7 @@
             </p:txBody>
           </p:sp>
         </mc:Choice>
-        <mc:Fallback>
+        <mc:Fallback xmlns="">
           <p:sp>
             <p:nvSpPr>
               <p:cNvPr id="3" name="Content Placeholder 2"/>
@@ -11091,7 +11821,7 @@
 </p:sld>
 </file>
 
-<file path=ppt/slides/slide16.xml><?xml version="1.0" encoding="utf-8"?>
+<file path=ppt/slides/slide17.xml><?xml version="1.0" encoding="utf-8"?>
 <p:sld xmlns:a="http://schemas.openxmlformats.org/drawingml/2006/main" xmlns:r="http://schemas.openxmlformats.org/officeDocument/2006/relationships" xmlns:p="http://schemas.openxmlformats.org/presentationml/2006/main">
   <p:cSld>
     <p:spTree>
@@ -11127,8 +11857,8 @@
           </a:p>
         </p:txBody>
       </p:sp>
-      <mc:AlternateContent xmlns:mc="http://schemas.openxmlformats.org/markup-compatibility/2006">
-        <mc:Choice xmlns:a14="http://schemas.microsoft.com/office/drawing/2010/main" Requires="a14">
+      <mc:AlternateContent xmlns:mc="http://schemas.openxmlformats.org/markup-compatibility/2006" xmlns:a14="http://schemas.microsoft.com/office/drawing/2010/main">
+        <mc:Choice Requires="a14">
           <p:sp>
             <p:nvSpPr>
               <p:cNvPr id="3" name="Content Placeholder 2"/>
@@ -11397,15 +12127,7 @@
                 </a14:m>
                 <a:r>
                   <a:rPr lang="en-GB" dirty="0" smtClean="0"/>
-                  <a:t> </a:t>
-                </a:r>
-                <a:r>
-                  <a:rPr lang="en-GB" dirty="0" smtClean="0"/>
-                  <a:t>is the area closest to modelled </a:t>
-                </a:r>
-                <a:r>
-                  <a:rPr lang="en-GB" dirty="0" smtClean="0"/>
-                  <a:t>location </a:t>
+                  <a:t> is the area closest to modelled location </a:t>
                 </a:r>
                 <a14:m>
                   <m:oMath xmlns:m="http://schemas.openxmlformats.org/officeDocument/2006/math">
@@ -11454,11 +12176,7 @@
                 </a:pPr>
                 <a:r>
                   <a:rPr lang="en-US" dirty="0" smtClean="0"/>
-                  <a:t>Randomly sample from domain, and count closest </a:t>
-                </a:r>
-                <a:r>
-                  <a:rPr lang="en-US" dirty="0" smtClean="0"/>
-                  <a:t>samples</a:t>
+                  <a:t>Randomly sample from domain, and count closest samples</a:t>
                 </a:r>
               </a:p>
               <a:p>
@@ -11487,7 +12205,7 @@
             </p:txBody>
           </p:sp>
         </mc:Choice>
-        <mc:Fallback>
+        <mc:Fallback xmlns="">
           <p:sp>
             <p:nvSpPr>
               <p:cNvPr id="3" name="Content Placeholder 2"/>
@@ -11541,7 +12259,7 @@
 </p:sld>
 </file>
 
-<file path=ppt/slides/slide17.xml><?xml version="1.0" encoding="utf-8"?>
+<file path=ppt/slides/slide18.xml><?xml version="1.0" encoding="utf-8"?>
 <p:sld xmlns:a="http://schemas.openxmlformats.org/drawingml/2006/main" xmlns:r="http://schemas.openxmlformats.org/officeDocument/2006/relationships" xmlns:p="http://schemas.openxmlformats.org/presentationml/2006/main">
   <p:cSld>
     <p:spTree>
@@ -11577,8 +12295,8 @@
           </a:p>
         </p:txBody>
       </p:sp>
-      <mc:AlternateContent xmlns:mc="http://schemas.openxmlformats.org/markup-compatibility/2006">
-        <mc:Choice xmlns:a14="http://schemas.microsoft.com/office/drawing/2010/main" Requires="a14">
+      <mc:AlternateContent xmlns:mc="http://schemas.openxmlformats.org/markup-compatibility/2006" xmlns:a14="http://schemas.microsoft.com/office/drawing/2010/main">
+        <mc:Choice Requires="a14">
           <p:sp>
             <p:nvSpPr>
               <p:cNvPr id="3" name="Content Placeholder 2"/>
@@ -11601,11 +12319,7 @@
                 </a:pPr>
                 <a:r>
                   <a:rPr lang="en-US" dirty="0" smtClean="0"/>
-                  <a:t>Derived </a:t>
-                </a:r>
-                <a:r>
-                  <a:rPr lang="en-US" dirty="0" smtClean="0"/>
-                  <a:t>quantities (given 0</a:t>
+                  <a:t>Derived quantities (given 0</a:t>
                 </a:r>
                 <a:r>
                   <a:rPr lang="en-US" baseline="30000" dirty="0" smtClean="0"/>
@@ -11615,7 +12329,6 @@
                   <a:rPr lang="en-US" dirty="0" smtClean="0"/>
                   <a:t> order interpolation)</a:t>
                 </a:r>
-                <a:endParaRPr lang="en-US" dirty="0" smtClean="0"/>
               </a:p>
               <a:p>
                 <a:pPr marL="0" indent="0">
@@ -12854,7 +13567,7 @@
             </p:txBody>
           </p:sp>
         </mc:Choice>
-        <mc:Fallback>
+        <mc:Fallback xmlns="">
           <p:sp>
             <p:nvSpPr>
               <p:cNvPr id="3" name="Content Placeholder 2"/>
@@ -12908,7 +13621,7 @@
 </p:sld>
 </file>
 
-<file path=ppt/slides/slide18.xml><?xml version="1.0" encoding="utf-8"?>
+<file path=ppt/slides/slide19.xml><?xml version="1.0" encoding="utf-8"?>
 <p:sld xmlns:a="http://schemas.openxmlformats.org/drawingml/2006/main" xmlns:r="http://schemas.openxmlformats.org/officeDocument/2006/relationships" xmlns:p="http://schemas.openxmlformats.org/presentationml/2006/main">
   <p:cSld>
     <p:spTree>
@@ -13309,125 +14022,6 @@
 </p:sld>
 </file>
 
-<file path=ppt/slides/slide19.xml><?xml version="1.0" encoding="utf-8"?>
-<p:sld xmlns:a="http://schemas.openxmlformats.org/drawingml/2006/main" xmlns:r="http://schemas.openxmlformats.org/officeDocument/2006/relationships" xmlns:p="http://schemas.openxmlformats.org/presentationml/2006/main">
-  <p:cSld>
-    <p:spTree>
-      <p:nvGrpSpPr>
-        <p:cNvPr id="1" name=""/>
-        <p:cNvGrpSpPr/>
-        <p:nvPr/>
-      </p:nvGrpSpPr>
-      <p:grpSpPr>
-        <a:xfrm>
-          <a:off x="0" y="0"/>
-          <a:ext cx="0" cy="0"/>
-          <a:chOff x="0" y="0"/>
-          <a:chExt cx="0" cy="0"/>
-        </a:xfrm>
-      </p:grpSpPr>
-      <p:sp>
-        <p:nvSpPr>
-          <p:cNvPr id="2" name="Title 1"/>
-          <p:cNvSpPr>
-            <a:spLocks noGrp="1"/>
-          </p:cNvSpPr>
-          <p:nvPr>
-            <p:ph type="title"/>
-          </p:nvPr>
-        </p:nvSpPr>
-        <p:spPr/>
-        <p:txBody>
-          <a:bodyPr/>
-          <a:lstStyle/>
-          <a:p>
-            <a:endParaRPr lang="en-GB"/>
-          </a:p>
-        </p:txBody>
-      </p:sp>
-      <p:sp>
-        <p:nvSpPr>
-          <p:cNvPr id="3" name="Content Placeholder 2"/>
-          <p:cNvSpPr>
-            <a:spLocks noGrp="1"/>
-          </p:cNvSpPr>
-          <p:nvPr>
-            <p:ph idx="1"/>
-          </p:nvPr>
-        </p:nvSpPr>
-        <p:spPr/>
-        <p:txBody>
-          <a:bodyPr/>
-          <a:lstStyle/>
-          <a:p>
-            <a:pPr marL="0" indent="0">
-              <a:buNone/>
-            </a:pPr>
-            <a:endParaRPr lang="en-US" dirty="0" smtClean="0"/>
-          </a:p>
-          <a:p>
-            <a:pPr marL="0" indent="0">
-              <a:buNone/>
-            </a:pPr>
-            <a:endParaRPr lang="en-US" dirty="0"/>
-          </a:p>
-          <a:p>
-            <a:pPr marL="0" indent="0">
-              <a:buNone/>
-            </a:pPr>
-            <a:endParaRPr lang="en-US" dirty="0" smtClean="0"/>
-          </a:p>
-          <a:p>
-            <a:pPr marL="0" indent="0" algn="ctr">
-              <a:buNone/>
-            </a:pPr>
-            <a:r>
-              <a:rPr lang="en-US" dirty="0" smtClean="0"/>
-              <a:t>Exercise</a:t>
-            </a:r>
-          </a:p>
-          <a:p>
-            <a:pPr algn="ctr"/>
-            <a:r>
-              <a:rPr lang="en-US" dirty="0" smtClean="0"/>
-              <a:t>Divide into groups and </a:t>
-            </a:r>
-            <a:r>
-              <a:rPr lang="en-US" smtClean="0"/>
-              <a:t>add </a:t>
-            </a:r>
-            <a:r>
-              <a:rPr lang="en-US" smtClean="0"/>
-              <a:t>center-of-gravity</a:t>
-            </a:r>
-            <a:r>
-              <a:rPr lang="en-US" dirty="0" smtClean="0"/>
-              <a:t>, average density, and effective area occupied calculations</a:t>
-            </a:r>
-            <a:endParaRPr lang="en-GB" dirty="0"/>
-          </a:p>
-        </p:txBody>
-      </p:sp>
-    </p:spTree>
-    <p:extLst>
-      <p:ext uri="{BB962C8B-B14F-4D97-AF65-F5344CB8AC3E}">
-        <p14:creationId xmlns:p14="http://schemas.microsoft.com/office/powerpoint/2010/main" val="3979890211"/>
-      </p:ext>
-    </p:extLst>
-  </p:cSld>
-  <p:clrMapOvr>
-    <a:masterClrMapping/>
-  </p:clrMapOvr>
-  <p:timing>
-    <p:tnLst>
-      <p:par>
-        <p:cTn id="1" dur="indefinite" restart="never" nodeType="tmRoot"/>
-      </p:par>
-    </p:tnLst>
-  </p:timing>
-</p:sld>
-</file>
-
 <file path=ppt/slides/slide2.xml><?xml version="1.0" encoding="utf-8"?>
 <p:sld xmlns:a="http://schemas.openxmlformats.org/drawingml/2006/main" xmlns:r="http://schemas.openxmlformats.org/officeDocument/2006/relationships" xmlns:p="http://schemas.openxmlformats.org/presentationml/2006/main">
   <p:cSld>
@@ -13537,6 +14131,121 @@
     <p:extLst>
       <p:ext uri="{BB962C8B-B14F-4D97-AF65-F5344CB8AC3E}">
         <p14:creationId xmlns:p14="http://schemas.microsoft.com/office/powerpoint/2010/main" val="3410507428"/>
+      </p:ext>
+    </p:extLst>
+  </p:cSld>
+  <p:clrMapOvr>
+    <a:masterClrMapping/>
+  </p:clrMapOvr>
+  <p:timing>
+    <p:tnLst>
+      <p:par>
+        <p:cTn id="1" dur="indefinite" restart="never" nodeType="tmRoot"/>
+      </p:par>
+    </p:tnLst>
+  </p:timing>
+</p:sld>
+</file>
+
+<file path=ppt/slides/slide20.xml><?xml version="1.0" encoding="utf-8"?>
+<p:sld xmlns:a="http://schemas.openxmlformats.org/drawingml/2006/main" xmlns:r="http://schemas.openxmlformats.org/officeDocument/2006/relationships" xmlns:p="http://schemas.openxmlformats.org/presentationml/2006/main">
+  <p:cSld>
+    <p:spTree>
+      <p:nvGrpSpPr>
+        <p:cNvPr id="1" name=""/>
+        <p:cNvGrpSpPr/>
+        <p:nvPr/>
+      </p:nvGrpSpPr>
+      <p:grpSpPr>
+        <a:xfrm>
+          <a:off x="0" y="0"/>
+          <a:ext cx="0" cy="0"/>
+          <a:chOff x="0" y="0"/>
+          <a:chExt cx="0" cy="0"/>
+        </a:xfrm>
+      </p:grpSpPr>
+      <p:sp>
+        <p:nvSpPr>
+          <p:cNvPr id="2" name="Title 1"/>
+          <p:cNvSpPr>
+            <a:spLocks noGrp="1"/>
+          </p:cNvSpPr>
+          <p:nvPr>
+            <p:ph type="title"/>
+          </p:nvPr>
+        </p:nvSpPr>
+        <p:spPr/>
+        <p:txBody>
+          <a:bodyPr/>
+          <a:lstStyle/>
+          <a:p>
+            <a:endParaRPr lang="en-GB"/>
+          </a:p>
+        </p:txBody>
+      </p:sp>
+      <p:sp>
+        <p:nvSpPr>
+          <p:cNvPr id="3" name="Content Placeholder 2"/>
+          <p:cNvSpPr>
+            <a:spLocks noGrp="1"/>
+          </p:cNvSpPr>
+          <p:nvPr>
+            <p:ph idx="1"/>
+          </p:nvPr>
+        </p:nvSpPr>
+        <p:spPr/>
+        <p:txBody>
+          <a:bodyPr/>
+          <a:lstStyle/>
+          <a:p>
+            <a:pPr marL="0" indent="0">
+              <a:buNone/>
+            </a:pPr>
+            <a:endParaRPr lang="en-US" dirty="0" smtClean="0"/>
+          </a:p>
+          <a:p>
+            <a:pPr marL="0" indent="0">
+              <a:buNone/>
+            </a:pPr>
+            <a:endParaRPr lang="en-US" dirty="0"/>
+          </a:p>
+          <a:p>
+            <a:pPr marL="0" indent="0">
+              <a:buNone/>
+            </a:pPr>
+            <a:endParaRPr lang="en-US" dirty="0" smtClean="0"/>
+          </a:p>
+          <a:p>
+            <a:pPr marL="0" indent="0" algn="ctr">
+              <a:buNone/>
+            </a:pPr>
+            <a:r>
+              <a:rPr lang="en-US" dirty="0" smtClean="0"/>
+              <a:t>Exercise</a:t>
+            </a:r>
+          </a:p>
+          <a:p>
+            <a:pPr algn="ctr"/>
+            <a:r>
+              <a:rPr lang="en-US" dirty="0" smtClean="0"/>
+              <a:t>Divide into groups and </a:t>
+            </a:r>
+            <a:r>
+              <a:rPr lang="en-US" smtClean="0"/>
+              <a:t>add center-of-gravity</a:t>
+            </a:r>
+            <a:r>
+              <a:rPr lang="en-US" dirty="0" smtClean="0"/>
+              <a:t>, average density, and effective area occupied calculations</a:t>
+            </a:r>
+            <a:endParaRPr lang="en-GB" dirty="0"/>
+          </a:p>
+        </p:txBody>
+      </p:sp>
+    </p:spTree>
+    <p:extLst>
+      <p:ext uri="{BB962C8B-B14F-4D97-AF65-F5344CB8AC3E}">
+        <p14:creationId xmlns:p14="http://schemas.microsoft.com/office/powerpoint/2010/main" val="3979890211"/>
       </p:ext>
     </p:extLst>
   </p:cSld>
@@ -18589,8 +19298,8 @@
           </a:p>
         </p:txBody>
       </p:sp>
-      <mc:AlternateContent xmlns:mc="http://schemas.openxmlformats.org/markup-compatibility/2006" xmlns:a14="http://schemas.microsoft.com/office/drawing/2010/main">
-        <mc:Choice Requires="a14">
+      <mc:AlternateContent xmlns:mc="http://schemas.openxmlformats.org/markup-compatibility/2006">
+        <mc:Choice xmlns:a14="http://schemas.microsoft.com/office/drawing/2010/main" Requires="a14">
           <p:sp>
             <p:nvSpPr>
               <p:cNvPr id="3" name="Content Placeholder 2"/>
@@ -18621,8 +19330,19 @@
                     <a:latin typeface="Cambria Math" panose="02040503050406030204" pitchFamily="18" charset="0"/>
                     <a:ea typeface="Cambria Math" panose="02040503050406030204" pitchFamily="18" charset="0"/>
                   </a:rPr>
-                  <a:t>Spatial index standardization</a:t>
+                  <a:t>Spatial index </a:t>
                 </a:r>
+                <a:r>
+                  <a:rPr lang="en-US" dirty="0" smtClean="0">
+                    <a:latin typeface="Cambria Math" panose="02040503050406030204" pitchFamily="18" charset="0"/>
+                    <a:ea typeface="Cambria Math" panose="02040503050406030204" pitchFamily="18" charset="0"/>
+                  </a:rPr>
+                  <a:t>standardization (week 7 lecture)</a:t>
+                </a:r>
+                <a:endParaRPr lang="en-US" dirty="0" smtClean="0">
+                  <a:latin typeface="Cambria Math" panose="02040503050406030204" pitchFamily="18" charset="0"/>
+                  <a:ea typeface="Cambria Math" panose="02040503050406030204" pitchFamily="18" charset="0"/>
+                </a:endParaRPr>
               </a:p>
               <a:p>
                 <a:pPr marL="0" indent="0">
@@ -18847,8 +19567,13 @@
                 <a:pPr lvl="1" indent="-342900"/>
                 <a:r>
                   <a:rPr lang="en-US" dirty="0" smtClean="0"/>
-                  <a:t>Spatial Gompertz model</a:t>
+                  <a:t>Spatial Gompertz </a:t>
                 </a:r>
+                <a:r>
+                  <a:rPr lang="en-US" dirty="0" smtClean="0"/>
+                  <a:t>model (week 7 lab)</a:t>
+                </a:r>
+                <a:endParaRPr lang="en-US" dirty="0" smtClean="0"/>
               </a:p>
               <a:p>
                 <a:pPr marL="0" indent="0">
@@ -19028,7 +19753,7 @@
             </p:txBody>
           </p:sp>
         </mc:Choice>
-        <mc:Fallback xmlns="">
+        <mc:Fallback>
           <p:sp>
             <p:nvSpPr>
               <p:cNvPr id="3" name="Content Placeholder 2"/>
@@ -19120,6 +19845,1798 @@
       </p:sp>
       <mc:AlternateContent xmlns:mc="http://schemas.openxmlformats.org/markup-compatibility/2006">
         <mc:Choice xmlns:a14="http://schemas.microsoft.com/office/drawing/2010/main" Requires="a14">
+          <p:sp>
+            <p:nvSpPr>
+              <p:cNvPr id="3" name="Content Placeholder 2"/>
+              <p:cNvSpPr>
+                <a:spLocks noGrp="1"/>
+              </p:cNvSpPr>
+              <p:nvPr>
+                <p:ph idx="1"/>
+              </p:nvPr>
+            </p:nvSpPr>
+            <p:spPr/>
+            <p:txBody>
+              <a:bodyPr>
+                <a:normAutofit fontScale="62500" lnSpcReduction="20000"/>
+              </a:bodyPr>
+              <a:lstStyle/>
+              <a:p>
+                <a:pPr marL="0" indent="0">
+                  <a:buNone/>
+                </a:pPr>
+                <a:r>
+                  <a:rPr lang="en-US" dirty="0" smtClean="0"/>
+                  <a:t>What is index standardization?</a:t>
+                </a:r>
+              </a:p>
+              <a:p>
+                <a:r>
+                  <a:rPr lang="en-US" dirty="0" smtClean="0">
+                    <a:latin typeface="Cambria Math" panose="02040503050406030204" pitchFamily="18" charset="0"/>
+                    <a:ea typeface="Cambria Math" panose="02040503050406030204" pitchFamily="18" charset="0"/>
+                  </a:rPr>
+                  <a:t>Many models use a two-stage process</a:t>
+                </a:r>
+              </a:p>
+              <a:p>
+                <a:pPr marL="914400" lvl="1" indent="-457200">
+                  <a:buFont typeface="+mj-lt"/>
+                  <a:buAutoNum type="arabicPeriod"/>
+                </a:pPr>
+                <a:r>
+                  <a:rPr lang="en-US" dirty="0" smtClean="0">
+                    <a:latin typeface="Cambria Math" panose="02040503050406030204" pitchFamily="18" charset="0"/>
+                    <a:ea typeface="Cambria Math" panose="02040503050406030204" pitchFamily="18" charset="0"/>
+                  </a:rPr>
+                  <a:t>Analyze survey data to aggregate across space</a:t>
+                </a:r>
+              </a:p>
+              <a:p>
+                <a:pPr marL="914400" lvl="1" indent="-457200">
+                  <a:buFont typeface="+mj-lt"/>
+                  <a:buAutoNum type="arabicPeriod"/>
+                </a:pPr>
+                <a:r>
+                  <a:rPr lang="en-US" dirty="0" smtClean="0">
+                    <a:latin typeface="Cambria Math" panose="02040503050406030204" pitchFamily="18" charset="0"/>
+                    <a:ea typeface="Cambria Math" panose="02040503050406030204" pitchFamily="18" charset="0"/>
+                  </a:rPr>
+                  <a:t>Fit time-series models to products from step #1</a:t>
+                </a:r>
+              </a:p>
+              <a:p>
+                <a:pPr marL="514350" indent="-457200"/>
+                <a:r>
+                  <a:rPr lang="en-US" dirty="0" smtClean="0">
+                    <a:latin typeface="Cambria Math" panose="02040503050406030204" pitchFamily="18" charset="0"/>
+                    <a:ea typeface="Cambria Math" panose="02040503050406030204" pitchFamily="18" charset="0"/>
+                  </a:rPr>
+                  <a:t>Surplus production models</a:t>
+                </a:r>
+              </a:p>
+              <a:p>
+                <a:pPr marL="57150" indent="0">
+                  <a:buNone/>
+                </a:pPr>
+                <a14:m>
+                  <m:oMathPara xmlns:m="http://schemas.openxmlformats.org/officeDocument/2006/math">
+                    <m:oMathParaPr>
+                      <m:jc m:val="centerGroup"/>
+                    </m:oMathParaPr>
+                    <m:oMath xmlns:m="http://schemas.openxmlformats.org/officeDocument/2006/math">
+                      <m:sSub>
+                        <m:sSubPr>
+                          <m:ctrlPr>
+                            <a:rPr lang="en-US" b="0" i="1" smtClean="0">
+                              <a:latin typeface="Cambria Math" panose="02040503050406030204" pitchFamily="18" charset="0"/>
+                              <a:ea typeface="Cambria Math" panose="02040503050406030204" pitchFamily="18" charset="0"/>
+                            </a:rPr>
+                          </m:ctrlPr>
+                        </m:sSubPr>
+                        <m:e>
+                          <m:r>
+                            <a:rPr lang="en-US" b="0" i="1" smtClean="0">
+                              <a:latin typeface="Cambria Math" panose="02040503050406030204" pitchFamily="18" charset="0"/>
+                              <a:ea typeface="Cambria Math" panose="02040503050406030204" pitchFamily="18" charset="0"/>
+                            </a:rPr>
+                            <m:t>𝛽</m:t>
+                          </m:r>
+                        </m:e>
+                        <m:sub>
+                          <m:r>
+                            <a:rPr lang="en-US" b="0" i="1" smtClean="0">
+                              <a:latin typeface="Cambria Math" panose="02040503050406030204" pitchFamily="18" charset="0"/>
+                              <a:ea typeface="Cambria Math" panose="02040503050406030204" pitchFamily="18" charset="0"/>
+                            </a:rPr>
+                            <m:t>𝑡</m:t>
+                          </m:r>
+                          <m:r>
+                            <a:rPr lang="en-US" b="0" i="1" smtClean="0">
+                              <a:latin typeface="Cambria Math" panose="02040503050406030204" pitchFamily="18" charset="0"/>
+                              <a:ea typeface="Cambria Math" panose="02040503050406030204" pitchFamily="18" charset="0"/>
+                            </a:rPr>
+                            <m:t>+1</m:t>
+                          </m:r>
+                        </m:sub>
+                      </m:sSub>
+                      <m:r>
+                        <a:rPr lang="en-US" b="0" i="1" smtClean="0">
+                          <a:latin typeface="Cambria Math" panose="02040503050406030204" pitchFamily="18" charset="0"/>
+                          <a:ea typeface="Cambria Math" panose="02040503050406030204" pitchFamily="18" charset="0"/>
+                        </a:rPr>
+                        <m:t>=(</m:t>
+                      </m:r>
+                      <m:r>
+                        <a:rPr lang="en-US" b="0" i="1" smtClean="0">
+                          <a:latin typeface="Cambria Math" panose="02040503050406030204" pitchFamily="18" charset="0"/>
+                          <a:ea typeface="Cambria Math" panose="02040503050406030204" pitchFamily="18" charset="0"/>
+                        </a:rPr>
+                        <m:t>𝑔</m:t>
+                      </m:r>
+                      <m:d>
+                        <m:dPr>
+                          <m:ctrlPr>
+                            <a:rPr lang="en-US" b="0" i="1" smtClean="0">
+                              <a:latin typeface="Cambria Math" panose="02040503050406030204" pitchFamily="18" charset="0"/>
+                              <a:ea typeface="Cambria Math" panose="02040503050406030204" pitchFamily="18" charset="0"/>
+                            </a:rPr>
+                          </m:ctrlPr>
+                        </m:dPr>
+                        <m:e>
+                          <m:sSub>
+                            <m:sSubPr>
+                              <m:ctrlPr>
+                                <a:rPr lang="en-US" b="0" i="1" smtClean="0">
+                                  <a:latin typeface="Cambria Math" panose="02040503050406030204" pitchFamily="18" charset="0"/>
+                                  <a:ea typeface="Cambria Math" panose="02040503050406030204" pitchFamily="18" charset="0"/>
+                                </a:rPr>
+                              </m:ctrlPr>
+                            </m:sSubPr>
+                            <m:e>
+                              <m:r>
+                                <a:rPr lang="en-US" i="1">
+                                  <a:latin typeface="Cambria Math" panose="02040503050406030204" pitchFamily="18" charset="0"/>
+                                  <a:ea typeface="Cambria Math" panose="02040503050406030204" pitchFamily="18" charset="0"/>
+                                </a:rPr>
+                                <m:t>𝛽</m:t>
+                              </m:r>
+                            </m:e>
+                            <m:sub>
+                              <m:r>
+                                <a:rPr lang="en-US" b="0" i="1" smtClean="0">
+                                  <a:latin typeface="Cambria Math" panose="02040503050406030204" pitchFamily="18" charset="0"/>
+                                  <a:ea typeface="Cambria Math" panose="02040503050406030204" pitchFamily="18" charset="0"/>
+                                </a:rPr>
+                                <m:t>𝑡</m:t>
+                              </m:r>
+                            </m:sub>
+                          </m:sSub>
+                        </m:e>
+                      </m:d>
+                      <m:r>
+                        <a:rPr lang="en-US" b="0" i="1" smtClean="0">
+                          <a:latin typeface="Cambria Math" panose="02040503050406030204" pitchFamily="18" charset="0"/>
+                          <a:ea typeface="Cambria Math" panose="02040503050406030204" pitchFamily="18" charset="0"/>
+                        </a:rPr>
+                        <m:t>−</m:t>
+                      </m:r>
+                      <m:sSub>
+                        <m:sSubPr>
+                          <m:ctrlPr>
+                            <a:rPr lang="en-US" b="0" i="1" smtClean="0">
+                              <a:latin typeface="Cambria Math" panose="02040503050406030204" pitchFamily="18" charset="0"/>
+                              <a:ea typeface="Cambria Math" panose="02040503050406030204" pitchFamily="18" charset="0"/>
+                            </a:rPr>
+                          </m:ctrlPr>
+                        </m:sSubPr>
+                        <m:e>
+                          <m:r>
+                            <a:rPr lang="en-US" b="0" i="1" smtClean="0">
+                              <a:latin typeface="Cambria Math" panose="02040503050406030204" pitchFamily="18" charset="0"/>
+                              <a:ea typeface="Cambria Math" panose="02040503050406030204" pitchFamily="18" charset="0"/>
+                            </a:rPr>
+                            <m:t>𝑓</m:t>
+                          </m:r>
+                        </m:e>
+                        <m:sub>
+                          <m:r>
+                            <a:rPr lang="en-US" b="0" i="1" smtClean="0">
+                              <a:latin typeface="Cambria Math" panose="02040503050406030204" pitchFamily="18" charset="0"/>
+                              <a:ea typeface="Cambria Math" panose="02040503050406030204" pitchFamily="18" charset="0"/>
+                            </a:rPr>
+                            <m:t>𝑡</m:t>
+                          </m:r>
+                        </m:sub>
+                      </m:sSub>
+                      <m:sSub>
+                        <m:sSubPr>
+                          <m:ctrlPr>
+                            <a:rPr lang="en-US" b="0" i="0" smtClean="0">
+                              <a:latin typeface="Cambria Math" panose="02040503050406030204" pitchFamily="18" charset="0"/>
+                              <a:ea typeface="Cambria Math" panose="02040503050406030204" pitchFamily="18" charset="0"/>
+                            </a:rPr>
+                          </m:ctrlPr>
+                        </m:sSubPr>
+                        <m:e>
+                          <m:r>
+                            <a:rPr lang="en-US" i="1">
+                              <a:latin typeface="Cambria Math" panose="02040503050406030204" pitchFamily="18" charset="0"/>
+                              <a:ea typeface="Cambria Math" panose="02040503050406030204" pitchFamily="18" charset="0"/>
+                            </a:rPr>
+                            <m:t>𝛽</m:t>
+                          </m:r>
+                        </m:e>
+                        <m:sub>
+                          <m:r>
+                            <a:rPr lang="en-US" b="0" i="1" smtClean="0">
+                              <a:latin typeface="Cambria Math" panose="02040503050406030204" pitchFamily="18" charset="0"/>
+                              <a:ea typeface="Cambria Math" panose="02040503050406030204" pitchFamily="18" charset="0"/>
+                            </a:rPr>
+                            <m:t>𝑡</m:t>
+                          </m:r>
+                        </m:sub>
+                      </m:sSub>
+                      <m:r>
+                        <a:rPr lang="en-US" b="0" i="0" smtClean="0">
+                          <a:latin typeface="Cambria Math" panose="02040503050406030204" pitchFamily="18" charset="0"/>
+                          <a:ea typeface="Cambria Math" panose="02040503050406030204" pitchFamily="18" charset="0"/>
+                        </a:rPr>
+                        <m:t>)</m:t>
+                      </m:r>
+                      <m:r>
+                        <m:rPr>
+                          <m:sty m:val="p"/>
+                        </m:rPr>
+                        <a:rPr lang="en-US" b="0" i="0" smtClean="0">
+                          <a:latin typeface="Cambria Math" panose="02040503050406030204" pitchFamily="18" charset="0"/>
+                          <a:ea typeface="Cambria Math" panose="02040503050406030204" pitchFamily="18" charset="0"/>
+                        </a:rPr>
+                        <m:t>exp</m:t>
+                      </m:r>
+                      <m:r>
+                        <a:rPr lang="en-US" b="0" i="1" smtClean="0">
+                          <a:latin typeface="Cambria Math" panose="02040503050406030204" pitchFamily="18" charset="0"/>
+                          <a:ea typeface="Cambria Math" panose="02040503050406030204" pitchFamily="18" charset="0"/>
+                        </a:rPr>
+                        <m:t>⁡(</m:t>
+                      </m:r>
+                      <m:sSub>
+                        <m:sSubPr>
+                          <m:ctrlPr>
+                            <a:rPr lang="en-US" b="0" i="1" smtClean="0">
+                              <a:latin typeface="Cambria Math" panose="02040503050406030204" pitchFamily="18" charset="0"/>
+                              <a:ea typeface="Cambria Math" panose="02040503050406030204" pitchFamily="18" charset="0"/>
+                            </a:rPr>
+                          </m:ctrlPr>
+                        </m:sSubPr>
+                        <m:e>
+                          <m:r>
+                            <a:rPr lang="en-US" b="0" i="1" smtClean="0">
+                              <a:latin typeface="Cambria Math" panose="02040503050406030204" pitchFamily="18" charset="0"/>
+                              <a:ea typeface="Cambria Math" panose="02040503050406030204" pitchFamily="18" charset="0"/>
+                            </a:rPr>
+                            <m:t>𝜀</m:t>
+                          </m:r>
+                        </m:e>
+                        <m:sub>
+                          <m:r>
+                            <a:rPr lang="en-US" b="0" i="1" smtClean="0">
+                              <a:latin typeface="Cambria Math" panose="02040503050406030204" pitchFamily="18" charset="0"/>
+                              <a:ea typeface="Cambria Math" panose="02040503050406030204" pitchFamily="18" charset="0"/>
+                            </a:rPr>
+                            <m:t>𝑡</m:t>
+                          </m:r>
+                        </m:sub>
+                      </m:sSub>
+                      <m:r>
+                        <a:rPr lang="en-US" b="0" i="1" smtClean="0">
+                          <a:latin typeface="Cambria Math" panose="02040503050406030204" pitchFamily="18" charset="0"/>
+                          <a:ea typeface="Cambria Math" panose="02040503050406030204" pitchFamily="18" charset="0"/>
+                        </a:rPr>
+                        <m:t>)</m:t>
+                      </m:r>
+                    </m:oMath>
+                  </m:oMathPara>
+                </a14:m>
+                <a:endParaRPr lang="en-US" dirty="0" smtClean="0">
+                  <a:latin typeface="Cambria Math" panose="02040503050406030204" pitchFamily="18" charset="0"/>
+                  <a:ea typeface="Cambria Math" panose="02040503050406030204" pitchFamily="18" charset="0"/>
+                </a:endParaRPr>
+              </a:p>
+              <a:p>
+                <a:pPr marL="457200" lvl="1" indent="0">
+                  <a:buNone/>
+                </a:pPr>
+                <a:r>
+                  <a:rPr lang="en-US" dirty="0" smtClean="0">
+                    <a:latin typeface="Cambria Math" panose="02040503050406030204" pitchFamily="18" charset="0"/>
+                    <a:ea typeface="Cambria Math" panose="02040503050406030204" pitchFamily="18" charset="0"/>
+                  </a:rPr>
+                  <a:t>Where </a:t>
+                </a:r>
+              </a:p>
+              <a:p>
+                <a:pPr lvl="1"/>
+                <a14:m>
+                  <m:oMath xmlns:m="http://schemas.openxmlformats.org/officeDocument/2006/math">
+                    <m:r>
+                      <a:rPr lang="en-US" i="1">
+                        <a:latin typeface="Cambria Math" panose="02040503050406030204" pitchFamily="18" charset="0"/>
+                        <a:ea typeface="Cambria Math" panose="02040503050406030204" pitchFamily="18" charset="0"/>
+                      </a:rPr>
+                      <m:t>𝛽</m:t>
+                    </m:r>
+                  </m:oMath>
+                </a14:m>
+                <a:r>
+                  <a:rPr lang="en-US" i="1" dirty="0" smtClean="0">
+                    <a:latin typeface="Cambria Math" panose="02040503050406030204" pitchFamily="18" charset="0"/>
+                    <a:ea typeface="Cambria Math" panose="02040503050406030204" pitchFamily="18" charset="0"/>
+                  </a:rPr>
+                  <a:t> </a:t>
+                </a:r>
+                <a:r>
+                  <a:rPr lang="en-US" dirty="0" smtClean="0">
+                    <a:latin typeface="Cambria Math" panose="02040503050406030204" pitchFamily="18" charset="0"/>
+                    <a:ea typeface="Cambria Math" panose="02040503050406030204" pitchFamily="18" charset="0"/>
+                  </a:rPr>
+                  <a:t>is a latent variable representing population abundance</a:t>
+                </a:r>
+                <a:endParaRPr lang="en-US" i="1" dirty="0" smtClean="0">
+                  <a:latin typeface="Cambria Math" panose="02040503050406030204" pitchFamily="18" charset="0"/>
+                  <a:ea typeface="Cambria Math" panose="02040503050406030204" pitchFamily="18" charset="0"/>
+                </a:endParaRPr>
+              </a:p>
+              <a:p>
+                <a:pPr lvl="1"/>
+                <a14:m>
+                  <m:oMath xmlns:m="http://schemas.openxmlformats.org/officeDocument/2006/math">
+                    <m:r>
+                      <a:rPr lang="en-US" i="1">
+                        <a:latin typeface="Cambria Math" panose="02040503050406030204" pitchFamily="18" charset="0"/>
+                        <a:ea typeface="Cambria Math" panose="02040503050406030204" pitchFamily="18" charset="0"/>
+                      </a:rPr>
+                      <m:t>𝑔</m:t>
+                    </m:r>
+                    <m:d>
+                      <m:dPr>
+                        <m:ctrlPr>
+                          <a:rPr lang="en-US" i="1">
+                            <a:latin typeface="Cambria Math" panose="02040503050406030204" pitchFamily="18" charset="0"/>
+                            <a:ea typeface="Cambria Math" panose="02040503050406030204" pitchFamily="18" charset="0"/>
+                          </a:rPr>
+                        </m:ctrlPr>
+                      </m:dPr>
+                      <m:e>
+                        <m:sSub>
+                          <m:sSubPr>
+                            <m:ctrlPr>
+                              <a:rPr lang="en-US" i="1">
+                                <a:latin typeface="Cambria Math" panose="02040503050406030204" pitchFamily="18" charset="0"/>
+                                <a:ea typeface="Cambria Math" panose="02040503050406030204" pitchFamily="18" charset="0"/>
+                              </a:rPr>
+                            </m:ctrlPr>
+                          </m:sSubPr>
+                          <m:e>
+                            <m:r>
+                              <a:rPr lang="en-US" i="1">
+                                <a:latin typeface="Cambria Math" panose="02040503050406030204" pitchFamily="18" charset="0"/>
+                                <a:ea typeface="Cambria Math" panose="02040503050406030204" pitchFamily="18" charset="0"/>
+                              </a:rPr>
+                              <m:t>𝛽</m:t>
+                            </m:r>
+                          </m:e>
+                          <m:sub>
+                            <m:r>
+                              <a:rPr lang="en-US" i="1">
+                                <a:latin typeface="Cambria Math" panose="02040503050406030204" pitchFamily="18" charset="0"/>
+                                <a:ea typeface="Cambria Math" panose="02040503050406030204" pitchFamily="18" charset="0"/>
+                              </a:rPr>
+                              <m:t>𝑡</m:t>
+                            </m:r>
+                          </m:sub>
+                        </m:sSub>
+                      </m:e>
+                    </m:d>
+                  </m:oMath>
+                </a14:m>
+                <a:r>
+                  <a:rPr lang="en-US" dirty="0" smtClean="0">
+                    <a:latin typeface="Cambria Math" panose="02040503050406030204" pitchFamily="18" charset="0"/>
+                    <a:ea typeface="Cambria Math" panose="02040503050406030204" pitchFamily="18" charset="0"/>
+                  </a:rPr>
+                  <a:t> is a production function</a:t>
+                </a:r>
+              </a:p>
+              <a:p>
+                <a:pPr lvl="1"/>
+                <a14:m>
+                  <m:oMath xmlns:m="http://schemas.openxmlformats.org/officeDocument/2006/math">
+                    <m:sSub>
+                      <m:sSubPr>
+                        <m:ctrlPr>
+                          <a:rPr lang="en-US" i="1">
+                            <a:latin typeface="Cambria Math" panose="02040503050406030204" pitchFamily="18" charset="0"/>
+                            <a:ea typeface="Cambria Math" panose="02040503050406030204" pitchFamily="18" charset="0"/>
+                          </a:rPr>
+                        </m:ctrlPr>
+                      </m:sSubPr>
+                      <m:e>
+                        <m:r>
+                          <a:rPr lang="en-US" i="1">
+                            <a:latin typeface="Cambria Math" panose="02040503050406030204" pitchFamily="18" charset="0"/>
+                            <a:ea typeface="Cambria Math" panose="02040503050406030204" pitchFamily="18" charset="0"/>
+                          </a:rPr>
+                          <m:t>𝑓</m:t>
+                        </m:r>
+                      </m:e>
+                      <m:sub>
+                        <m:r>
+                          <a:rPr lang="en-US" i="1">
+                            <a:latin typeface="Cambria Math" panose="02040503050406030204" pitchFamily="18" charset="0"/>
+                            <a:ea typeface="Cambria Math" panose="02040503050406030204" pitchFamily="18" charset="0"/>
+                          </a:rPr>
+                          <m:t>𝑡</m:t>
+                        </m:r>
+                      </m:sub>
+                    </m:sSub>
+                    <m:sSub>
+                      <m:sSubPr>
+                        <m:ctrlPr>
+                          <a:rPr lang="en-US" i="1">
+                            <a:latin typeface="Cambria Math" panose="02040503050406030204" pitchFamily="18" charset="0"/>
+                            <a:ea typeface="Cambria Math" panose="02040503050406030204" pitchFamily="18" charset="0"/>
+                          </a:rPr>
+                        </m:ctrlPr>
+                      </m:sSubPr>
+                      <m:e>
+                        <m:r>
+                          <a:rPr lang="en-US" i="1">
+                            <a:latin typeface="Cambria Math" panose="02040503050406030204" pitchFamily="18" charset="0"/>
+                            <a:ea typeface="Cambria Math" panose="02040503050406030204" pitchFamily="18" charset="0"/>
+                          </a:rPr>
+                          <m:t>𝛽</m:t>
+                        </m:r>
+                      </m:e>
+                      <m:sub>
+                        <m:r>
+                          <a:rPr lang="en-US" i="1">
+                            <a:latin typeface="Cambria Math" panose="02040503050406030204" pitchFamily="18" charset="0"/>
+                            <a:ea typeface="Cambria Math" panose="02040503050406030204" pitchFamily="18" charset="0"/>
+                          </a:rPr>
+                          <m:t>𝑡</m:t>
+                        </m:r>
+                      </m:sub>
+                    </m:sSub>
+                  </m:oMath>
+                </a14:m>
+                <a:r>
+                  <a:rPr lang="en-US" dirty="0" smtClean="0">
+                    <a:latin typeface="Cambria Math" panose="02040503050406030204" pitchFamily="18" charset="0"/>
+                    <a:ea typeface="Cambria Math" panose="02040503050406030204" pitchFamily="18" charset="0"/>
+                  </a:rPr>
+                  <a:t> is fishin</a:t>
+                </a:r>
+                <a:r>
+                  <a:rPr lang="en-US" dirty="0" smtClean="0">
+                    <a:latin typeface="Cambria Math" panose="02040503050406030204" pitchFamily="18" charset="0"/>
+                    <a:ea typeface="Cambria Math" panose="02040503050406030204" pitchFamily="18" charset="0"/>
+                  </a:rPr>
+                  <a:t>g fraction times biomass</a:t>
+                </a:r>
+              </a:p>
+              <a:p>
+                <a:pPr marL="457200" lvl="1" indent="0">
+                  <a:buNone/>
+                </a:pPr>
+                <a14:m>
+                  <m:oMathPara xmlns:m="http://schemas.openxmlformats.org/officeDocument/2006/math">
+                    <m:oMathParaPr>
+                      <m:jc m:val="centerGroup"/>
+                    </m:oMathParaPr>
+                    <m:oMath xmlns:m="http://schemas.openxmlformats.org/officeDocument/2006/math">
+                      <m:r>
+                        <m:rPr>
+                          <m:sty m:val="p"/>
+                        </m:rPr>
+                        <a:rPr lang="en-US" b="0" i="0" smtClean="0">
+                          <a:latin typeface="Cambria Math" panose="02040503050406030204" pitchFamily="18" charset="0"/>
+                          <a:ea typeface="Cambria Math" panose="02040503050406030204" pitchFamily="18" charset="0"/>
+                        </a:rPr>
+                        <m:t>log</m:t>
+                      </m:r>
+                      <m:r>
+                        <a:rPr lang="en-US" b="0" i="1" smtClean="0">
+                          <a:latin typeface="Cambria Math" panose="02040503050406030204" pitchFamily="18" charset="0"/>
+                          <a:ea typeface="Cambria Math" panose="02040503050406030204" pitchFamily="18" charset="0"/>
+                        </a:rPr>
+                        <m:t>⁡(</m:t>
+                      </m:r>
+                      <m:sSub>
+                        <m:sSubPr>
+                          <m:ctrlPr>
+                            <a:rPr lang="en-US" b="0" i="1" smtClean="0">
+                              <a:latin typeface="Cambria Math" panose="02040503050406030204" pitchFamily="18" charset="0"/>
+                              <a:ea typeface="Cambria Math" panose="02040503050406030204" pitchFamily="18" charset="0"/>
+                            </a:rPr>
+                          </m:ctrlPr>
+                        </m:sSubPr>
+                        <m:e>
+                          <m:r>
+                            <a:rPr lang="en-US" b="0" i="1" smtClean="0">
+                              <a:latin typeface="Cambria Math" panose="02040503050406030204" pitchFamily="18" charset="0"/>
+                              <a:ea typeface="Cambria Math" panose="02040503050406030204" pitchFamily="18" charset="0"/>
+                            </a:rPr>
+                            <m:t>𝑐</m:t>
+                          </m:r>
+                        </m:e>
+                        <m:sub>
+                          <m:r>
+                            <a:rPr lang="en-US" b="0" i="1" smtClean="0">
+                              <a:latin typeface="Cambria Math" panose="02040503050406030204" pitchFamily="18" charset="0"/>
+                              <a:ea typeface="Cambria Math" panose="02040503050406030204" pitchFamily="18" charset="0"/>
+                            </a:rPr>
+                            <m:t>𝑡</m:t>
+                          </m:r>
+                        </m:sub>
+                      </m:sSub>
+                      <m:r>
+                        <a:rPr lang="en-US" b="0" i="1" smtClean="0">
+                          <a:latin typeface="Cambria Math" panose="02040503050406030204" pitchFamily="18" charset="0"/>
+                          <a:ea typeface="Cambria Math" panose="02040503050406030204" pitchFamily="18" charset="0"/>
+                        </a:rPr>
+                        <m:t>)~</m:t>
+                      </m:r>
+                      <m:r>
+                        <a:rPr lang="en-US" b="0" i="1" smtClean="0">
+                          <a:latin typeface="Cambria Math" panose="02040503050406030204" pitchFamily="18" charset="0"/>
+                          <a:ea typeface="Cambria Math" panose="02040503050406030204" pitchFamily="18" charset="0"/>
+                        </a:rPr>
+                        <m:t>𝑁𝑜𝑟𝑚𝑎𝑙</m:t>
+                      </m:r>
+                      <m:r>
+                        <a:rPr lang="en-US" b="0" i="1" smtClean="0">
+                          <a:latin typeface="Cambria Math" panose="02040503050406030204" pitchFamily="18" charset="0"/>
+                          <a:ea typeface="Cambria Math" panose="02040503050406030204" pitchFamily="18" charset="0"/>
+                        </a:rPr>
+                        <m:t>(</m:t>
+                      </m:r>
+                      <m:func>
+                        <m:funcPr>
+                          <m:ctrlPr>
+                            <a:rPr lang="en-US" b="0" i="1" smtClean="0">
+                              <a:latin typeface="Cambria Math" panose="02040503050406030204" pitchFamily="18" charset="0"/>
+                              <a:ea typeface="Cambria Math" panose="02040503050406030204" pitchFamily="18" charset="0"/>
+                            </a:rPr>
+                          </m:ctrlPr>
+                        </m:funcPr>
+                        <m:fName>
+                          <m:r>
+                            <m:rPr>
+                              <m:sty m:val="p"/>
+                            </m:rPr>
+                            <a:rPr lang="en-US" b="0" i="0" smtClean="0">
+                              <a:latin typeface="Cambria Math" panose="02040503050406030204" pitchFamily="18" charset="0"/>
+                              <a:ea typeface="Cambria Math" panose="02040503050406030204" pitchFamily="18" charset="0"/>
+                            </a:rPr>
+                            <m:t>log</m:t>
+                          </m:r>
+                        </m:fName>
+                        <m:e>
+                          <m:d>
+                            <m:dPr>
+                              <m:ctrlPr>
+                                <a:rPr lang="en-US" b="0" i="1" smtClean="0">
+                                  <a:latin typeface="Cambria Math" panose="02040503050406030204" pitchFamily="18" charset="0"/>
+                                  <a:ea typeface="Cambria Math" panose="02040503050406030204" pitchFamily="18" charset="0"/>
+                                </a:rPr>
+                              </m:ctrlPr>
+                            </m:dPr>
+                            <m:e>
+                              <m:sSub>
+                                <m:sSubPr>
+                                  <m:ctrlPr>
+                                    <a:rPr lang="en-US" i="1">
+                                      <a:latin typeface="Cambria Math" panose="02040503050406030204" pitchFamily="18" charset="0"/>
+                                      <a:ea typeface="Cambria Math" panose="02040503050406030204" pitchFamily="18" charset="0"/>
+                                    </a:rPr>
+                                  </m:ctrlPr>
+                                </m:sSubPr>
+                                <m:e>
+                                  <m:r>
+                                    <a:rPr lang="en-US" i="1">
+                                      <a:latin typeface="Cambria Math" panose="02040503050406030204" pitchFamily="18" charset="0"/>
+                                      <a:ea typeface="Cambria Math" panose="02040503050406030204" pitchFamily="18" charset="0"/>
+                                    </a:rPr>
+                                    <m:t>𝑓</m:t>
+                                  </m:r>
+                                </m:e>
+                                <m:sub>
+                                  <m:r>
+                                    <a:rPr lang="en-US" i="1">
+                                      <a:latin typeface="Cambria Math" panose="02040503050406030204" pitchFamily="18" charset="0"/>
+                                      <a:ea typeface="Cambria Math" panose="02040503050406030204" pitchFamily="18" charset="0"/>
+                                    </a:rPr>
+                                    <m:t>𝑡</m:t>
+                                  </m:r>
+                                </m:sub>
+                              </m:sSub>
+                              <m:sSub>
+                                <m:sSubPr>
+                                  <m:ctrlPr>
+                                    <a:rPr lang="en-US" i="1">
+                                      <a:latin typeface="Cambria Math" panose="02040503050406030204" pitchFamily="18" charset="0"/>
+                                      <a:ea typeface="Cambria Math" panose="02040503050406030204" pitchFamily="18" charset="0"/>
+                                    </a:rPr>
+                                  </m:ctrlPr>
+                                </m:sSubPr>
+                                <m:e>
+                                  <m:r>
+                                    <a:rPr lang="en-US" i="1">
+                                      <a:latin typeface="Cambria Math" panose="02040503050406030204" pitchFamily="18" charset="0"/>
+                                      <a:ea typeface="Cambria Math" panose="02040503050406030204" pitchFamily="18" charset="0"/>
+                                    </a:rPr>
+                                    <m:t>𝑏</m:t>
+                                  </m:r>
+                                </m:e>
+                                <m:sub>
+                                  <m:r>
+                                    <a:rPr lang="en-US" i="1">
+                                      <a:latin typeface="Cambria Math" panose="02040503050406030204" pitchFamily="18" charset="0"/>
+                                      <a:ea typeface="Cambria Math" panose="02040503050406030204" pitchFamily="18" charset="0"/>
+                                    </a:rPr>
+                                    <m:t>𝑡</m:t>
+                                  </m:r>
+                                </m:sub>
+                              </m:sSub>
+                            </m:e>
+                          </m:d>
+                        </m:e>
+                      </m:func>
+                      <m:r>
+                        <a:rPr lang="en-US" b="0" i="1" smtClean="0">
+                          <a:latin typeface="Cambria Math" panose="02040503050406030204" pitchFamily="18" charset="0"/>
+                          <a:ea typeface="Cambria Math" panose="02040503050406030204" pitchFamily="18" charset="0"/>
+                        </a:rPr>
+                        <m:t>,</m:t>
+                      </m:r>
+                      <m:sSubSup>
+                        <m:sSubSupPr>
+                          <m:ctrlPr>
+                            <a:rPr lang="en-US" b="0" i="1" smtClean="0">
+                              <a:latin typeface="Cambria Math" panose="02040503050406030204" pitchFamily="18" charset="0"/>
+                              <a:ea typeface="Cambria Math" panose="02040503050406030204" pitchFamily="18" charset="0"/>
+                            </a:rPr>
+                          </m:ctrlPr>
+                        </m:sSubSupPr>
+                        <m:e>
+                          <m:r>
+                            <a:rPr lang="en-US" b="0" i="1" smtClean="0">
+                              <a:latin typeface="Cambria Math" panose="02040503050406030204" pitchFamily="18" charset="0"/>
+                              <a:ea typeface="Cambria Math" panose="02040503050406030204" pitchFamily="18" charset="0"/>
+                            </a:rPr>
+                            <m:t>𝜎</m:t>
+                          </m:r>
+                        </m:e>
+                        <m:sub>
+                          <m:r>
+                            <a:rPr lang="en-US" b="0" i="1" smtClean="0">
+                              <a:latin typeface="Cambria Math" panose="02040503050406030204" pitchFamily="18" charset="0"/>
+                              <a:ea typeface="Cambria Math" panose="02040503050406030204" pitchFamily="18" charset="0"/>
+                            </a:rPr>
+                            <m:t>𝑐</m:t>
+                          </m:r>
+                        </m:sub>
+                        <m:sup>
+                          <m:r>
+                            <a:rPr lang="en-US" b="0" i="1" smtClean="0">
+                              <a:latin typeface="Cambria Math" panose="02040503050406030204" pitchFamily="18" charset="0"/>
+                              <a:ea typeface="Cambria Math" panose="02040503050406030204" pitchFamily="18" charset="0"/>
+                            </a:rPr>
+                            <m:t>2</m:t>
+                          </m:r>
+                        </m:sup>
+                      </m:sSubSup>
+                      <m:r>
+                        <a:rPr lang="en-US" b="0" i="1" smtClean="0">
+                          <a:latin typeface="Cambria Math" panose="02040503050406030204" pitchFamily="18" charset="0"/>
+                          <a:ea typeface="Cambria Math" panose="02040503050406030204" pitchFamily="18" charset="0"/>
+                        </a:rPr>
+                        <m:t>)</m:t>
+                      </m:r>
+                    </m:oMath>
+                  </m:oMathPara>
+                </a14:m>
+                <a:endParaRPr lang="en-US" dirty="0" smtClean="0">
+                  <a:latin typeface="Cambria Math" panose="02040503050406030204" pitchFamily="18" charset="0"/>
+                  <a:ea typeface="Cambria Math" panose="02040503050406030204" pitchFamily="18" charset="0"/>
+                </a:endParaRPr>
+              </a:p>
+              <a:p>
+                <a:pPr lvl="1"/>
+                <a14:m>
+                  <m:oMath xmlns:m="http://schemas.openxmlformats.org/officeDocument/2006/math">
+                    <m:sSub>
+                      <m:sSubPr>
+                        <m:ctrlPr>
+                          <a:rPr lang="en-US" i="1">
+                            <a:latin typeface="Cambria Math" panose="02040503050406030204" pitchFamily="18" charset="0"/>
+                            <a:ea typeface="Cambria Math" panose="02040503050406030204" pitchFamily="18" charset="0"/>
+                          </a:rPr>
+                        </m:ctrlPr>
+                      </m:sSubPr>
+                      <m:e>
+                        <m:r>
+                          <a:rPr lang="en-US" i="1">
+                            <a:latin typeface="Cambria Math" panose="02040503050406030204" pitchFamily="18" charset="0"/>
+                            <a:ea typeface="Cambria Math" panose="02040503050406030204" pitchFamily="18" charset="0"/>
+                          </a:rPr>
+                          <m:t>𝜀</m:t>
+                        </m:r>
+                      </m:e>
+                      <m:sub>
+                        <m:r>
+                          <a:rPr lang="en-US" i="1">
+                            <a:latin typeface="Cambria Math" panose="02040503050406030204" pitchFamily="18" charset="0"/>
+                            <a:ea typeface="Cambria Math" panose="02040503050406030204" pitchFamily="18" charset="0"/>
+                          </a:rPr>
+                          <m:t>𝑡</m:t>
+                        </m:r>
+                      </m:sub>
+                    </m:sSub>
+                  </m:oMath>
+                </a14:m>
+                <a:r>
+                  <a:rPr lang="en-US" dirty="0" smtClean="0">
+                    <a:latin typeface="Cambria Math" panose="02040503050406030204" pitchFamily="18" charset="0"/>
+                    <a:ea typeface="Cambria Math" panose="02040503050406030204" pitchFamily="18" charset="0"/>
+                  </a:rPr>
+                  <a:t> is process error</a:t>
+                </a:r>
+              </a:p>
+              <a:p>
+                <a:pPr marL="457200" lvl="1" indent="0">
+                  <a:buNone/>
+                </a:pPr>
+                <a14:m>
+                  <m:oMathPara xmlns:m="http://schemas.openxmlformats.org/officeDocument/2006/math">
+                    <m:oMathParaPr>
+                      <m:jc m:val="centerGroup"/>
+                    </m:oMathParaPr>
+                    <m:oMath xmlns:m="http://schemas.openxmlformats.org/officeDocument/2006/math">
+                      <m:sSub>
+                        <m:sSubPr>
+                          <m:ctrlPr>
+                            <a:rPr lang="en-US" i="1">
+                              <a:latin typeface="Cambria Math" panose="02040503050406030204" pitchFamily="18" charset="0"/>
+                              <a:ea typeface="Cambria Math" panose="02040503050406030204" pitchFamily="18" charset="0"/>
+                            </a:rPr>
+                          </m:ctrlPr>
+                        </m:sSubPr>
+                        <m:e>
+                          <m:r>
+                            <a:rPr lang="en-US" i="1">
+                              <a:latin typeface="Cambria Math" panose="02040503050406030204" pitchFamily="18" charset="0"/>
+                              <a:ea typeface="Cambria Math" panose="02040503050406030204" pitchFamily="18" charset="0"/>
+                            </a:rPr>
+                            <m:t>𝜀</m:t>
+                          </m:r>
+                        </m:e>
+                        <m:sub>
+                          <m:r>
+                            <a:rPr lang="en-US" i="1">
+                              <a:latin typeface="Cambria Math" panose="02040503050406030204" pitchFamily="18" charset="0"/>
+                              <a:ea typeface="Cambria Math" panose="02040503050406030204" pitchFamily="18" charset="0"/>
+                            </a:rPr>
+                            <m:t>𝑡</m:t>
+                          </m:r>
+                        </m:sub>
+                      </m:sSub>
+                      <m:r>
+                        <a:rPr lang="en-US" b="0" i="1" smtClean="0">
+                          <a:latin typeface="Cambria Math" panose="02040503050406030204" pitchFamily="18" charset="0"/>
+                          <a:ea typeface="Cambria Math" panose="02040503050406030204" pitchFamily="18" charset="0"/>
+                        </a:rPr>
+                        <m:t>~</m:t>
+                      </m:r>
+                      <m:r>
+                        <a:rPr lang="en-US" b="0" i="1" smtClean="0">
+                          <a:latin typeface="Cambria Math" panose="02040503050406030204" pitchFamily="18" charset="0"/>
+                          <a:ea typeface="Cambria Math" panose="02040503050406030204" pitchFamily="18" charset="0"/>
+                        </a:rPr>
+                        <m:t>𝑁𝑜𝑟𝑚𝑎𝑙</m:t>
+                      </m:r>
+                      <m:r>
+                        <a:rPr lang="en-US" b="0" i="1" smtClean="0">
+                          <a:latin typeface="Cambria Math" panose="02040503050406030204" pitchFamily="18" charset="0"/>
+                          <a:ea typeface="Cambria Math" panose="02040503050406030204" pitchFamily="18" charset="0"/>
+                        </a:rPr>
+                        <m:t>(0,</m:t>
+                      </m:r>
+                      <m:sSubSup>
+                        <m:sSubSupPr>
+                          <m:ctrlPr>
+                            <a:rPr lang="en-US" b="0" i="1" smtClean="0">
+                              <a:latin typeface="Cambria Math" panose="02040503050406030204" pitchFamily="18" charset="0"/>
+                              <a:ea typeface="Cambria Math" panose="02040503050406030204" pitchFamily="18" charset="0"/>
+                            </a:rPr>
+                          </m:ctrlPr>
+                        </m:sSubSupPr>
+                        <m:e>
+                          <m:r>
+                            <a:rPr lang="en-US" b="0" i="1" smtClean="0">
+                              <a:latin typeface="Cambria Math" panose="02040503050406030204" pitchFamily="18" charset="0"/>
+                              <a:ea typeface="Cambria Math" panose="02040503050406030204" pitchFamily="18" charset="0"/>
+                            </a:rPr>
+                            <m:t>𝜎</m:t>
+                          </m:r>
+                        </m:e>
+                        <m:sub>
+                          <m:r>
+                            <a:rPr lang="en-US" b="0" i="1" smtClean="0">
+                              <a:latin typeface="Cambria Math" panose="02040503050406030204" pitchFamily="18" charset="0"/>
+                              <a:ea typeface="Cambria Math" panose="02040503050406030204" pitchFamily="18" charset="0"/>
+                            </a:rPr>
+                            <m:t>𝜀</m:t>
+                          </m:r>
+                        </m:sub>
+                        <m:sup>
+                          <m:r>
+                            <a:rPr lang="en-US" b="0" i="1" smtClean="0">
+                              <a:latin typeface="Cambria Math" panose="02040503050406030204" pitchFamily="18" charset="0"/>
+                              <a:ea typeface="Cambria Math" panose="02040503050406030204" pitchFamily="18" charset="0"/>
+                            </a:rPr>
+                            <m:t>2</m:t>
+                          </m:r>
+                        </m:sup>
+                      </m:sSubSup>
+                      <m:r>
+                        <a:rPr lang="en-US" b="0" i="1" smtClean="0">
+                          <a:latin typeface="Cambria Math" panose="02040503050406030204" pitchFamily="18" charset="0"/>
+                          <a:ea typeface="Cambria Math" panose="02040503050406030204" pitchFamily="18" charset="0"/>
+                        </a:rPr>
+                        <m:t>)</m:t>
+                      </m:r>
+                    </m:oMath>
+                  </m:oMathPara>
+                </a14:m>
+                <a:endParaRPr lang="en-US" dirty="0" smtClean="0">
+                  <a:latin typeface="Cambria Math" panose="02040503050406030204" pitchFamily="18" charset="0"/>
+                  <a:ea typeface="Cambria Math" panose="02040503050406030204" pitchFamily="18" charset="0"/>
+                </a:endParaRPr>
+              </a:p>
+              <a:p>
+                <a:pPr marL="457200" lvl="1" indent="0">
+                  <a:buNone/>
+                </a:pPr>
+                <a:r>
+                  <a:rPr lang="en-US" dirty="0" smtClean="0">
+                    <a:latin typeface="Cambria Math" panose="02040503050406030204" pitchFamily="18" charset="0"/>
+                    <a:ea typeface="Cambria Math" panose="02040503050406030204" pitchFamily="18" charset="0"/>
+                  </a:rPr>
+                  <a:t>And parameters are estimated by fitting to an abundance index</a:t>
+                </a:r>
+              </a:p>
+              <a:p>
+                <a:pPr marL="457200" lvl="1" indent="0">
+                  <a:buNone/>
+                </a:pPr>
+                <a14:m>
+                  <m:oMathPara xmlns:m="http://schemas.openxmlformats.org/officeDocument/2006/math">
+                    <m:oMathParaPr>
+                      <m:jc m:val="centerGroup"/>
+                    </m:oMathParaPr>
+                    <m:oMath xmlns:m="http://schemas.openxmlformats.org/officeDocument/2006/math">
+                      <m:func>
+                        <m:funcPr>
+                          <m:ctrlPr>
+                            <a:rPr lang="en-US" b="0" i="1" smtClean="0">
+                              <a:latin typeface="Cambria Math" panose="02040503050406030204" pitchFamily="18" charset="0"/>
+                              <a:ea typeface="Cambria Math" panose="02040503050406030204" pitchFamily="18" charset="0"/>
+                            </a:rPr>
+                          </m:ctrlPr>
+                        </m:funcPr>
+                        <m:fName>
+                          <m:r>
+                            <m:rPr>
+                              <m:sty m:val="p"/>
+                            </m:rPr>
+                            <a:rPr lang="en-US" b="0" i="0" smtClean="0">
+                              <a:latin typeface="Cambria Math" panose="02040503050406030204" pitchFamily="18" charset="0"/>
+                              <a:ea typeface="Cambria Math" panose="02040503050406030204" pitchFamily="18" charset="0"/>
+                            </a:rPr>
+                            <m:t>log</m:t>
+                          </m:r>
+                        </m:fName>
+                        <m:e>
+                          <m:d>
+                            <m:dPr>
+                              <m:ctrlPr>
+                                <a:rPr lang="en-US" b="0" i="1" smtClean="0">
+                                  <a:latin typeface="Cambria Math" panose="02040503050406030204" pitchFamily="18" charset="0"/>
+                                  <a:ea typeface="Cambria Math" panose="02040503050406030204" pitchFamily="18" charset="0"/>
+                                </a:rPr>
+                              </m:ctrlPr>
+                            </m:dPr>
+                            <m:e>
+                              <m:sSub>
+                                <m:sSubPr>
+                                  <m:ctrlPr>
+                                    <a:rPr lang="en-US" b="0" i="1" smtClean="0">
+                                      <a:latin typeface="Cambria Math" panose="02040503050406030204" pitchFamily="18" charset="0"/>
+                                      <a:ea typeface="Cambria Math" panose="02040503050406030204" pitchFamily="18" charset="0"/>
+                                    </a:rPr>
+                                  </m:ctrlPr>
+                                </m:sSubPr>
+                                <m:e>
+                                  <m:r>
+                                    <a:rPr lang="en-US" b="0" i="1" smtClean="0">
+                                      <a:latin typeface="Cambria Math" panose="02040503050406030204" pitchFamily="18" charset="0"/>
+                                      <a:ea typeface="Cambria Math" panose="02040503050406030204" pitchFamily="18" charset="0"/>
+                                    </a:rPr>
+                                    <m:t>𝑏</m:t>
+                                  </m:r>
+                                </m:e>
+                                <m:sub>
+                                  <m:r>
+                                    <a:rPr lang="en-US" b="0" i="1" smtClean="0">
+                                      <a:latin typeface="Cambria Math" panose="02040503050406030204" pitchFamily="18" charset="0"/>
+                                      <a:ea typeface="Cambria Math" panose="02040503050406030204" pitchFamily="18" charset="0"/>
+                                    </a:rPr>
+                                    <m:t>𝑡</m:t>
+                                  </m:r>
+                                </m:sub>
+                              </m:sSub>
+                            </m:e>
+                          </m:d>
+                        </m:e>
+                      </m:func>
+                      <m:r>
+                        <a:rPr lang="en-US" b="0" i="1" smtClean="0">
+                          <a:latin typeface="Cambria Math" panose="02040503050406030204" pitchFamily="18" charset="0"/>
+                          <a:ea typeface="Cambria Math" panose="02040503050406030204" pitchFamily="18" charset="0"/>
+                        </a:rPr>
+                        <m:t>~</m:t>
+                      </m:r>
+                      <m:r>
+                        <a:rPr lang="en-US" b="0" i="1" smtClean="0">
+                          <a:latin typeface="Cambria Math" panose="02040503050406030204" pitchFamily="18" charset="0"/>
+                          <a:ea typeface="Cambria Math" panose="02040503050406030204" pitchFamily="18" charset="0"/>
+                        </a:rPr>
+                        <m:t>𝑁𝑜𝑟𝑚𝑎𝑙</m:t>
+                      </m:r>
+                      <m:d>
+                        <m:dPr>
+                          <m:ctrlPr>
+                            <a:rPr lang="en-US" b="0" i="1" smtClean="0">
+                              <a:latin typeface="Cambria Math" panose="02040503050406030204" pitchFamily="18" charset="0"/>
+                              <a:ea typeface="Cambria Math" panose="02040503050406030204" pitchFamily="18" charset="0"/>
+                            </a:rPr>
+                          </m:ctrlPr>
+                        </m:dPr>
+                        <m:e>
+                          <m:func>
+                            <m:funcPr>
+                              <m:ctrlPr>
+                                <a:rPr lang="en-US" b="0" i="1" smtClean="0">
+                                  <a:latin typeface="Cambria Math" panose="02040503050406030204" pitchFamily="18" charset="0"/>
+                                  <a:ea typeface="Cambria Math" panose="02040503050406030204" pitchFamily="18" charset="0"/>
+                                </a:rPr>
+                              </m:ctrlPr>
+                            </m:funcPr>
+                            <m:fName>
+                              <m:r>
+                                <m:rPr>
+                                  <m:sty m:val="p"/>
+                                </m:rPr>
+                                <a:rPr lang="en-US" b="0" i="0" smtClean="0">
+                                  <a:latin typeface="Cambria Math" panose="02040503050406030204" pitchFamily="18" charset="0"/>
+                                  <a:ea typeface="Cambria Math" panose="02040503050406030204" pitchFamily="18" charset="0"/>
+                                </a:rPr>
+                                <m:t>log</m:t>
+                              </m:r>
+                            </m:fName>
+                            <m:e>
+                              <m:d>
+                                <m:dPr>
+                                  <m:ctrlPr>
+                                    <a:rPr lang="en-US" b="0" i="1" smtClean="0">
+                                      <a:latin typeface="Cambria Math" panose="02040503050406030204" pitchFamily="18" charset="0"/>
+                                      <a:ea typeface="Cambria Math" panose="02040503050406030204" pitchFamily="18" charset="0"/>
+                                    </a:rPr>
+                                  </m:ctrlPr>
+                                </m:dPr>
+                                <m:e>
+                                  <m:r>
+                                    <a:rPr lang="en-US" b="0" i="1" smtClean="0">
+                                      <a:latin typeface="Cambria Math" panose="02040503050406030204" pitchFamily="18" charset="0"/>
+                                      <a:ea typeface="Cambria Math" panose="02040503050406030204" pitchFamily="18" charset="0"/>
+                                    </a:rPr>
+                                    <m:t>𝛿</m:t>
+                                  </m:r>
+                                  <m:sSub>
+                                    <m:sSubPr>
+                                      <m:ctrlPr>
+                                        <a:rPr lang="en-US" b="0" i="1" smtClean="0">
+                                          <a:latin typeface="Cambria Math" panose="02040503050406030204" pitchFamily="18" charset="0"/>
+                                          <a:ea typeface="Cambria Math" panose="02040503050406030204" pitchFamily="18" charset="0"/>
+                                        </a:rPr>
+                                      </m:ctrlPr>
+                                    </m:sSubPr>
+                                    <m:e>
+                                      <m:r>
+                                        <a:rPr lang="en-US" b="0" i="1" smtClean="0">
+                                          <a:latin typeface="Cambria Math" panose="02040503050406030204" pitchFamily="18" charset="0"/>
+                                          <a:ea typeface="Cambria Math" panose="02040503050406030204" pitchFamily="18" charset="0"/>
+                                        </a:rPr>
+                                        <m:t>𝛽</m:t>
+                                      </m:r>
+                                    </m:e>
+                                    <m:sub>
+                                      <m:r>
+                                        <a:rPr lang="en-US" b="0" i="1" smtClean="0">
+                                          <a:latin typeface="Cambria Math" panose="02040503050406030204" pitchFamily="18" charset="0"/>
+                                          <a:ea typeface="Cambria Math" panose="02040503050406030204" pitchFamily="18" charset="0"/>
+                                        </a:rPr>
+                                        <m:t>𝑡</m:t>
+                                      </m:r>
+                                    </m:sub>
+                                  </m:sSub>
+                                </m:e>
+                              </m:d>
+                              <m:r>
+                                <a:rPr lang="en-US" b="0" i="1" smtClean="0">
+                                  <a:latin typeface="Cambria Math" panose="02040503050406030204" pitchFamily="18" charset="0"/>
+                                  <a:ea typeface="Cambria Math" panose="02040503050406030204" pitchFamily="18" charset="0"/>
+                                </a:rPr>
+                                <m:t>,</m:t>
+                              </m:r>
+                              <m:sSubSup>
+                                <m:sSubSupPr>
+                                  <m:ctrlPr>
+                                    <a:rPr lang="en-US" b="0" i="1" smtClean="0">
+                                      <a:latin typeface="Cambria Math" panose="02040503050406030204" pitchFamily="18" charset="0"/>
+                                      <a:ea typeface="Cambria Math" panose="02040503050406030204" pitchFamily="18" charset="0"/>
+                                    </a:rPr>
+                                  </m:ctrlPr>
+                                </m:sSubSupPr>
+                                <m:e>
+                                  <m:r>
+                                    <a:rPr lang="en-US" b="0" i="1" smtClean="0">
+                                      <a:latin typeface="Cambria Math" panose="02040503050406030204" pitchFamily="18" charset="0"/>
+                                      <a:ea typeface="Cambria Math" panose="02040503050406030204" pitchFamily="18" charset="0"/>
+                                    </a:rPr>
+                                    <m:t>𝜎</m:t>
+                                  </m:r>
+                                </m:e>
+                                <m:sub>
+                                  <m:r>
+                                    <a:rPr lang="en-US" b="0" i="1" smtClean="0">
+                                      <a:latin typeface="Cambria Math" panose="02040503050406030204" pitchFamily="18" charset="0"/>
+                                      <a:ea typeface="Cambria Math" panose="02040503050406030204" pitchFamily="18" charset="0"/>
+                                    </a:rPr>
+                                    <m:t>𝑏</m:t>
+                                  </m:r>
+                                </m:sub>
+                                <m:sup>
+                                  <m:r>
+                                    <a:rPr lang="en-US" b="0" i="1" smtClean="0">
+                                      <a:latin typeface="Cambria Math" panose="02040503050406030204" pitchFamily="18" charset="0"/>
+                                      <a:ea typeface="Cambria Math" panose="02040503050406030204" pitchFamily="18" charset="0"/>
+                                    </a:rPr>
+                                    <m:t>2</m:t>
+                                  </m:r>
+                                </m:sup>
+                              </m:sSubSup>
+                            </m:e>
+                          </m:func>
+                        </m:e>
+                      </m:d>
+                    </m:oMath>
+                  </m:oMathPara>
+                </a14:m>
+                <a:endParaRPr lang="en-US" dirty="0" smtClean="0">
+                  <a:latin typeface="Cambria Math" panose="02040503050406030204" pitchFamily="18" charset="0"/>
+                  <a:ea typeface="Cambria Math" panose="02040503050406030204" pitchFamily="18" charset="0"/>
+                </a:endParaRPr>
+              </a:p>
+              <a:p>
+                <a:pPr lvl="1"/>
+                <a14:m>
+                  <m:oMath xmlns:m="http://schemas.openxmlformats.org/officeDocument/2006/math">
+                    <m:sSub>
+                      <m:sSubPr>
+                        <m:ctrlPr>
+                          <a:rPr lang="en-US" i="1">
+                            <a:latin typeface="Cambria Math" panose="02040503050406030204" pitchFamily="18" charset="0"/>
+                            <a:ea typeface="Cambria Math" panose="02040503050406030204" pitchFamily="18" charset="0"/>
+                          </a:rPr>
+                        </m:ctrlPr>
+                      </m:sSubPr>
+                      <m:e>
+                        <m:r>
+                          <a:rPr lang="en-US" i="1">
+                            <a:latin typeface="Cambria Math" panose="02040503050406030204" pitchFamily="18" charset="0"/>
+                            <a:ea typeface="Cambria Math" panose="02040503050406030204" pitchFamily="18" charset="0"/>
+                          </a:rPr>
+                          <m:t>𝑏</m:t>
+                        </m:r>
+                      </m:e>
+                      <m:sub>
+                        <m:r>
+                          <a:rPr lang="en-US" i="1">
+                            <a:latin typeface="Cambria Math" panose="02040503050406030204" pitchFamily="18" charset="0"/>
+                            <a:ea typeface="Cambria Math" panose="02040503050406030204" pitchFamily="18" charset="0"/>
+                          </a:rPr>
+                          <m:t>𝑡</m:t>
+                        </m:r>
+                      </m:sub>
+                    </m:sSub>
+                  </m:oMath>
+                </a14:m>
+                <a:r>
+                  <a:rPr lang="en-US" dirty="0" smtClean="0">
+                    <a:latin typeface="Cambria Math" panose="02040503050406030204" pitchFamily="18" charset="0"/>
+                    <a:ea typeface="Cambria Math" panose="02040503050406030204" pitchFamily="18" charset="0"/>
+                  </a:rPr>
+                  <a:t> is an abundance index that is proportional to abundance</a:t>
+                </a:r>
+              </a:p>
+              <a:p>
+                <a:pPr lvl="1"/>
+                <a14:m>
+                  <m:oMath xmlns:m="http://schemas.openxmlformats.org/officeDocument/2006/math">
+                    <m:r>
+                      <a:rPr lang="en-US" i="1">
+                        <a:latin typeface="Cambria Math" panose="02040503050406030204" pitchFamily="18" charset="0"/>
+                        <a:ea typeface="Cambria Math" panose="02040503050406030204" pitchFamily="18" charset="0"/>
+                      </a:rPr>
+                      <m:t>𝛿</m:t>
+                    </m:r>
+                  </m:oMath>
+                </a14:m>
+                <a:r>
+                  <a:rPr lang="en-US" dirty="0" smtClean="0">
+                    <a:latin typeface="Cambria Math" panose="02040503050406030204" pitchFamily="18" charset="0"/>
+                    <a:ea typeface="Cambria Math" panose="02040503050406030204" pitchFamily="18" charset="0"/>
+                  </a:rPr>
+                  <a:t> is the proportionality constant (“catchability coefficient)</a:t>
+                </a:r>
+                <a:endParaRPr lang="en-GB" dirty="0"/>
+              </a:p>
+            </p:txBody>
+          </p:sp>
+        </mc:Choice>
+        <mc:Fallback>
+          <p:sp>
+            <p:nvSpPr>
+              <p:cNvPr id="3" name="Content Placeholder 2"/>
+              <p:cNvSpPr>
+                <a:spLocks noGrp="1" noRot="1" noChangeAspect="1" noMove="1" noResize="1" noEditPoints="1" noAdjustHandles="1" noChangeArrowheads="1" noChangeShapeType="1" noTextEdit="1"/>
+              </p:cNvSpPr>
+              <p:nvPr>
+                <p:ph idx="1"/>
+              </p:nvPr>
+            </p:nvSpPr>
+            <p:spPr>
+              <a:blipFill>
+                <a:blip r:embed="rId2"/>
+                <a:stretch>
+                  <a:fillRect l="-610" t="-1436"/>
+                </a:stretch>
+              </a:blipFill>
+            </p:spPr>
+            <p:txBody>
+              <a:bodyPr/>
+              <a:lstStyle/>
+              <a:p>
+                <a:r>
+                  <a:rPr lang="en-GB">
+                    <a:noFill/>
+                  </a:rPr>
+                  <a:t> </a:t>
+                </a:r>
+              </a:p>
+            </p:txBody>
+          </p:sp>
+        </mc:Fallback>
+      </mc:AlternateContent>
+    </p:spTree>
+    <p:extLst>
+      <p:ext uri="{BB962C8B-B14F-4D97-AF65-F5344CB8AC3E}">
+        <p14:creationId xmlns:p14="http://schemas.microsoft.com/office/powerpoint/2010/main" val="294961379"/>
+      </p:ext>
+    </p:extLst>
+  </p:cSld>
+  <p:clrMapOvr>
+    <a:masterClrMapping/>
+  </p:clrMapOvr>
+  <p:timing>
+    <p:tnLst>
+      <p:par>
+        <p:cTn id="1" dur="indefinite" restart="never" nodeType="tmRoot">
+          <p:childTnLst>
+            <p:seq concurrent="1" nextAc="seek">
+              <p:cTn id="2" dur="indefinite" nodeType="mainSeq">
+                <p:childTnLst>
+                  <p:par>
+                    <p:cTn id="3" fill="hold">
+                      <p:stCondLst>
+                        <p:cond delay="indefinite"/>
+                      </p:stCondLst>
+                      <p:childTnLst>
+                        <p:par>
+                          <p:cTn id="4" fill="hold">
+                            <p:stCondLst>
+                              <p:cond delay="0"/>
+                            </p:stCondLst>
+                            <p:childTnLst>
+                              <p:par>
+                                <p:cTn id="5" presetID="1" presetClass="entr" presetSubtype="0" fill="hold" nodeType="clickEffect">
+                                  <p:stCondLst>
+                                    <p:cond delay="0"/>
+                                  </p:stCondLst>
+                                  <p:childTnLst>
+                                    <p:set>
+                                      <p:cBhvr>
+                                        <p:cTn id="6" dur="1" fill="hold">
+                                          <p:stCondLst>
+                                            <p:cond delay="0"/>
+                                          </p:stCondLst>
+                                        </p:cTn>
+                                        <p:tgtEl>
+                                          <p:spTgt spid="3">
+                                            <p:txEl>
+                                              <p:pRg st="1" end="1"/>
+                                            </p:txEl>
+                                          </p:spTgt>
+                                        </p:tgtEl>
+                                        <p:attrNameLst>
+                                          <p:attrName>style.visibility</p:attrName>
+                                        </p:attrNameLst>
+                                      </p:cBhvr>
+                                      <p:to>
+                                        <p:strVal val="visible"/>
+                                      </p:to>
+                                    </p:set>
+                                  </p:childTnLst>
+                                </p:cTn>
+                              </p:par>
+                              <p:par>
+                                <p:cTn id="7" presetID="1" presetClass="entr" presetSubtype="0" fill="hold" nodeType="withEffect">
+                                  <p:stCondLst>
+                                    <p:cond delay="0"/>
+                                  </p:stCondLst>
+                                  <p:childTnLst>
+                                    <p:set>
+                                      <p:cBhvr>
+                                        <p:cTn id="8" dur="1" fill="hold">
+                                          <p:stCondLst>
+                                            <p:cond delay="0"/>
+                                          </p:stCondLst>
+                                        </p:cTn>
+                                        <p:tgtEl>
+                                          <p:spTgt spid="3">
+                                            <p:txEl>
+                                              <p:pRg st="2" end="2"/>
+                                            </p:txEl>
+                                          </p:spTgt>
+                                        </p:tgtEl>
+                                        <p:attrNameLst>
+                                          <p:attrName>style.visibility</p:attrName>
+                                        </p:attrNameLst>
+                                      </p:cBhvr>
+                                      <p:to>
+                                        <p:strVal val="visible"/>
+                                      </p:to>
+                                    </p:set>
+                                  </p:childTnLst>
+                                </p:cTn>
+                              </p:par>
+                              <p:par>
+                                <p:cTn id="9" presetID="1" presetClass="entr" presetSubtype="0" fill="hold" nodeType="withEffect">
+                                  <p:stCondLst>
+                                    <p:cond delay="0"/>
+                                  </p:stCondLst>
+                                  <p:childTnLst>
+                                    <p:set>
+                                      <p:cBhvr>
+                                        <p:cTn id="10" dur="1" fill="hold">
+                                          <p:stCondLst>
+                                            <p:cond delay="0"/>
+                                          </p:stCondLst>
+                                        </p:cTn>
+                                        <p:tgtEl>
+                                          <p:spTgt spid="3">
+                                            <p:txEl>
+                                              <p:pRg st="3" end="3"/>
+                                            </p:txEl>
+                                          </p:spTgt>
+                                        </p:tgtEl>
+                                        <p:attrNameLst>
+                                          <p:attrName>style.visibility</p:attrName>
+                                        </p:attrNameLst>
+                                      </p:cBhvr>
+                                      <p:to>
+                                        <p:strVal val="visible"/>
+                                      </p:to>
+                                    </p:set>
+                                  </p:childTnLst>
+                                </p:cTn>
+                              </p:par>
+                              <p:par>
+                                <p:cTn id="11" presetID="1" presetClass="entr" presetSubtype="0" fill="hold" nodeType="withEffect">
+                                  <p:stCondLst>
+                                    <p:cond delay="0"/>
+                                  </p:stCondLst>
+                                  <p:childTnLst>
+                                    <p:set>
+                                      <p:cBhvr>
+                                        <p:cTn id="12" dur="1" fill="hold">
+                                          <p:stCondLst>
+                                            <p:cond delay="0"/>
+                                          </p:stCondLst>
+                                        </p:cTn>
+                                        <p:tgtEl>
+                                          <p:spTgt spid="3">
+                                            <p:txEl>
+                                              <p:pRg st="4" end="4"/>
+                                            </p:txEl>
+                                          </p:spTgt>
+                                        </p:tgtEl>
+                                        <p:attrNameLst>
+                                          <p:attrName>style.visibility</p:attrName>
+                                        </p:attrNameLst>
+                                      </p:cBhvr>
+                                      <p:to>
+                                        <p:strVal val="visible"/>
+                                      </p:to>
+                                    </p:set>
+                                  </p:childTnLst>
+                                </p:cTn>
+                              </p:par>
+                              <p:par>
+                                <p:cTn id="13" presetID="1" presetClass="entr" presetSubtype="0" fill="hold" nodeType="withEffect">
+                                  <p:stCondLst>
+                                    <p:cond delay="0"/>
+                                  </p:stCondLst>
+                                  <p:childTnLst>
+                                    <p:set>
+                                      <p:cBhvr>
+                                        <p:cTn id="14" dur="1" fill="hold">
+                                          <p:stCondLst>
+                                            <p:cond delay="0"/>
+                                          </p:stCondLst>
+                                        </p:cTn>
+                                        <p:tgtEl>
+                                          <p:spTgt spid="3">
+                                            <p:txEl>
+                                              <p:pRg st="5" end="5"/>
+                                            </p:txEl>
+                                          </p:spTgt>
+                                        </p:tgtEl>
+                                        <p:attrNameLst>
+                                          <p:attrName>style.visibility</p:attrName>
+                                        </p:attrNameLst>
+                                      </p:cBhvr>
+                                      <p:to>
+                                        <p:strVal val="visible"/>
+                                      </p:to>
+                                    </p:set>
+                                  </p:childTnLst>
+                                </p:cTn>
+                              </p:par>
+                              <p:par>
+                                <p:cTn id="15" presetID="1" presetClass="entr" presetSubtype="0" fill="hold" nodeType="withEffect">
+                                  <p:stCondLst>
+                                    <p:cond delay="0"/>
+                                  </p:stCondLst>
+                                  <p:childTnLst>
+                                    <p:set>
+                                      <p:cBhvr>
+                                        <p:cTn id="16" dur="1" fill="hold">
+                                          <p:stCondLst>
+                                            <p:cond delay="0"/>
+                                          </p:stCondLst>
+                                        </p:cTn>
+                                        <p:tgtEl>
+                                          <p:spTgt spid="3">
+                                            <p:txEl>
+                                              <p:pRg st="6" end="6"/>
+                                            </p:txEl>
+                                          </p:spTgt>
+                                        </p:tgtEl>
+                                        <p:attrNameLst>
+                                          <p:attrName>style.visibility</p:attrName>
+                                        </p:attrNameLst>
+                                      </p:cBhvr>
+                                      <p:to>
+                                        <p:strVal val="visible"/>
+                                      </p:to>
+                                    </p:set>
+                                  </p:childTnLst>
+                                </p:cTn>
+                              </p:par>
+                              <p:par>
+                                <p:cTn id="17" presetID="1" presetClass="entr" presetSubtype="0" fill="hold" nodeType="withEffect">
+                                  <p:stCondLst>
+                                    <p:cond delay="0"/>
+                                  </p:stCondLst>
+                                  <p:childTnLst>
+                                    <p:set>
+                                      <p:cBhvr>
+                                        <p:cTn id="18" dur="1" fill="hold">
+                                          <p:stCondLst>
+                                            <p:cond delay="0"/>
+                                          </p:stCondLst>
+                                        </p:cTn>
+                                        <p:tgtEl>
+                                          <p:spTgt spid="3">
+                                            <p:txEl>
+                                              <p:pRg st="7" end="7"/>
+                                            </p:txEl>
+                                          </p:spTgt>
+                                        </p:tgtEl>
+                                        <p:attrNameLst>
+                                          <p:attrName>style.visibility</p:attrName>
+                                        </p:attrNameLst>
+                                      </p:cBhvr>
+                                      <p:to>
+                                        <p:strVal val="visible"/>
+                                      </p:to>
+                                    </p:set>
+                                  </p:childTnLst>
+                                </p:cTn>
+                              </p:par>
+                              <p:par>
+                                <p:cTn id="19" presetID="1" presetClass="entr" presetSubtype="0" fill="hold" nodeType="withEffect">
+                                  <p:stCondLst>
+                                    <p:cond delay="0"/>
+                                  </p:stCondLst>
+                                  <p:childTnLst>
+                                    <p:set>
+                                      <p:cBhvr>
+                                        <p:cTn id="20" dur="1" fill="hold">
+                                          <p:stCondLst>
+                                            <p:cond delay="0"/>
+                                          </p:stCondLst>
+                                        </p:cTn>
+                                        <p:tgtEl>
+                                          <p:spTgt spid="3">
+                                            <p:txEl>
+                                              <p:pRg st="8" end="8"/>
+                                            </p:txEl>
+                                          </p:spTgt>
+                                        </p:tgtEl>
+                                        <p:attrNameLst>
+                                          <p:attrName>style.visibility</p:attrName>
+                                        </p:attrNameLst>
+                                      </p:cBhvr>
+                                      <p:to>
+                                        <p:strVal val="visible"/>
+                                      </p:to>
+                                    </p:set>
+                                  </p:childTnLst>
+                                </p:cTn>
+                              </p:par>
+                              <p:par>
+                                <p:cTn id="21" presetID="1" presetClass="entr" presetSubtype="0" fill="hold" nodeType="withEffect">
+                                  <p:stCondLst>
+                                    <p:cond delay="0"/>
+                                  </p:stCondLst>
+                                  <p:childTnLst>
+                                    <p:set>
+                                      <p:cBhvr>
+                                        <p:cTn id="22" dur="1" fill="hold">
+                                          <p:stCondLst>
+                                            <p:cond delay="0"/>
+                                          </p:stCondLst>
+                                        </p:cTn>
+                                        <p:tgtEl>
+                                          <p:spTgt spid="3">
+                                            <p:txEl>
+                                              <p:pRg st="9" end="9"/>
+                                            </p:txEl>
+                                          </p:spTgt>
+                                        </p:tgtEl>
+                                        <p:attrNameLst>
+                                          <p:attrName>style.visibility</p:attrName>
+                                        </p:attrNameLst>
+                                      </p:cBhvr>
+                                      <p:to>
+                                        <p:strVal val="visible"/>
+                                      </p:to>
+                                    </p:set>
+                                  </p:childTnLst>
+                                </p:cTn>
+                              </p:par>
+                              <p:par>
+                                <p:cTn id="23" presetID="1" presetClass="entr" presetSubtype="0" fill="hold" nodeType="withEffect">
+                                  <p:stCondLst>
+                                    <p:cond delay="0"/>
+                                  </p:stCondLst>
+                                  <p:childTnLst>
+                                    <p:set>
+                                      <p:cBhvr>
+                                        <p:cTn id="24" dur="1" fill="hold">
+                                          <p:stCondLst>
+                                            <p:cond delay="0"/>
+                                          </p:stCondLst>
+                                        </p:cTn>
+                                        <p:tgtEl>
+                                          <p:spTgt spid="3">
+                                            <p:txEl>
+                                              <p:pRg st="10" end="10"/>
+                                            </p:txEl>
+                                          </p:spTgt>
+                                        </p:tgtEl>
+                                        <p:attrNameLst>
+                                          <p:attrName>style.visibility</p:attrName>
+                                        </p:attrNameLst>
+                                      </p:cBhvr>
+                                      <p:to>
+                                        <p:strVal val="visible"/>
+                                      </p:to>
+                                    </p:set>
+                                  </p:childTnLst>
+                                </p:cTn>
+                              </p:par>
+                              <p:par>
+                                <p:cTn id="25" presetID="1" presetClass="entr" presetSubtype="0" fill="hold" nodeType="withEffect">
+                                  <p:stCondLst>
+                                    <p:cond delay="0"/>
+                                  </p:stCondLst>
+                                  <p:childTnLst>
+                                    <p:set>
+                                      <p:cBhvr>
+                                        <p:cTn id="26" dur="1" fill="hold">
+                                          <p:stCondLst>
+                                            <p:cond delay="0"/>
+                                          </p:stCondLst>
+                                        </p:cTn>
+                                        <p:tgtEl>
+                                          <p:spTgt spid="3">
+                                            <p:txEl>
+                                              <p:pRg st="11" end="11"/>
+                                            </p:txEl>
+                                          </p:spTgt>
+                                        </p:tgtEl>
+                                        <p:attrNameLst>
+                                          <p:attrName>style.visibility</p:attrName>
+                                        </p:attrNameLst>
+                                      </p:cBhvr>
+                                      <p:to>
+                                        <p:strVal val="visible"/>
+                                      </p:to>
+                                    </p:set>
+                                  </p:childTnLst>
+                                </p:cTn>
+                              </p:par>
+                              <p:par>
+                                <p:cTn id="27" presetID="1" presetClass="entr" presetSubtype="0" fill="hold" nodeType="withEffect">
+                                  <p:stCondLst>
+                                    <p:cond delay="0"/>
+                                  </p:stCondLst>
+                                  <p:childTnLst>
+                                    <p:set>
+                                      <p:cBhvr>
+                                        <p:cTn id="28" dur="1" fill="hold">
+                                          <p:stCondLst>
+                                            <p:cond delay="0"/>
+                                          </p:stCondLst>
+                                        </p:cTn>
+                                        <p:tgtEl>
+                                          <p:spTgt spid="3">
+                                            <p:txEl>
+                                              <p:pRg st="12" end="12"/>
+                                            </p:txEl>
+                                          </p:spTgt>
+                                        </p:tgtEl>
+                                        <p:attrNameLst>
+                                          <p:attrName>style.visibility</p:attrName>
+                                        </p:attrNameLst>
+                                      </p:cBhvr>
+                                      <p:to>
+                                        <p:strVal val="visible"/>
+                                      </p:to>
+                                    </p:set>
+                                  </p:childTnLst>
+                                </p:cTn>
+                              </p:par>
+                              <p:par>
+                                <p:cTn id="29" presetID="1" presetClass="entr" presetSubtype="0" fill="hold" nodeType="withEffect">
+                                  <p:stCondLst>
+                                    <p:cond delay="0"/>
+                                  </p:stCondLst>
+                                  <p:childTnLst>
+                                    <p:set>
+                                      <p:cBhvr>
+                                        <p:cTn id="30" dur="1" fill="hold">
+                                          <p:stCondLst>
+                                            <p:cond delay="0"/>
+                                          </p:stCondLst>
+                                        </p:cTn>
+                                        <p:tgtEl>
+                                          <p:spTgt spid="3">
+                                            <p:txEl>
+                                              <p:pRg st="13" end="13"/>
+                                            </p:txEl>
+                                          </p:spTgt>
+                                        </p:tgtEl>
+                                        <p:attrNameLst>
+                                          <p:attrName>style.visibility</p:attrName>
+                                        </p:attrNameLst>
+                                      </p:cBhvr>
+                                      <p:to>
+                                        <p:strVal val="visible"/>
+                                      </p:to>
+                                    </p:set>
+                                  </p:childTnLst>
+                                </p:cTn>
+                              </p:par>
+                              <p:par>
+                                <p:cTn id="31" presetID="1" presetClass="entr" presetSubtype="0" fill="hold" nodeType="withEffect">
+                                  <p:stCondLst>
+                                    <p:cond delay="0"/>
+                                  </p:stCondLst>
+                                  <p:childTnLst>
+                                    <p:set>
+                                      <p:cBhvr>
+                                        <p:cTn id="32" dur="1" fill="hold">
+                                          <p:stCondLst>
+                                            <p:cond delay="0"/>
+                                          </p:stCondLst>
+                                        </p:cTn>
+                                        <p:tgtEl>
+                                          <p:spTgt spid="3">
+                                            <p:txEl>
+                                              <p:pRg st="14" end="14"/>
+                                            </p:txEl>
+                                          </p:spTgt>
+                                        </p:tgtEl>
+                                        <p:attrNameLst>
+                                          <p:attrName>style.visibility</p:attrName>
+                                        </p:attrNameLst>
+                                      </p:cBhvr>
+                                      <p:to>
+                                        <p:strVal val="visible"/>
+                                      </p:to>
+                                    </p:set>
+                                  </p:childTnLst>
+                                </p:cTn>
+                              </p:par>
+                              <p:par>
+                                <p:cTn id="33" presetID="1" presetClass="entr" presetSubtype="0" fill="hold" nodeType="withEffect">
+                                  <p:stCondLst>
+                                    <p:cond delay="0"/>
+                                  </p:stCondLst>
+                                  <p:childTnLst>
+                                    <p:set>
+                                      <p:cBhvr>
+                                        <p:cTn id="34" dur="1" fill="hold">
+                                          <p:stCondLst>
+                                            <p:cond delay="0"/>
+                                          </p:stCondLst>
+                                        </p:cTn>
+                                        <p:tgtEl>
+                                          <p:spTgt spid="3">
+                                            <p:txEl>
+                                              <p:pRg st="15" end="15"/>
+                                            </p:txEl>
+                                          </p:spTgt>
+                                        </p:tgtEl>
+                                        <p:attrNameLst>
+                                          <p:attrName>style.visibility</p:attrName>
+                                        </p:attrNameLst>
+                                      </p:cBhvr>
+                                      <p:to>
+                                        <p:strVal val="visible"/>
+                                      </p:to>
+                                    </p:set>
+                                  </p:childTnLst>
+                                </p:cTn>
+                              </p:par>
+                              <p:par>
+                                <p:cTn id="35" presetID="1" presetClass="entr" presetSubtype="0" fill="hold" nodeType="withEffect">
+                                  <p:stCondLst>
+                                    <p:cond delay="0"/>
+                                  </p:stCondLst>
+                                  <p:childTnLst>
+                                    <p:set>
+                                      <p:cBhvr>
+                                        <p:cTn id="36" dur="1" fill="hold">
+                                          <p:stCondLst>
+                                            <p:cond delay="0"/>
+                                          </p:stCondLst>
+                                        </p:cTn>
+                                        <p:tgtEl>
+                                          <p:spTgt spid="3">
+                                            <p:txEl>
+                                              <p:pRg st="16" end="16"/>
+                                            </p:txEl>
+                                          </p:spTgt>
+                                        </p:tgtEl>
+                                        <p:attrNameLst>
+                                          <p:attrName>style.visibility</p:attrName>
+                                        </p:attrNameLst>
+                                      </p:cBhvr>
+                                      <p:to>
+                                        <p:strVal val="visible"/>
+                                      </p:to>
+                                    </p:set>
+                                  </p:childTnLst>
+                                </p:cTn>
+                              </p:par>
+                            </p:childTnLst>
+                          </p:cTn>
+                        </p:par>
+                      </p:childTnLst>
+                    </p:cTn>
+                  </p:par>
+                </p:childTnLst>
+              </p:cTn>
+              <p:prevCondLst>
+                <p:cond evt="onPrev" delay="0">
+                  <p:tgtEl>
+                    <p:sldTgt/>
+                  </p:tgtEl>
+                </p:cond>
+              </p:prevCondLst>
+              <p:nextCondLst>
+                <p:cond evt="onNext" delay="0">
+                  <p:tgtEl>
+                    <p:sldTgt/>
+                  </p:tgtEl>
+                </p:cond>
+              </p:nextCondLst>
+            </p:seq>
+          </p:childTnLst>
+        </p:cTn>
+      </p:par>
+    </p:tnLst>
+  </p:timing>
+</p:sld>
+</file>
+
+<file path=ppt/slides/slide6.xml><?xml version="1.0" encoding="utf-8"?>
+<p:sld xmlns:a="http://schemas.openxmlformats.org/drawingml/2006/main" xmlns:r="http://schemas.openxmlformats.org/officeDocument/2006/relationships" xmlns:p="http://schemas.openxmlformats.org/presentationml/2006/main">
+  <p:cSld>
+    <p:spTree>
+      <p:nvGrpSpPr>
+        <p:cNvPr id="1" name=""/>
+        <p:cNvGrpSpPr/>
+        <p:nvPr/>
+      </p:nvGrpSpPr>
+      <p:grpSpPr>
+        <a:xfrm>
+          <a:off x="0" y="0"/>
+          <a:ext cx="0" cy="0"/>
+          <a:chOff x="0" y="0"/>
+          <a:chExt cx="0" cy="0"/>
+        </a:xfrm>
+      </p:grpSpPr>
+      <p:sp>
+        <p:nvSpPr>
+          <p:cNvPr id="2" name="Title 1"/>
+          <p:cNvSpPr>
+            <a:spLocks noGrp="1"/>
+          </p:cNvSpPr>
+          <p:nvPr>
+            <p:ph type="title"/>
+          </p:nvPr>
+        </p:nvSpPr>
+        <p:spPr/>
+        <p:txBody>
+          <a:bodyPr/>
+          <a:lstStyle/>
+          <a:p>
+            <a:endParaRPr lang="en-GB"/>
+          </a:p>
+        </p:txBody>
+      </p:sp>
+      <mc:AlternateContent xmlns:mc="http://schemas.openxmlformats.org/markup-compatibility/2006" xmlns:a14="http://schemas.microsoft.com/office/drawing/2010/main">
+        <mc:Choice Requires="a14">
           <p:sp>
             <p:nvSpPr>
               <p:cNvPr id="3" name="Content Placeholder 2"/>
@@ -20029,7 +22546,7 @@
             </p:txBody>
           </p:sp>
         </mc:Choice>
-        <mc:Fallback>
+        <mc:Fallback xmlns="">
           <p:sp>
             <p:nvSpPr>
               <p:cNvPr id="3" name="Content Placeholder 2"/>
@@ -20083,7 +22600,7 @@
 </p:sld>
 </file>
 
-<file path=ppt/slides/slide6.xml><?xml version="1.0" encoding="utf-8"?>
+<file path=ppt/slides/slide7.xml><?xml version="1.0" encoding="utf-8"?>
 <p:sld xmlns:a="http://schemas.openxmlformats.org/drawingml/2006/main" xmlns:r="http://schemas.openxmlformats.org/officeDocument/2006/relationships" xmlns:p="http://schemas.openxmlformats.org/presentationml/2006/main">
   <p:cSld>
     <p:spTree>
@@ -20248,7 +22765,7 @@
 </p:sld>
 </file>
 
-<file path=ppt/slides/slide7.xml><?xml version="1.0" encoding="utf-8"?>
+<file path=ppt/slides/slide8.xml><?xml version="1.0" encoding="utf-8"?>
 <p:sld xmlns:a="http://schemas.openxmlformats.org/drawingml/2006/main" xmlns:r="http://schemas.openxmlformats.org/officeDocument/2006/relationships" xmlns:p="http://schemas.openxmlformats.org/presentationml/2006/main">
   <p:cSld>
     <p:spTree>
@@ -20284,8 +22801,8 @@
           </a:p>
         </p:txBody>
       </p:sp>
-      <mc:AlternateContent xmlns:mc="http://schemas.openxmlformats.org/markup-compatibility/2006">
-        <mc:Choice xmlns:a14="http://schemas.microsoft.com/office/drawing/2010/main" Requires="a14">
+      <mc:AlternateContent xmlns:mc="http://schemas.openxmlformats.org/markup-compatibility/2006" xmlns:a14="http://schemas.microsoft.com/office/drawing/2010/main">
+        <mc:Choice Requires="a14">
           <p:sp>
             <p:nvSpPr>
               <p:cNvPr id="3" name="Content Placeholder 2"/>
@@ -21293,7 +23810,7 @@
             </p:txBody>
           </p:sp>
         </mc:Choice>
-        <mc:Fallback>
+        <mc:Fallback xmlns="">
           <p:sp>
             <p:nvSpPr>
               <p:cNvPr id="3" name="Content Placeholder 2"/>
@@ -21347,7 +23864,7 @@
 </p:sld>
 </file>
 
-<file path=ppt/slides/slide8.xml><?xml version="1.0" encoding="utf-8"?>
+<file path=ppt/slides/slide9.xml><?xml version="1.0" encoding="utf-8"?>
 <p:sld xmlns:a="http://schemas.openxmlformats.org/drawingml/2006/main" xmlns:r="http://schemas.openxmlformats.org/officeDocument/2006/relationships" xmlns:p="http://schemas.openxmlformats.org/presentationml/2006/main">
   <p:cSld>
     <p:spTree>
@@ -21455,15 +23972,7 @@
             <a:pPr lvl="1"/>
             <a:r>
               <a:rPr lang="en-US" dirty="0" smtClean="0"/>
-              <a:t>Often </a:t>
-            </a:r>
-            <a:r>
-              <a:rPr lang="en-US" dirty="0" smtClean="0"/>
-              <a:t>arises from weighing all encountered </a:t>
-            </a:r>
-            <a:r>
-              <a:rPr lang="en-US" dirty="0" smtClean="0"/>
-              <a:t>individuals</a:t>
+              <a:t>Often arises from weighing all encountered individuals</a:t>
             </a:r>
           </a:p>
           <a:p>
@@ -21472,7 +23981,6 @@
               <a:rPr lang="en-US" dirty="0" smtClean="0"/>
               <a:t>Must model zeros (non-encounter) and positive real biomass</a:t>
             </a:r>
-            <a:endParaRPr lang="en-US" dirty="0" smtClean="0"/>
           </a:p>
           <a:p>
             <a:pPr marL="0" indent="0">
@@ -21486,773 +23994,6 @@
     <p:extLst>
       <p:ext uri="{BB962C8B-B14F-4D97-AF65-F5344CB8AC3E}">
         <p14:creationId xmlns:p14="http://schemas.microsoft.com/office/powerpoint/2010/main" val="694095638"/>
-      </p:ext>
-    </p:extLst>
-  </p:cSld>
-  <p:clrMapOvr>
-    <a:masterClrMapping/>
-  </p:clrMapOvr>
-  <p:timing>
-    <p:tnLst>
-      <p:par>
-        <p:cTn id="1" dur="indefinite" restart="never" nodeType="tmRoot"/>
-      </p:par>
-    </p:tnLst>
-  </p:timing>
-</p:sld>
-</file>
-
-<file path=ppt/slides/slide9.xml><?xml version="1.0" encoding="utf-8"?>
-<p:sld xmlns:a="http://schemas.openxmlformats.org/drawingml/2006/main" xmlns:r="http://schemas.openxmlformats.org/officeDocument/2006/relationships" xmlns:p="http://schemas.openxmlformats.org/presentationml/2006/main">
-  <p:cSld>
-    <p:spTree>
-      <p:nvGrpSpPr>
-        <p:cNvPr id="1" name=""/>
-        <p:cNvGrpSpPr/>
-        <p:nvPr/>
-      </p:nvGrpSpPr>
-      <p:grpSpPr>
-        <a:xfrm>
-          <a:off x="0" y="0"/>
-          <a:ext cx="0" cy="0"/>
-          <a:chOff x="0" y="0"/>
-          <a:chExt cx="0" cy="0"/>
-        </a:xfrm>
-      </p:grpSpPr>
-      <p:sp>
-        <p:nvSpPr>
-          <p:cNvPr id="2" name="Title 1"/>
-          <p:cNvSpPr>
-            <a:spLocks noGrp="1"/>
-          </p:cNvSpPr>
-          <p:nvPr>
-            <p:ph type="title"/>
-          </p:nvPr>
-        </p:nvSpPr>
-        <p:spPr/>
-        <p:txBody>
-          <a:bodyPr/>
-          <a:lstStyle/>
-          <a:p>
-            <a:endParaRPr lang="en-GB"/>
-          </a:p>
-        </p:txBody>
-      </p:sp>
-      <mc:AlternateContent xmlns:mc="http://schemas.openxmlformats.org/markup-compatibility/2006">
-        <mc:Choice xmlns:a14="http://schemas.microsoft.com/office/drawing/2010/main" Requires="a14">
-          <p:sp>
-            <p:nvSpPr>
-              <p:cNvPr id="3" name="Content Placeholder 2"/>
-              <p:cNvSpPr>
-                <a:spLocks noGrp="1"/>
-              </p:cNvSpPr>
-              <p:nvPr>
-                <p:ph idx="1"/>
-              </p:nvPr>
-            </p:nvSpPr>
-            <p:spPr/>
-            <p:txBody>
-              <a:bodyPr>
-                <a:normAutofit/>
-              </a:bodyPr>
-              <a:lstStyle/>
-              <a:p>
-                <a:pPr marL="0" indent="0">
-                  <a:buNone/>
-                </a:pPr>
-                <a:r>
-                  <a:rPr lang="en-US" dirty="0" smtClean="0"/>
-                  <a:t>Counts:  Zero-inflated </a:t>
-                </a:r>
-                <a:r>
-                  <a:rPr lang="en-US" dirty="0" smtClean="0"/>
-                  <a:t>models</a:t>
-                </a:r>
-              </a:p>
-              <a:p>
-                <a:pPr marL="457200" lvl="1" indent="0">
-                  <a:buNone/>
-                </a:pPr>
-                <a14:m>
-                  <m:oMathPara xmlns:m="http://schemas.openxmlformats.org/officeDocument/2006/math">
-                    <m:oMathParaPr>
-                      <m:jc m:val="centerGroup"/>
-                    </m:oMathParaPr>
-                    <m:oMath xmlns:m="http://schemas.openxmlformats.org/officeDocument/2006/math">
-                      <m:func>
-                        <m:funcPr>
-                          <m:ctrlPr>
-                            <a:rPr lang="en-US" b="0" i="1" smtClean="0">
-                              <a:latin typeface="Cambria Math" panose="02040503050406030204" pitchFamily="18" charset="0"/>
-                            </a:rPr>
-                          </m:ctrlPr>
-                        </m:funcPr>
-                        <m:fName>
-                          <m:r>
-                            <m:rPr>
-                              <m:sty m:val="p"/>
-                            </m:rPr>
-                            <a:rPr lang="en-US" b="0" i="0" smtClean="0">
-                              <a:latin typeface="Cambria Math" panose="02040503050406030204" pitchFamily="18" charset="0"/>
-                            </a:rPr>
-                            <m:t>Pr</m:t>
-                          </m:r>
-                        </m:fName>
-                        <m:e>
-                          <m:d>
-                            <m:dPr>
-                              <m:ctrlPr>
-                                <a:rPr lang="en-US" b="0" i="1" smtClean="0">
-                                  <a:latin typeface="Cambria Math" panose="02040503050406030204" pitchFamily="18" charset="0"/>
-                                </a:rPr>
-                              </m:ctrlPr>
-                            </m:dPr>
-                            <m:e>
-                              <m:r>
-                                <a:rPr lang="en-US" b="0" i="1" smtClean="0">
-                                  <a:latin typeface="Cambria Math" panose="02040503050406030204" pitchFamily="18" charset="0"/>
-                                </a:rPr>
-                                <m:t>𝐶</m:t>
-                              </m:r>
-                              <m:r>
-                                <a:rPr lang="en-US" b="0" i="1" smtClean="0">
-                                  <a:latin typeface="Cambria Math" panose="02040503050406030204" pitchFamily="18" charset="0"/>
-                                </a:rPr>
-                                <m:t>=</m:t>
-                              </m:r>
-                              <m:sSub>
-                                <m:sSubPr>
-                                  <m:ctrlPr>
-                                    <a:rPr lang="en-US" b="0" i="1" smtClean="0">
-                                      <a:latin typeface="Cambria Math" panose="02040503050406030204" pitchFamily="18" charset="0"/>
-                                    </a:rPr>
-                                  </m:ctrlPr>
-                                </m:sSubPr>
-                                <m:e>
-                                  <m:r>
-                                    <a:rPr lang="en-US" b="0" i="1" smtClean="0">
-                                      <a:latin typeface="Cambria Math" panose="02040503050406030204" pitchFamily="18" charset="0"/>
-                                    </a:rPr>
-                                    <m:t>𝑐</m:t>
-                                  </m:r>
-                                </m:e>
-                                <m:sub>
-                                  <m:r>
-                                    <a:rPr lang="en-US" b="0" i="1" smtClean="0">
-                                      <a:latin typeface="Cambria Math" panose="02040503050406030204" pitchFamily="18" charset="0"/>
-                                    </a:rPr>
-                                    <m:t>𝑖</m:t>
-                                  </m:r>
-                                </m:sub>
-                              </m:sSub>
-                            </m:e>
-                          </m:d>
-                        </m:e>
-                      </m:func>
-                      <m:r>
-                        <a:rPr lang="en-US" b="0" i="1" smtClean="0">
-                          <a:latin typeface="Cambria Math" panose="02040503050406030204" pitchFamily="18" charset="0"/>
-                        </a:rPr>
-                        <m:t>=</m:t>
-                      </m:r>
-                      <m:d>
-                        <m:dPr>
-                          <m:begChr m:val="{"/>
-                          <m:endChr m:val=""/>
-                          <m:ctrlPr>
-                            <a:rPr lang="en-US" b="0" i="1" smtClean="0">
-                              <a:latin typeface="Cambria Math" panose="02040503050406030204" pitchFamily="18" charset="0"/>
-                            </a:rPr>
-                          </m:ctrlPr>
-                        </m:dPr>
-                        <m:e>
-                          <m:m>
-                            <m:mPr>
-                              <m:mcs>
-                                <m:mc>
-                                  <m:mcPr>
-                                    <m:count m:val="2"/>
-                                    <m:mcJc m:val="center"/>
-                                  </m:mcPr>
-                                </m:mc>
-                              </m:mcs>
-                              <m:ctrlPr>
-                                <a:rPr lang="en-US" b="0" i="1" smtClean="0">
-                                  <a:latin typeface="Cambria Math" panose="02040503050406030204" pitchFamily="18" charset="0"/>
-                                </a:rPr>
-                              </m:ctrlPr>
-                            </m:mPr>
-                            <m:mr>
-                              <m:e>
-                                <m:sSub>
-                                  <m:sSubPr>
-                                    <m:ctrlPr>
-                                      <a:rPr lang="en-US" b="0" i="1" smtClean="0">
-                                        <a:latin typeface="Cambria Math" panose="02040503050406030204" pitchFamily="18" charset="0"/>
-                                      </a:rPr>
-                                    </m:ctrlPr>
-                                  </m:sSubPr>
-                                  <m:e>
-                                    <m:r>
-                                      <m:rPr>
-                                        <m:brk m:alnAt="7"/>
-                                      </m:rPr>
-                                      <a:rPr lang="en-US" b="0" i="1" smtClean="0">
-                                        <a:latin typeface="Cambria Math" panose="02040503050406030204" pitchFamily="18" charset="0"/>
-                                      </a:rPr>
-                                      <m:t>𝑝</m:t>
-                                    </m:r>
-                                  </m:e>
-                                  <m:sub>
-                                    <m:r>
-                                      <m:rPr>
-                                        <m:brk m:alnAt="7"/>
-                                      </m:rPr>
-                                      <a:rPr lang="en-US" b="0" i="1" smtClean="0">
-                                        <a:latin typeface="Cambria Math" panose="02040503050406030204" pitchFamily="18" charset="0"/>
-                                      </a:rPr>
-                                      <m:t>𝑖</m:t>
-                                    </m:r>
-                                  </m:sub>
-                                </m:sSub>
-                                <m:r>
-                                  <m:rPr>
-                                    <m:brk m:alnAt="7"/>
-                                  </m:rPr>
-                                  <a:rPr lang="en-US" b="0" i="0" smtClean="0">
-                                    <a:latin typeface="Cambria Math" panose="02040503050406030204" pitchFamily="18" charset="0"/>
-                                  </a:rPr>
-                                  <m:t>+</m:t>
-                                </m:r>
-                                <m:r>
-                                  <m:rPr>
-                                    <m:sty m:val="p"/>
-                                  </m:rPr>
-                                  <a:rPr lang="en-US" b="0" i="0" smtClean="0">
-                                    <a:latin typeface="Cambria Math" panose="02040503050406030204" pitchFamily="18" charset="0"/>
-                                  </a:rPr>
-                                  <m:t>Poisson</m:t>
-                                </m:r>
-                                <m:d>
-                                  <m:dPr>
-                                    <m:ctrlPr>
-                                      <a:rPr lang="en-US" b="0" i="1" smtClean="0">
-                                        <a:latin typeface="Cambria Math" panose="02040503050406030204" pitchFamily="18" charset="0"/>
-                                      </a:rPr>
-                                    </m:ctrlPr>
-                                  </m:dPr>
-                                  <m:e>
-                                    <m:r>
-                                      <a:rPr lang="en-US" b="0" i="1" smtClean="0">
-                                        <a:latin typeface="Cambria Math" panose="02040503050406030204" pitchFamily="18" charset="0"/>
-                                      </a:rPr>
-                                      <m:t>𝐶</m:t>
-                                    </m:r>
-                                    <m:r>
-                                      <a:rPr lang="en-US" b="0" i="1" smtClean="0">
-                                        <a:latin typeface="Cambria Math" panose="02040503050406030204" pitchFamily="18" charset="0"/>
-                                      </a:rPr>
-                                      <m:t>=</m:t>
-                                    </m:r>
-                                    <m:r>
-                                      <m:rPr>
-                                        <m:brk m:alnAt="7"/>
-                                      </m:rPr>
-                                      <a:rPr lang="en-US" b="0" i="1" smtClean="0">
-                                        <a:latin typeface="Cambria Math" panose="02040503050406030204" pitchFamily="18" charset="0"/>
-                                      </a:rPr>
-                                      <m:t>0</m:t>
-                                    </m:r>
-                                  </m:e>
-                                  <m:e>
-                                    <m:sSub>
-                                      <m:sSubPr>
-                                        <m:ctrlPr>
-                                          <a:rPr lang="en-US" b="0" i="1" smtClean="0">
-                                            <a:latin typeface="Cambria Math" panose="02040503050406030204" pitchFamily="18" charset="0"/>
-                                            <a:ea typeface="Cambria Math" panose="02040503050406030204" pitchFamily="18" charset="0"/>
-                                          </a:rPr>
-                                        </m:ctrlPr>
-                                      </m:sSubPr>
-                                      <m:e>
-                                        <m:r>
-                                          <m:rPr>
-                                            <m:brk m:alnAt="7"/>
-                                          </m:rPr>
-                                          <a:rPr lang="en-US" b="0" i="1" smtClean="0">
-                                            <a:latin typeface="Cambria Math" panose="02040503050406030204" pitchFamily="18" charset="0"/>
-                                            <a:ea typeface="Cambria Math" panose="02040503050406030204" pitchFamily="18" charset="0"/>
-                                          </a:rPr>
-                                          <m:t>𝜆</m:t>
-                                        </m:r>
-                                      </m:e>
-                                      <m:sub>
-                                        <m:r>
-                                          <m:rPr>
-                                            <m:brk m:alnAt="7"/>
-                                          </m:rPr>
-                                          <a:rPr lang="en-US" b="0" i="1" smtClean="0">
-                                            <a:latin typeface="Cambria Math" panose="02040503050406030204" pitchFamily="18" charset="0"/>
-                                            <a:ea typeface="Cambria Math" panose="02040503050406030204" pitchFamily="18" charset="0"/>
-                                          </a:rPr>
-                                          <m:t>𝑖</m:t>
-                                        </m:r>
-                                      </m:sub>
-                                    </m:sSub>
-                                  </m:e>
-                                </m:d>
-                              </m:e>
-                              <m:e>
-                                <m:r>
-                                  <m:rPr>
-                                    <m:sty m:val="p"/>
-                                  </m:rPr>
-                                  <a:rPr lang="en-US" b="0" i="0" smtClean="0">
-                                    <a:latin typeface="Cambria Math" panose="02040503050406030204" pitchFamily="18" charset="0"/>
-                                  </a:rPr>
-                                  <m:t>if</m:t>
-                                </m:r>
-                                <m:r>
-                                  <a:rPr lang="en-US" b="0" i="1" smtClean="0">
-                                    <a:latin typeface="Cambria Math" panose="02040503050406030204" pitchFamily="18" charset="0"/>
-                                  </a:rPr>
-                                  <m:t> </m:t>
-                                </m:r>
-                                <m:sSub>
-                                  <m:sSubPr>
-                                    <m:ctrlPr>
-                                      <a:rPr lang="en-US" b="0" i="1" smtClean="0">
-                                        <a:latin typeface="Cambria Math" panose="02040503050406030204" pitchFamily="18" charset="0"/>
-                                      </a:rPr>
-                                    </m:ctrlPr>
-                                  </m:sSubPr>
-                                  <m:e>
-                                    <m:r>
-                                      <a:rPr lang="en-US" b="0" i="1" smtClean="0">
-                                        <a:latin typeface="Cambria Math" panose="02040503050406030204" pitchFamily="18" charset="0"/>
-                                      </a:rPr>
-                                      <m:t>𝑐</m:t>
-                                    </m:r>
-                                  </m:e>
-                                  <m:sub>
-                                    <m:r>
-                                      <a:rPr lang="en-US" b="0" i="1" smtClean="0">
-                                        <a:latin typeface="Cambria Math" panose="02040503050406030204" pitchFamily="18" charset="0"/>
-                                      </a:rPr>
-                                      <m:t>𝑖</m:t>
-                                    </m:r>
-                                  </m:sub>
-                                </m:sSub>
-                                <m:r>
-                                  <a:rPr lang="en-US" b="0" i="0" smtClean="0">
-                                    <a:latin typeface="Cambria Math" panose="02040503050406030204" pitchFamily="18" charset="0"/>
-                                  </a:rPr>
-                                  <m:t>=0</m:t>
-                                </m:r>
-                              </m:e>
-                            </m:mr>
-                            <m:mr>
-                              <m:e>
-                                <m:r>
-                                  <a:rPr lang="en-US" b="0" i="1" smtClean="0">
-                                    <a:latin typeface="Cambria Math" panose="02040503050406030204" pitchFamily="18" charset="0"/>
-                                  </a:rPr>
-                                  <m:t>(1−</m:t>
-                                </m:r>
-                                <m:sSub>
-                                  <m:sSubPr>
-                                    <m:ctrlPr>
-                                      <a:rPr lang="en-US" b="0" i="1" smtClean="0">
-                                        <a:latin typeface="Cambria Math" panose="02040503050406030204" pitchFamily="18" charset="0"/>
-                                      </a:rPr>
-                                    </m:ctrlPr>
-                                  </m:sSubPr>
-                                  <m:e>
-                                    <m:r>
-                                      <a:rPr lang="en-US" b="0" i="1" smtClean="0">
-                                        <a:latin typeface="Cambria Math" panose="02040503050406030204" pitchFamily="18" charset="0"/>
-                                      </a:rPr>
-                                      <m:t>𝑝</m:t>
-                                    </m:r>
-                                  </m:e>
-                                  <m:sub>
-                                    <m:r>
-                                      <a:rPr lang="en-US" b="0" i="1" smtClean="0">
-                                        <a:latin typeface="Cambria Math" panose="02040503050406030204" pitchFamily="18" charset="0"/>
-                                      </a:rPr>
-                                      <m:t>𝑖</m:t>
-                                    </m:r>
-                                  </m:sub>
-                                </m:sSub>
-                                <m:r>
-                                  <a:rPr lang="en-US" b="0" i="1" smtClean="0">
-                                    <a:latin typeface="Cambria Math" panose="02040503050406030204" pitchFamily="18" charset="0"/>
-                                  </a:rPr>
-                                  <m:t>)×</m:t>
-                                </m:r>
-                                <m:r>
-                                  <m:rPr>
-                                    <m:sty m:val="p"/>
-                                    <m:brk m:alnAt="7"/>
-                                  </m:rPr>
-                                  <a:rPr lang="en-US">
-                                    <a:latin typeface="Cambria Math" panose="02040503050406030204" pitchFamily="18" charset="0"/>
-                                  </a:rPr>
-                                  <m:t>P</m:t>
-                                </m:r>
-                                <m:r>
-                                  <m:rPr>
-                                    <m:sty m:val="p"/>
-                                  </m:rPr>
-                                  <a:rPr lang="en-US">
-                                    <a:latin typeface="Cambria Math" panose="02040503050406030204" pitchFamily="18" charset="0"/>
-                                  </a:rPr>
-                                  <m:t>oisson</m:t>
-                                </m:r>
-                                <m:d>
-                                  <m:dPr>
-                                    <m:ctrlPr>
-                                      <a:rPr lang="en-US" i="1">
-                                        <a:latin typeface="Cambria Math" panose="02040503050406030204" pitchFamily="18" charset="0"/>
-                                      </a:rPr>
-                                    </m:ctrlPr>
-                                  </m:dPr>
-                                  <m:e>
-                                    <m:r>
-                                      <a:rPr lang="en-US" b="0" i="1" smtClean="0">
-                                        <a:latin typeface="Cambria Math" panose="02040503050406030204" pitchFamily="18" charset="0"/>
-                                      </a:rPr>
-                                      <m:t>𝐶</m:t>
-                                    </m:r>
-                                    <m:r>
-                                      <a:rPr lang="en-US" b="0" i="1" smtClean="0">
-                                        <a:latin typeface="Cambria Math" panose="02040503050406030204" pitchFamily="18" charset="0"/>
-                                      </a:rPr>
-                                      <m:t>=</m:t>
-                                    </m:r>
-                                    <m:sSub>
-                                      <m:sSubPr>
-                                        <m:ctrlPr>
-                                          <a:rPr lang="en-US" b="0" i="1" smtClean="0">
-                                            <a:latin typeface="Cambria Math" panose="02040503050406030204" pitchFamily="18" charset="0"/>
-                                          </a:rPr>
-                                        </m:ctrlPr>
-                                      </m:sSubPr>
-                                      <m:e>
-                                        <m:r>
-                                          <a:rPr lang="en-US" b="0" i="1" smtClean="0">
-                                            <a:latin typeface="Cambria Math" panose="02040503050406030204" pitchFamily="18" charset="0"/>
-                                          </a:rPr>
-                                          <m:t>𝑐</m:t>
-                                        </m:r>
-                                      </m:e>
-                                      <m:sub>
-                                        <m:r>
-                                          <a:rPr lang="en-US" b="0" i="1" smtClean="0">
-                                            <a:latin typeface="Cambria Math" panose="02040503050406030204" pitchFamily="18" charset="0"/>
-                                          </a:rPr>
-                                          <m:t>𝑖</m:t>
-                                        </m:r>
-                                      </m:sub>
-                                    </m:sSub>
-                                  </m:e>
-                                  <m:e>
-                                    <m:sSub>
-                                      <m:sSubPr>
-                                        <m:ctrlPr>
-                                          <a:rPr lang="en-US" i="1">
-                                            <a:latin typeface="Cambria Math" panose="02040503050406030204" pitchFamily="18" charset="0"/>
-                                            <a:ea typeface="Cambria Math" panose="02040503050406030204" pitchFamily="18" charset="0"/>
-                                          </a:rPr>
-                                        </m:ctrlPr>
-                                      </m:sSubPr>
-                                      <m:e>
-                                        <m:r>
-                                          <m:rPr>
-                                            <m:brk m:alnAt="7"/>
-                                          </m:rPr>
-                                          <a:rPr lang="en-US" i="1">
-                                            <a:latin typeface="Cambria Math" panose="02040503050406030204" pitchFamily="18" charset="0"/>
-                                            <a:ea typeface="Cambria Math" panose="02040503050406030204" pitchFamily="18" charset="0"/>
-                                          </a:rPr>
-                                          <m:t>𝜆</m:t>
-                                        </m:r>
-                                      </m:e>
-                                      <m:sub>
-                                        <m:r>
-                                          <m:rPr>
-                                            <m:brk m:alnAt="7"/>
-                                          </m:rPr>
-                                          <a:rPr lang="en-US" i="1">
-                                            <a:latin typeface="Cambria Math" panose="02040503050406030204" pitchFamily="18" charset="0"/>
-                                            <a:ea typeface="Cambria Math" panose="02040503050406030204" pitchFamily="18" charset="0"/>
-                                          </a:rPr>
-                                          <m:t>𝑖</m:t>
-                                        </m:r>
-                                      </m:sub>
-                                    </m:sSub>
-                                  </m:e>
-                                </m:d>
-                              </m:e>
-                              <m:e>
-                                <m:r>
-                                  <m:rPr>
-                                    <m:sty m:val="p"/>
-                                  </m:rPr>
-                                  <a:rPr lang="en-US">
-                                    <a:latin typeface="Cambria Math" panose="02040503050406030204" pitchFamily="18" charset="0"/>
-                                  </a:rPr>
-                                  <m:t>if</m:t>
-                                </m:r>
-                                <m:r>
-                                  <a:rPr lang="en-US" i="1">
-                                    <a:latin typeface="Cambria Math" panose="02040503050406030204" pitchFamily="18" charset="0"/>
-                                  </a:rPr>
-                                  <m:t> </m:t>
-                                </m:r>
-                                <m:sSub>
-                                  <m:sSubPr>
-                                    <m:ctrlPr>
-                                      <a:rPr lang="en-US" b="0" i="1" smtClean="0">
-                                        <a:latin typeface="Cambria Math" panose="02040503050406030204" pitchFamily="18" charset="0"/>
-                                      </a:rPr>
-                                    </m:ctrlPr>
-                                  </m:sSubPr>
-                                  <m:e>
-                                    <m:r>
-                                      <a:rPr lang="en-US" b="0" i="1" smtClean="0">
-                                        <a:latin typeface="Cambria Math" panose="02040503050406030204" pitchFamily="18" charset="0"/>
-                                      </a:rPr>
-                                      <m:t>𝑐</m:t>
-                                    </m:r>
-                                  </m:e>
-                                  <m:sub>
-                                    <m:r>
-                                      <a:rPr lang="en-US" b="0" i="1" smtClean="0">
-                                        <a:latin typeface="Cambria Math" panose="02040503050406030204" pitchFamily="18" charset="0"/>
-                                      </a:rPr>
-                                      <m:t>𝑖</m:t>
-                                    </m:r>
-                                  </m:sub>
-                                </m:sSub>
-                                <m:r>
-                                  <a:rPr lang="en-US" b="0" i="0" smtClean="0">
-                                    <a:latin typeface="Cambria Math" panose="02040503050406030204" pitchFamily="18" charset="0"/>
-                                  </a:rPr>
-                                  <m:t>&gt;</m:t>
-                                </m:r>
-                                <m:r>
-                                  <a:rPr lang="en-US">
-                                    <a:latin typeface="Cambria Math" panose="02040503050406030204" pitchFamily="18" charset="0"/>
-                                  </a:rPr>
-                                  <m:t>0</m:t>
-                                </m:r>
-                              </m:e>
-                            </m:mr>
-                          </m:m>
-                        </m:e>
-                      </m:d>
-                    </m:oMath>
-                  </m:oMathPara>
-                </a14:m>
-                <a:endParaRPr lang="en-US" dirty="0" smtClean="0"/>
-              </a:p>
-              <a:p>
-                <a:pPr lvl="1"/>
-                <a:r>
-                  <a:rPr lang="en-US" dirty="0" smtClean="0"/>
-                  <a:t>Where </a:t>
-                </a:r>
-                <a14:m>
-                  <m:oMath xmlns:m="http://schemas.openxmlformats.org/officeDocument/2006/math">
-                    <m:sSub>
-                      <m:sSubPr>
-                        <m:ctrlPr>
-                          <a:rPr lang="en-US" b="0" i="1" smtClean="0">
-                            <a:latin typeface="Cambria Math" panose="02040503050406030204" pitchFamily="18" charset="0"/>
-                          </a:rPr>
-                        </m:ctrlPr>
-                      </m:sSubPr>
-                      <m:e>
-                        <m:r>
-                          <m:rPr>
-                            <m:brk m:alnAt="7"/>
-                          </m:rPr>
-                          <a:rPr lang="en-US" i="1">
-                            <a:latin typeface="Cambria Math" panose="02040503050406030204" pitchFamily="18" charset="0"/>
-                          </a:rPr>
-                          <m:t>𝑝</m:t>
-                        </m:r>
-                      </m:e>
-                      <m:sub>
-                        <m:r>
-                          <a:rPr lang="en-US" b="0" i="1" smtClean="0">
-                            <a:latin typeface="Cambria Math" panose="02040503050406030204" pitchFamily="18" charset="0"/>
-                          </a:rPr>
-                          <m:t>𝑖</m:t>
-                        </m:r>
-                      </m:sub>
-                    </m:sSub>
-                  </m:oMath>
-                </a14:m>
-                <a:r>
-                  <a:rPr lang="en-US" dirty="0" smtClean="0"/>
-                  <a:t> is the probability of sampling outside occupied habitat</a:t>
-                </a:r>
-              </a:p>
-              <a:p>
-                <a:pPr lvl="2"/>
-                <a:r>
-                  <a:rPr lang="en-US" dirty="0" smtClean="0"/>
-                  <a:t>“True zero”</a:t>
-                </a:r>
-              </a:p>
-              <a:p>
-                <a:pPr lvl="1"/>
-                <a14:m>
-                  <m:oMath xmlns:m="http://schemas.openxmlformats.org/officeDocument/2006/math">
-                    <m:r>
-                      <m:rPr>
-                        <m:sty m:val="p"/>
-                        <m:brk m:alnAt="7"/>
-                      </m:rPr>
-                      <a:rPr lang="en-US">
-                        <a:latin typeface="Cambria Math" panose="02040503050406030204" pitchFamily="18" charset="0"/>
-                      </a:rPr>
-                      <m:t>P</m:t>
-                    </m:r>
-                    <m:r>
-                      <m:rPr>
-                        <m:sty m:val="p"/>
-                      </m:rPr>
-                      <a:rPr lang="en-US">
-                        <a:latin typeface="Cambria Math" panose="02040503050406030204" pitchFamily="18" charset="0"/>
-                      </a:rPr>
-                      <m:t>oisson</m:t>
-                    </m:r>
-                    <m:d>
-                      <m:dPr>
-                        <m:ctrlPr>
-                          <a:rPr lang="en-US" i="1">
-                            <a:latin typeface="Cambria Math" panose="02040503050406030204" pitchFamily="18" charset="0"/>
-                          </a:rPr>
-                        </m:ctrlPr>
-                      </m:dPr>
-                      <m:e>
-                        <m:r>
-                          <a:rPr lang="en-US" b="0" i="1" smtClean="0">
-                            <a:latin typeface="Cambria Math" panose="02040503050406030204" pitchFamily="18" charset="0"/>
-                          </a:rPr>
-                          <m:t>𝐶</m:t>
-                        </m:r>
-                        <m:r>
-                          <a:rPr lang="en-US" b="0" i="1" smtClean="0">
-                            <a:latin typeface="Cambria Math" panose="02040503050406030204" pitchFamily="18" charset="0"/>
-                          </a:rPr>
-                          <m:t>=</m:t>
-                        </m:r>
-                        <m:r>
-                          <m:rPr>
-                            <m:brk m:alnAt="7"/>
-                          </m:rPr>
-                          <a:rPr lang="en-US" i="1">
-                            <a:latin typeface="Cambria Math" panose="02040503050406030204" pitchFamily="18" charset="0"/>
-                          </a:rPr>
-                          <m:t>0</m:t>
-                        </m:r>
-                      </m:e>
-                      <m:e>
-                        <m:sSub>
-                          <m:sSubPr>
-                            <m:ctrlPr>
-                              <a:rPr lang="en-US" b="0" i="1" smtClean="0">
-                                <a:latin typeface="Cambria Math" panose="02040503050406030204" pitchFamily="18" charset="0"/>
-                                <a:ea typeface="Cambria Math" panose="02040503050406030204" pitchFamily="18" charset="0"/>
-                              </a:rPr>
-                            </m:ctrlPr>
-                          </m:sSubPr>
-                          <m:e>
-                            <m:r>
-                              <m:rPr>
-                                <m:brk m:alnAt="7"/>
-                              </m:rPr>
-                              <a:rPr lang="en-US" i="1">
-                                <a:latin typeface="Cambria Math" panose="02040503050406030204" pitchFamily="18" charset="0"/>
-                                <a:ea typeface="Cambria Math" panose="02040503050406030204" pitchFamily="18" charset="0"/>
-                              </a:rPr>
-                              <m:t>𝜆</m:t>
-                            </m:r>
-                          </m:e>
-                          <m:sub>
-                            <m:r>
-                              <m:rPr>
-                                <m:brk m:alnAt="7"/>
-                              </m:rPr>
-                              <a:rPr lang="en-US" b="0" i="1" smtClean="0">
-                                <a:latin typeface="Cambria Math" panose="02040503050406030204" pitchFamily="18" charset="0"/>
-                                <a:ea typeface="Cambria Math" panose="02040503050406030204" pitchFamily="18" charset="0"/>
-                              </a:rPr>
-                              <m:t>𝑖</m:t>
-                            </m:r>
-                          </m:sub>
-                        </m:sSub>
-                      </m:e>
-                    </m:d>
-                  </m:oMath>
-                </a14:m>
-                <a:r>
-                  <a:rPr lang="en-US" dirty="0" smtClean="0"/>
-                  <a:t> is the probability of sampling in occupied habitat, but encountering zero individuals</a:t>
-                </a:r>
-              </a:p>
-              <a:p>
-                <a:pPr lvl="2"/>
-                <a:r>
-                  <a:rPr lang="en-US" dirty="0" smtClean="0"/>
-                  <a:t>“False zero”</a:t>
-                </a:r>
-              </a:p>
-            </p:txBody>
-          </p:sp>
-        </mc:Choice>
-        <mc:Fallback>
-          <p:sp>
-            <p:nvSpPr>
-              <p:cNvPr id="3" name="Content Placeholder 2"/>
-              <p:cNvSpPr>
-                <a:spLocks noGrp="1" noRot="1" noChangeAspect="1" noMove="1" noResize="1" noEditPoints="1" noAdjustHandles="1" noChangeArrowheads="1" noChangeShapeType="1" noTextEdit="1"/>
-              </p:cNvSpPr>
-              <p:nvPr>
-                <p:ph idx="1"/>
-              </p:nvPr>
-            </p:nvSpPr>
-            <p:spPr>
-              <a:blipFill>
-                <a:blip r:embed="rId2"/>
-                <a:stretch>
-                  <a:fillRect l="-1424" t="-1026"/>
-                </a:stretch>
-              </a:blipFill>
-            </p:spPr>
-            <p:txBody>
-              <a:bodyPr/>
-              <a:lstStyle/>
-              <a:p>
-                <a:r>
-                  <a:rPr lang="en-GB">
-                    <a:noFill/>
-                  </a:rPr>
-                  <a:t> </a:t>
-                </a:r>
-              </a:p>
-            </p:txBody>
-          </p:sp>
-        </mc:Fallback>
-      </mc:AlternateContent>
-    </p:spTree>
-    <p:extLst>
-      <p:ext uri="{BB962C8B-B14F-4D97-AF65-F5344CB8AC3E}">
-        <p14:creationId xmlns:p14="http://schemas.microsoft.com/office/powerpoint/2010/main" val="3157020095"/>
       </p:ext>
     </p:extLst>
   </p:cSld>

</xml_diff>

<commit_message>
small changes to Week 7 lecture
</commit_message>
<xml_diff>
--- a/Week 7 -- spatiotemporal models/Lecture/Lecture 7 -- spatio-temporal models.pptx
+++ b/Week 7 -- spatiotemporal models/Lecture/Lecture 7 -- spatio-temporal models.pptx
@@ -7157,8 +7157,8 @@
           </a:p>
         </p:txBody>
       </p:sp>
-      <mc:AlternateContent xmlns:mc="http://schemas.openxmlformats.org/markup-compatibility/2006" xmlns:a14="http://schemas.microsoft.com/office/drawing/2010/main">
-        <mc:Choice Requires="a14">
+      <mc:AlternateContent xmlns:mc="http://schemas.openxmlformats.org/markup-compatibility/2006">
+        <mc:Choice xmlns:a14="http://schemas.microsoft.com/office/drawing/2010/main" Requires="a14">
           <p:graphicFrame>
             <p:nvGraphicFramePr>
               <p:cNvPr id="4" name="Table 3"/>
@@ -7168,7 +7168,7 @@
               <p:nvPr>
                 <p:extLst>
                   <p:ext uri="{D42A27DB-BD31-4B8C-83A1-F6EECF244321}">
-                    <p14:modId xmlns:p14="http://schemas.microsoft.com/office/powerpoint/2010/main" val="4035958870"/>
+                    <p14:modId xmlns:p14="http://schemas.microsoft.com/office/powerpoint/2010/main" val="2334468288"/>
                   </p:ext>
                 </p:extLst>
               </p:nvPr>
@@ -7333,7 +7333,7 @@
                                 <m:func>
                                   <m:funcPr>
                                     <m:ctrlPr>
-                                      <a:rPr lang="en-US" b="0" i="1" smtClean="0">
+                                      <a:rPr lang="en-US" b="0" i="1" u="none" smtClean="0">
                                         <a:latin typeface="Cambria Math" panose="02040503050406030204" pitchFamily="18" charset="0"/>
                                       </a:rPr>
                                     </m:ctrlPr>
@@ -7343,17 +7343,26 @@
                                       <m:rPr>
                                         <m:sty m:val="p"/>
                                       </m:rPr>
-                                      <a:rPr lang="en-US" b="0" i="0" smtClean="0">
+                                      <a:rPr lang="en-US" b="0" i="0" u="none" smtClean="0">
                                         <a:latin typeface="Cambria Math" panose="02040503050406030204" pitchFamily="18" charset="0"/>
                                       </a:rPr>
                                       <m:t>log</m:t>
+                                    </m:r>
+                                    <m:r>
+                                      <m:rPr>
+                                        <m:sty m:val="p"/>
+                                      </m:rPr>
+                                      <a:rPr lang="en-US" b="0" i="0" u="none" smtClean="0">
+                                        <a:latin typeface="Cambria Math" panose="02040503050406030204" pitchFamily="18" charset="0"/>
+                                      </a:rPr>
+                                      <m:t>it</m:t>
                                     </m:r>
                                   </m:fName>
                                   <m:e>
                                     <m:d>
                                       <m:dPr>
                                         <m:ctrlPr>
-                                          <a:rPr lang="en-US" b="0" i="1" smtClean="0">
+                                          <a:rPr lang="en-US" b="0" i="1" u="none" smtClean="0">
                                             <a:latin typeface="Cambria Math" panose="02040503050406030204" pitchFamily="18" charset="0"/>
                                           </a:rPr>
                                         </m:ctrlPr>
@@ -7362,14 +7371,14 @@
                                         <m:sSub>
                                           <m:sSubPr>
                                             <m:ctrlPr>
-                                              <a:rPr lang="en-US" b="0" i="1" smtClean="0">
+                                              <a:rPr lang="en-US" b="0" i="1" u="none" smtClean="0">
                                                 <a:latin typeface="Cambria Math" panose="02040503050406030204" pitchFamily="18" charset="0"/>
                                               </a:rPr>
                                             </m:ctrlPr>
                                           </m:sSubPr>
                                           <m:e>
                                             <m:r>
-                                              <a:rPr lang="en-US" b="0" i="1" smtClean="0">
+                                              <a:rPr lang="en-US" b="0" i="1" u="none" smtClean="0">
                                                 <a:latin typeface="Cambria Math" panose="02040503050406030204" pitchFamily="18" charset="0"/>
                                               </a:rPr>
                                               <m:t>𝑝</m:t>
@@ -7377,7 +7386,7 @@
                                           </m:e>
                                           <m:sub>
                                             <m:r>
-                                              <a:rPr lang="en-US" b="0" i="1" smtClean="0">
+                                              <a:rPr lang="en-US" b="0" i="1" u="none" smtClean="0">
                                                 <a:latin typeface="Cambria Math" panose="02040503050406030204" pitchFamily="18" charset="0"/>
                                               </a:rPr>
                                               <m:t>𝑖</m:t>
@@ -7389,7 +7398,7 @@
                                   </m:e>
                                 </m:func>
                                 <m:r>
-                                  <a:rPr lang="en-US" b="0" i="1" smtClean="0">
+                                  <a:rPr lang="en-US" b="0" i="1" u="none" smtClean="0">
                                     <a:latin typeface="Cambria Math" panose="02040503050406030204" pitchFamily="18" charset="0"/>
                                   </a:rPr>
                                   <m:t>=…</m:t>
@@ -7397,7 +7406,7 @@
                               </m:oMath>
                             </m:oMathPara>
                           </a14:m>
-                          <a:endParaRPr lang="en-GB" dirty="0"/>
+                          <a:endParaRPr lang="en-GB" u="none" dirty="0"/>
                         </a:p>
                       </a:txBody>
                       <a:tcPr/>
@@ -7427,7 +7436,7 @@
                                   <a:rPr lang="en-US" b="0" i="0" smtClean="0">
                                     <a:latin typeface="Cambria Math" panose="02040503050406030204" pitchFamily="18" charset="0"/>
                                   </a:rPr>
-                                  <m:t>logit</m:t>
+                                  <m:t>log</m:t>
                                 </m:r>
                                 <m:d>
                                   <m:dPr>
@@ -8117,7 +8126,7 @@
             </a:graphic>
           </p:graphicFrame>
         </mc:Choice>
-        <mc:Fallback xmlns="">
+        <mc:Fallback>
           <p:graphicFrame>
             <p:nvGraphicFramePr>
               <p:cNvPr id="4" name="Table 3"/>
@@ -8127,7 +8136,7 @@
               <p:nvPr>
                 <p:extLst>
                   <p:ext uri="{D42A27DB-BD31-4B8C-83A1-F6EECF244321}">
-                    <p14:modId xmlns:p14="http://schemas.microsoft.com/office/powerpoint/2010/main" val="4035958870"/>
+                    <p14:modId xmlns:p14="http://schemas.microsoft.com/office/powerpoint/2010/main" val="2334468288"/>
                   </p:ext>
                 </p:extLst>
               </p:nvPr>
@@ -12295,8 +12304,8 @@
           </a:p>
         </p:txBody>
       </p:sp>
-      <mc:AlternateContent xmlns:mc="http://schemas.openxmlformats.org/markup-compatibility/2006" xmlns:a14="http://schemas.microsoft.com/office/drawing/2010/main">
-        <mc:Choice Requires="a14">
+      <mc:AlternateContent xmlns:mc="http://schemas.openxmlformats.org/markup-compatibility/2006">
+        <mc:Choice xmlns:a14="http://schemas.microsoft.com/office/drawing/2010/main" Requires="a14">
           <p:sp>
             <p:nvSpPr>
               <p:cNvPr id="3" name="Content Placeholder 2"/>
@@ -12492,7 +12501,7 @@
                         <a:rPr lang="en-US" b="0" i="1" smtClean="0">
                           <a:latin typeface="Cambria Math" panose="02040503050406030204" pitchFamily="18" charset="0"/>
                         </a:rPr>
-                        <m:t>𝐵</m:t>
+                        <m:t>𝑏</m:t>
                       </m:r>
                       <m:d>
                         <m:dPr>
@@ -13494,7 +13503,7 @@
                             <a:rPr lang="en-US" b="0" i="1" smtClean="0">
                               <a:latin typeface="Cambria Math" panose="02040503050406030204" pitchFamily="18" charset="0"/>
                             </a:rPr>
-                            <m:t>𝐵</m:t>
+                            <m:t>𝑏</m:t>
                           </m:r>
                           <m:r>
                             <a:rPr lang="en-US" b="0" i="1" smtClean="0">
@@ -13567,7 +13576,7 @@
             </p:txBody>
           </p:sp>
         </mc:Choice>
-        <mc:Fallback xmlns="">
+        <mc:Fallback>
           <p:sp>
             <p:nvSpPr>
               <p:cNvPr id="3" name="Content Placeholder 2"/>
@@ -16631,8 +16640,8 @@
           </p:graphicFrame>
         </mc:Fallback>
       </mc:AlternateContent>
-      <mc:AlternateContent xmlns:mc="http://schemas.openxmlformats.org/markup-compatibility/2006" xmlns:a14="http://schemas.microsoft.com/office/drawing/2010/main">
-        <mc:Choice Requires="a14">
+      <mc:AlternateContent xmlns:mc="http://schemas.openxmlformats.org/markup-compatibility/2006">
+        <mc:Choice xmlns:a14="http://schemas.microsoft.com/office/drawing/2010/main" Requires="a14">
           <p:graphicFrame>
             <p:nvGraphicFramePr>
               <p:cNvPr id="6" name="Table 5"/>
@@ -16642,7 +16651,7 @@
               <p:nvPr>
                 <p:extLst>
                   <p:ext uri="{D42A27DB-BD31-4B8C-83A1-F6EECF244321}">
-                    <p14:modId xmlns:p14="http://schemas.microsoft.com/office/powerpoint/2010/main" val="2920149492"/>
+                    <p14:modId xmlns:p14="http://schemas.microsoft.com/office/powerpoint/2010/main" val="2673521616"/>
                   </p:ext>
                 </p:extLst>
               </p:nvPr>
@@ -17640,6 +17649,53 @@
                                         <a:ea typeface="Cambria Math" panose="02040503050406030204" pitchFamily="18" charset="0"/>
                                       </a:rPr>
                                       <m:t> ~ 1+</m:t>
+                                    </m:r>
+                                    <m:r>
+                                      <a:rPr lang="en-US" sz="1100" b="0" i="1" smtClean="0">
+                                        <a:latin typeface="Cambria Math" panose="02040503050406030204" pitchFamily="18" charset="0"/>
+                                        <a:ea typeface="Cambria Math" panose="02040503050406030204" pitchFamily="18" charset="0"/>
+                                      </a:rPr>
+                                      <m:t>𝑠</m:t>
+                                    </m:r>
+                                    <m:d>
+                                      <m:dPr>
+                                        <m:ctrlPr>
+                                          <a:rPr lang="en-US" sz="1100" b="0" i="1" smtClean="0">
+                                            <a:latin typeface="Cambria Math" panose="02040503050406030204" pitchFamily="18" charset="0"/>
+                                            <a:ea typeface="Cambria Math" panose="02040503050406030204" pitchFamily="18" charset="0"/>
+                                          </a:rPr>
+                                        </m:ctrlPr>
+                                      </m:dPr>
+                                      <m:e>
+                                        <m:r>
+                                          <a:rPr lang="en-US" sz="1100" b="0" i="1" smtClean="0">
+                                            <a:latin typeface="Cambria Math" panose="02040503050406030204" pitchFamily="18" charset="0"/>
+                                            <a:ea typeface="Cambria Math" panose="02040503050406030204" pitchFamily="18" charset="0"/>
+                                          </a:rPr>
+                                          <m:t>𝑥</m:t>
+                                        </m:r>
+                                        <m:r>
+                                          <a:rPr lang="en-US" sz="1100" b="0" i="1" smtClean="0">
+                                            <a:latin typeface="Cambria Math" panose="02040503050406030204" pitchFamily="18" charset="0"/>
+                                            <a:ea typeface="Cambria Math" panose="02040503050406030204" pitchFamily="18" charset="0"/>
+                                          </a:rPr>
+                                          <m:t>,</m:t>
+                                        </m:r>
+                                        <m:r>
+                                          <a:rPr lang="en-US" sz="1100" b="0" i="1" smtClean="0">
+                                            <a:latin typeface="Cambria Math" panose="02040503050406030204" pitchFamily="18" charset="0"/>
+                                            <a:ea typeface="Cambria Math" panose="02040503050406030204" pitchFamily="18" charset="0"/>
+                                          </a:rPr>
+                                          <m:t>𝑦</m:t>
+                                        </m:r>
+                                      </m:e>
+                                    </m:d>
+                                    <m:r>
+                                      <a:rPr lang="en-US" sz="1100" b="0" i="1" smtClean="0">
+                                        <a:latin typeface="Cambria Math" panose="02040503050406030204" pitchFamily="18" charset="0"/>
+                                        <a:ea typeface="Cambria Math" panose="02040503050406030204" pitchFamily="18" charset="0"/>
+                                      </a:rPr>
+                                      <m:t>+</m:t>
                                     </m:r>
                                     <m:r>
                                       <a:rPr lang="en-US" sz="1100" b="0" i="1" smtClean="0">
@@ -18672,7 +18728,7 @@
             </a:graphic>
           </p:graphicFrame>
         </mc:Choice>
-        <mc:Fallback xmlns="">
+        <mc:Fallback>
           <p:graphicFrame>
             <p:nvGraphicFramePr>
               <p:cNvPr id="6" name="Table 5"/>
@@ -18682,7 +18738,7 @@
               <p:nvPr>
                 <p:extLst>
                   <p:ext uri="{D42A27DB-BD31-4B8C-83A1-F6EECF244321}">
-                    <p14:modId xmlns:p14="http://schemas.microsoft.com/office/powerpoint/2010/main" val="2920149492"/>
+                    <p14:modId xmlns:p14="http://schemas.microsoft.com/office/powerpoint/2010/main" val="2673521616"/>
                   </p:ext>
                 </p:extLst>
               </p:nvPr>
@@ -19298,8 +19354,8 @@
           </a:p>
         </p:txBody>
       </p:sp>
-      <mc:AlternateContent xmlns:mc="http://schemas.openxmlformats.org/markup-compatibility/2006">
-        <mc:Choice xmlns:a14="http://schemas.microsoft.com/office/drawing/2010/main" Requires="a14">
+      <mc:AlternateContent xmlns:mc="http://schemas.openxmlformats.org/markup-compatibility/2006" xmlns:a14="http://schemas.microsoft.com/office/drawing/2010/main">
+        <mc:Choice Requires="a14">
           <p:sp>
             <p:nvSpPr>
               <p:cNvPr id="3" name="Content Placeholder 2"/>
@@ -19330,19 +19386,8 @@
                     <a:latin typeface="Cambria Math" panose="02040503050406030204" pitchFamily="18" charset="0"/>
                     <a:ea typeface="Cambria Math" panose="02040503050406030204" pitchFamily="18" charset="0"/>
                   </a:rPr>
-                  <a:t>Spatial index </a:t>
+                  <a:t>Spatial index standardization (week 7 lecture)</a:t>
                 </a:r>
-                <a:r>
-                  <a:rPr lang="en-US" dirty="0" smtClean="0">
-                    <a:latin typeface="Cambria Math" panose="02040503050406030204" pitchFamily="18" charset="0"/>
-                    <a:ea typeface="Cambria Math" panose="02040503050406030204" pitchFamily="18" charset="0"/>
-                  </a:rPr>
-                  <a:t>standardization (week 7 lecture)</a:t>
-                </a:r>
-                <a:endParaRPr lang="en-US" dirty="0" smtClean="0">
-                  <a:latin typeface="Cambria Math" panose="02040503050406030204" pitchFamily="18" charset="0"/>
-                  <a:ea typeface="Cambria Math" panose="02040503050406030204" pitchFamily="18" charset="0"/>
-                </a:endParaRPr>
               </a:p>
               <a:p>
                 <a:pPr marL="0" indent="0">
@@ -19567,13 +19612,8 @@
                 <a:pPr lvl="1" indent="-342900"/>
                 <a:r>
                   <a:rPr lang="en-US" dirty="0" smtClean="0"/>
-                  <a:t>Spatial Gompertz </a:t>
+                  <a:t>Spatial Gompertz model (week 7 lab)</a:t>
                 </a:r>
-                <a:r>
-                  <a:rPr lang="en-US" dirty="0" smtClean="0"/>
-                  <a:t>model (week 7 lab)</a:t>
-                </a:r>
-                <a:endParaRPr lang="en-US" dirty="0" smtClean="0"/>
               </a:p>
               <a:p>
                 <a:pPr marL="0" indent="0">
@@ -19753,7 +19793,7 @@
             </p:txBody>
           </p:sp>
         </mc:Choice>
-        <mc:Fallback>
+        <mc:Fallback xmlns="">
           <p:sp>
             <p:nvSpPr>
               <p:cNvPr id="3" name="Content Placeholder 2"/>
@@ -19843,8 +19883,8 @@
           </a:p>
         </p:txBody>
       </p:sp>
-      <mc:AlternateContent xmlns:mc="http://schemas.openxmlformats.org/markup-compatibility/2006">
-        <mc:Choice xmlns:a14="http://schemas.microsoft.com/office/drawing/2010/main" Requires="a14">
+      <mc:AlternateContent xmlns:mc="http://schemas.openxmlformats.org/markup-compatibility/2006" xmlns:a14="http://schemas.microsoft.com/office/drawing/2010/main">
+        <mc:Choice Requires="a14">
           <p:sp>
             <p:nvSpPr>
               <p:cNvPr id="3" name="Content Placeholder 2"/>
@@ -20052,7 +20092,7 @@
                       <m:sSub>
                         <m:sSubPr>
                           <m:ctrlPr>
-                            <a:rPr lang="en-US" b="0" i="0" smtClean="0">
+                            <a:rPr lang="en-US" b="0" i="1" smtClean="0">
                               <a:latin typeface="Cambria Math" panose="02040503050406030204" pitchFamily="18" charset="0"/>
                               <a:ea typeface="Cambria Math" panose="02040503050406030204" pitchFamily="18" charset="0"/>
                             </a:rPr>
@@ -20316,14 +20356,7 @@
                     <a:latin typeface="Cambria Math" panose="02040503050406030204" pitchFamily="18" charset="0"/>
                     <a:ea typeface="Cambria Math" panose="02040503050406030204" pitchFamily="18" charset="0"/>
                   </a:rPr>
-                  <a:t> is fishin</a:t>
-                </a:r>
-                <a:r>
-                  <a:rPr lang="en-US" dirty="0" smtClean="0">
-                    <a:latin typeface="Cambria Math" panose="02040503050406030204" pitchFamily="18" charset="0"/>
-                    <a:ea typeface="Cambria Math" panose="02040503050406030204" pitchFamily="18" charset="0"/>
-                  </a:rPr>
-                  <a:t>g fraction times biomass</a:t>
+                  <a:t> is fishing fraction times biomass</a:t>
                 </a:r>
               </a:p>
               <a:p>
@@ -21008,7 +21041,7 @@
             </p:txBody>
           </p:sp>
         </mc:Choice>
-        <mc:Fallback>
+        <mc:Fallback xmlns="">
           <p:sp>
             <p:nvSpPr>
               <p:cNvPr id="3" name="Content Placeholder 2"/>
@@ -21635,8 +21668,8 @@
           </a:p>
         </p:txBody>
       </p:sp>
-      <mc:AlternateContent xmlns:mc="http://schemas.openxmlformats.org/markup-compatibility/2006" xmlns:a14="http://schemas.microsoft.com/office/drawing/2010/main">
-        <mc:Choice Requires="a14">
+      <mc:AlternateContent xmlns:mc="http://schemas.openxmlformats.org/markup-compatibility/2006">
+        <mc:Choice xmlns:a14="http://schemas.microsoft.com/office/drawing/2010/main" Requires="a14">
           <p:sp>
             <p:nvSpPr>
               <p:cNvPr id="3" name="Content Placeholder 2"/>
@@ -21850,10 +21883,24 @@
                         </a:rPr>
                         <m:t>=</m:t>
                       </m:r>
+                      <m:r>
+                        <a:rPr lang="en-US" i="1">
+                          <a:latin typeface="Cambria Math" panose="02040503050406030204" pitchFamily="18" charset="0"/>
+                          <a:ea typeface="Cambria Math" panose="02040503050406030204" pitchFamily="18" charset="0"/>
+                        </a:rPr>
+                        <m:t>𝛽</m:t>
+                      </m:r>
+                      <m:r>
+                        <a:rPr lang="en-US" b="0" i="1" smtClean="0">
+                          <a:latin typeface="Cambria Math" panose="02040503050406030204" pitchFamily="18" charset="0"/>
+                          <a:ea typeface="Cambria Math" panose="02040503050406030204" pitchFamily="18" charset="0"/>
+                        </a:rPr>
+                        <m:t>(</m:t>
+                      </m:r>
                       <m:sSub>
                         <m:sSubPr>
                           <m:ctrlPr>
-                            <a:rPr lang="en-US" b="0" i="1" smtClean="0">
+                            <a:rPr lang="en-US" i="1">
                               <a:latin typeface="Cambria Math" panose="02040503050406030204" pitchFamily="18" charset="0"/>
                               <a:ea typeface="Cambria Math" panose="02040503050406030204" pitchFamily="18" charset="0"/>
                             </a:rPr>
@@ -21861,44 +21908,37 @@
                         </m:sSubPr>
                         <m:e>
                           <m:r>
-                            <a:rPr lang="en-US" b="0" i="1" smtClean="0">
-                              <a:latin typeface="Cambria Math" panose="02040503050406030204" pitchFamily="18" charset="0"/>
-                              <a:ea typeface="Cambria Math" panose="02040503050406030204" pitchFamily="18" charset="0"/>
-                            </a:rPr>
-                            <m:t>𝛽</m:t>
+                            <a:rPr lang="en-US" i="1">
+                              <a:latin typeface="Cambria Math" panose="02040503050406030204" pitchFamily="18" charset="0"/>
+                              <a:ea typeface="Cambria Math" panose="02040503050406030204" pitchFamily="18" charset="0"/>
+                            </a:rPr>
+                            <m:t>𝑡</m:t>
                           </m:r>
                         </m:e>
                         <m:sub>
-                          <m:sSub>
-                            <m:sSubPr>
-                              <m:ctrlPr>
-                                <a:rPr lang="en-US" b="0" i="1" smtClean="0">
-                                  <a:latin typeface="Cambria Math" panose="02040503050406030204" pitchFamily="18" charset="0"/>
-                                  <a:ea typeface="Cambria Math" panose="02040503050406030204" pitchFamily="18" charset="0"/>
-                                </a:rPr>
-                              </m:ctrlPr>
-                            </m:sSubPr>
-                            <m:e>
-                              <m:r>
-                                <a:rPr lang="en-US" b="0" i="1" smtClean="0">
-                                  <a:latin typeface="Cambria Math" panose="02040503050406030204" pitchFamily="18" charset="0"/>
-                                  <a:ea typeface="Cambria Math" panose="02040503050406030204" pitchFamily="18" charset="0"/>
-                                </a:rPr>
-                                <m:t>𝑡</m:t>
-                              </m:r>
-                            </m:e>
-                            <m:sub>
-                              <m:r>
-                                <a:rPr lang="en-US" b="0" i="1" smtClean="0">
-                                  <a:latin typeface="Cambria Math" panose="02040503050406030204" pitchFamily="18" charset="0"/>
-                                  <a:ea typeface="Cambria Math" panose="02040503050406030204" pitchFamily="18" charset="0"/>
-                                </a:rPr>
-                                <m:t>𝑖</m:t>
-                              </m:r>
-                            </m:sub>
-                          </m:sSub>
+                          <m:r>
+                            <a:rPr lang="en-US" i="1">
+                              <a:latin typeface="Cambria Math" panose="02040503050406030204" pitchFamily="18" charset="0"/>
+                              <a:ea typeface="Cambria Math" panose="02040503050406030204" pitchFamily="18" charset="0"/>
+                            </a:rPr>
+                            <m:t>𝑖</m:t>
+                          </m:r>
                         </m:sub>
                       </m:sSub>
+                      <m:r>
+                        <a:rPr lang="en-US" b="0" i="1" smtClean="0">
+                          <a:latin typeface="Cambria Math" panose="02040503050406030204" pitchFamily="18" charset="0"/>
+                          <a:ea typeface="Cambria Math" panose="02040503050406030204" pitchFamily="18" charset="0"/>
+                        </a:rPr>
+                        <m:t>)</m:t>
+                      </m:r>
+                      <m:r>
+                        <a:rPr lang="en-US" b="0" i="1" smtClean="0">
+                          <a:latin typeface="Cambria Math" panose="02040503050406030204" pitchFamily="18" charset="0"/>
+                          <a:ea typeface="Cambria Math" panose="02040503050406030204" pitchFamily="18" charset="0"/>
+                        </a:rPr>
+                        <m:t> </m:t>
+                      </m:r>
                       <m:r>
                         <a:rPr lang="en-US" b="0" i="1" smtClean="0">
                           <a:latin typeface="Cambria Math" panose="02040503050406030204" pitchFamily="18" charset="0"/>
@@ -22156,7 +22196,7 @@
                               <a:latin typeface="Cambria Math" panose="02040503050406030204" pitchFamily="18" charset="0"/>
                               <a:ea typeface="Cambria Math" panose="02040503050406030204" pitchFamily="18" charset="0"/>
                             </a:rPr>
-                            <m:t>𝐂</m:t>
+                            <m:t>𝐑</m:t>
                           </m:r>
                         </m:e>
                         <m:sub>
@@ -22298,11 +22338,11 @@
                         </m:sSubPr>
                         <m:e>
                           <m:r>
-                            <a:rPr lang="en-US" b="1">
-                              <a:latin typeface="Cambria Math" panose="02040503050406030204" pitchFamily="18" charset="0"/>
-                              <a:ea typeface="Cambria Math" panose="02040503050406030204" pitchFamily="18" charset="0"/>
-                            </a:rPr>
-                            <m:t>𝐂</m:t>
+                            <a:rPr lang="en-US" b="1" i="0" smtClean="0">
+                              <a:latin typeface="Cambria Math" panose="02040503050406030204" pitchFamily="18" charset="0"/>
+                              <a:ea typeface="Cambria Math" panose="02040503050406030204" pitchFamily="18" charset="0"/>
+                            </a:rPr>
+                            <m:t>𝐑</m:t>
                           </m:r>
                         </m:e>
                         <m:sub>
@@ -22546,7 +22586,7 @@
             </p:txBody>
           </p:sp>
         </mc:Choice>
-        <mc:Fallback xmlns="">
+        <mc:Fallback>
           <p:sp>
             <p:nvSpPr>
               <p:cNvPr id="3" name="Content Placeholder 2"/>

</xml_diff>